<commit_message>
wrapped up Day 3
functions continued
building a simple calculator with functions

wrapping up
</commit_message>
<xml_diff>
--- a/PresentationPPTPDFS/Day 3 Onwards - C Sharp Workshop Bucks College Group.pptx
+++ b/PresentationPPTPDFS/Day 3 Onwards - C Sharp Workshop Bucks College Group.pptx
@@ -5,10 +5,10 @@
     <p:sldMasterId id="2147483705" r:id="rId4"/>
   </p:sldMasterIdLst>
   <p:notesMasterIdLst>
-    <p:notesMasterId r:id="rId23"/>
+    <p:notesMasterId r:id="rId31"/>
   </p:notesMasterIdLst>
   <p:handoutMasterIdLst>
-    <p:handoutMasterId r:id="rId24"/>
+    <p:handoutMasterId r:id="rId32"/>
   </p:handoutMasterIdLst>
   <p:sldIdLst>
     <p:sldId id="1866" r:id="rId5"/>
@@ -26,9 +26,17 @@
     <p:sldId id="1888" r:id="rId17"/>
     <p:sldId id="1889" r:id="rId18"/>
     <p:sldId id="1890" r:id="rId19"/>
-    <p:sldId id="1884" r:id="rId20"/>
-    <p:sldId id="1875" r:id="rId21"/>
-    <p:sldId id="1876" r:id="rId22"/>
+    <p:sldId id="1891" r:id="rId20"/>
+    <p:sldId id="1893" r:id="rId21"/>
+    <p:sldId id="1894" r:id="rId22"/>
+    <p:sldId id="1895" r:id="rId23"/>
+    <p:sldId id="1896" r:id="rId24"/>
+    <p:sldId id="1892" r:id="rId25"/>
+    <p:sldId id="1897" r:id="rId26"/>
+    <p:sldId id="1898" r:id="rId27"/>
+    <p:sldId id="1884" r:id="rId28"/>
+    <p:sldId id="1875" r:id="rId29"/>
+    <p:sldId id="1876" r:id="rId30"/>
   </p:sldIdLst>
   <p:sldSz cx="12192000" cy="6858000"/>
   <p:notesSz cx="6858000" cy="9144000"/>
@@ -177,6 +185,14 @@
             <p14:sldId id="1888"/>
             <p14:sldId id="1889"/>
             <p14:sldId id="1890"/>
+            <p14:sldId id="1891"/>
+            <p14:sldId id="1893"/>
+            <p14:sldId id="1894"/>
+            <p14:sldId id="1895"/>
+            <p14:sldId id="1896"/>
+            <p14:sldId id="1892"/>
+            <p14:sldId id="1897"/>
+            <p14:sldId id="1898"/>
             <p14:sldId id="1884"/>
             <p14:sldId id="1875"/>
             <p14:sldId id="1876"/>
@@ -490,7 +506,7 @@
           <a:p>
             <a:fld id="{148EE06D-E2C5-4DF1-B3C1-8E9169AAB10D}" type="datetimeFigureOut">
               <a:rPr lang="en-US" smtClean="0"/>
-              <a:t>6/15/2023</a:t>
+              <a:t>6/20/2023</a:t>
             </a:fld>
             <a:endParaRPr lang="en-US" dirty="0"/>
           </a:p>
@@ -1641,7 +1657,7 @@
             <a:fld id="{6DEB7EE2-04A2-4FB2-9625-C9C73AC4D32F}" type="slidenum">
               <a:rPr lang="en-US" altLang="en-US" smtClean="0"/>
               <a:pPr/>
-              <a:t>17</a:t>
+              <a:t>25</a:t>
             </a:fld>
             <a:endParaRPr lang="en-US" altLang="en-US" dirty="0"/>
           </a:p>
@@ -2268,7 +2284,7 @@
           <a:p>
             <a:fld id="{50A1B9BC-7BE7-4893-90FD-CC95830FD8F2}" type="datetimeFigureOut">
               <a:rPr lang="en-US" smtClean="0"/>
-              <a:t>6/15/2023</a:t>
+              <a:t>6/20/2023</a:t>
             </a:fld>
             <a:endParaRPr lang="en-US" dirty="0"/>
           </a:p>
@@ -4361,7 +4377,7 @@
             <a:fld id="{1D364696-E1F3-49EF-AEC8-730A16D9A23F}" type="datetimeFigureOut">
               <a:rPr lang="en-US" altLang="en-US" smtClean="0"/>
               <a:pPr/>
-              <a:t>6/15/2023</a:t>
+              <a:t>6/20/2023</a:t>
             </a:fld>
             <a:endParaRPr lang="en-US" altLang="en-US" dirty="0"/>
           </a:p>
@@ -5122,7 +5138,7 @@
           <a:p>
             <a:r>
               <a:rPr lang="en-US" dirty="0"/>
-              <a:t>Day 1 : Introduction to C # and.NET</a:t>
+              <a:t>Day 2 : Introduction to C # and.NET</a:t>
             </a:r>
           </a:p>
         </p:txBody>
@@ -5453,13 +5469,13 @@
   <p:clrMapOvr>
     <a:masterClrMapping/>
   </p:clrMapOvr>
-  <mc:AlternateContent xmlns:mc="http://schemas.openxmlformats.org/markup-compatibility/2006">
-    <mc:Choice xmlns:p14="http://schemas.microsoft.com/office/powerpoint/2010/main" Requires="p14">
+  <mc:AlternateContent xmlns:mc="http://schemas.openxmlformats.org/markup-compatibility/2006" xmlns:p14="http://schemas.microsoft.com/office/powerpoint/2010/main">
+    <mc:Choice Requires="p14">
       <p:transition spd="med" p14:dur="700">
         <p:fade/>
       </p:transition>
     </mc:Choice>
-    <mc:Fallback>
+    <mc:Fallback xmlns="">
       <p:transition spd="med">
         <p:fade/>
       </p:transition>
@@ -5680,13 +5696,13 @@
   <p:clrMapOvr>
     <a:masterClrMapping/>
   </p:clrMapOvr>
-  <mc:AlternateContent xmlns:mc="http://schemas.openxmlformats.org/markup-compatibility/2006">
-    <mc:Choice xmlns:p14="http://schemas.microsoft.com/office/powerpoint/2010/main" Requires="p14">
+  <mc:AlternateContent xmlns:mc="http://schemas.openxmlformats.org/markup-compatibility/2006" xmlns:p14="http://schemas.microsoft.com/office/powerpoint/2010/main">
+    <mc:Choice Requires="p14">
       <p:transition spd="med" p14:dur="700">
         <p:fade/>
       </p:transition>
     </mc:Choice>
-    <mc:Fallback>
+    <mc:Fallback xmlns="">
       <p:transition spd="med">
         <p:fade/>
       </p:transition>
@@ -5871,13 +5887,13 @@
   <p:clrMapOvr>
     <a:masterClrMapping/>
   </p:clrMapOvr>
-  <mc:AlternateContent xmlns:mc="http://schemas.openxmlformats.org/markup-compatibility/2006">
-    <mc:Choice xmlns:p14="http://schemas.microsoft.com/office/powerpoint/2010/main" Requires="p14">
+  <mc:AlternateContent xmlns:mc="http://schemas.openxmlformats.org/markup-compatibility/2006" xmlns:p14="http://schemas.microsoft.com/office/powerpoint/2010/main">
+    <mc:Choice Requires="p14">
       <p:transition spd="med" p14:dur="700">
         <p:fade/>
       </p:transition>
     </mc:Choice>
-    <mc:Fallback>
+    <mc:Fallback xmlns="">
       <p:transition spd="med">
         <p:fade/>
       </p:transition>
@@ -6098,13 +6114,13 @@
   <p:clrMapOvr>
     <a:masterClrMapping/>
   </p:clrMapOvr>
-  <mc:AlternateContent xmlns:mc="http://schemas.openxmlformats.org/markup-compatibility/2006">
-    <mc:Choice xmlns:p14="http://schemas.microsoft.com/office/powerpoint/2010/main" Requires="p14">
+  <mc:AlternateContent xmlns:mc="http://schemas.openxmlformats.org/markup-compatibility/2006" xmlns:p14="http://schemas.microsoft.com/office/powerpoint/2010/main">
+    <mc:Choice Requires="p14">
       <p:transition spd="med" p14:dur="700">
         <p:fade/>
       </p:transition>
     </mc:Choice>
-    <mc:Fallback>
+    <mc:Fallback xmlns="">
       <p:transition spd="med">
         <p:fade/>
       </p:transition>
@@ -6161,7 +6177,1854 @@
           <a:p>
             <a:r>
               <a:rPr lang="en-US" dirty="0"/>
-              <a:t>Day 1 : Introduction to C # and.NET</a:t>
+              <a:t>Day 3 : Functions Continue</a:t>
+            </a:r>
+          </a:p>
+        </p:txBody>
+      </p:sp>
+      <p:sp>
+        <p:nvSpPr>
+          <p:cNvPr id="3" name="TextBox 2">
+            <a:extLst>
+              <a:ext uri="{FF2B5EF4-FFF2-40B4-BE49-F238E27FC236}">
+                <a16:creationId xmlns:a16="http://schemas.microsoft.com/office/drawing/2014/main" id="{25F00EF3-70C3-32DB-02AF-51455AB20D6F}"/>
+              </a:ext>
+            </a:extLst>
+          </p:cNvPr>
+          <p:cNvSpPr txBox="1"/>
+          <p:nvPr/>
+        </p:nvSpPr>
+        <p:spPr>
+          <a:xfrm>
+            <a:off x="569343" y="6142039"/>
+            <a:ext cx="3226279" cy="276999"/>
+          </a:xfrm>
+          <a:prstGeom prst="rect">
+            <a:avLst/>
+          </a:prstGeom>
+          <a:noFill/>
+        </p:spPr>
+        <p:txBody>
+          <a:bodyPr wrap="square" rtlCol="0">
+            <a:spAutoFit/>
+          </a:bodyPr>
+          <a:lstStyle/>
+          <a:p>
+            <a:r>
+              <a:rPr lang="en-US" sz="1200" dirty="0"/>
+              <a:t>C Sharp Workshop for Bucks College Group</a:t>
+            </a:r>
+          </a:p>
+        </p:txBody>
+      </p:sp>
+      <p:sp>
+        <p:nvSpPr>
+          <p:cNvPr id="4" name="TextBox 3">
+            <a:extLst>
+              <a:ext uri="{FF2B5EF4-FFF2-40B4-BE49-F238E27FC236}">
+                <a16:creationId xmlns:a16="http://schemas.microsoft.com/office/drawing/2014/main" id="{49E4D80E-8AAB-6C00-1319-EA17C69A7EDE}"/>
+              </a:ext>
+            </a:extLst>
+          </p:cNvPr>
+          <p:cNvSpPr txBox="1"/>
+          <p:nvPr/>
+        </p:nvSpPr>
+        <p:spPr>
+          <a:xfrm>
+            <a:off x="8589034" y="6143024"/>
+            <a:ext cx="3226279" cy="276999"/>
+          </a:xfrm>
+          <a:prstGeom prst="rect">
+            <a:avLst/>
+          </a:prstGeom>
+          <a:noFill/>
+        </p:spPr>
+        <p:txBody>
+          <a:bodyPr wrap="square" rtlCol="0">
+            <a:spAutoFit/>
+          </a:bodyPr>
+          <a:lstStyle/>
+          <a:p>
+            <a:r>
+              <a:rPr lang="en-US" sz="1200" dirty="0"/>
+              <a:t>Programming Tutor: Jay (Vijayasimha BR)</a:t>
+            </a:r>
+          </a:p>
+        </p:txBody>
+      </p:sp>
+      <p:sp>
+        <p:nvSpPr>
+          <p:cNvPr id="7" name="Text Placeholder 6">
+            <a:extLst>
+              <a:ext uri="{FF2B5EF4-FFF2-40B4-BE49-F238E27FC236}">
+                <a16:creationId xmlns:a16="http://schemas.microsoft.com/office/drawing/2014/main" id="{A57B6225-E75A-5E18-4AE2-2C0630D1140F}"/>
+              </a:ext>
+            </a:extLst>
+          </p:cNvPr>
+          <p:cNvSpPr>
+            <a:spLocks noGrp="1"/>
+          </p:cNvSpPr>
+          <p:nvPr>
+            <p:ph type="body" sz="quarter" idx="11"/>
+          </p:nvPr>
+        </p:nvSpPr>
+        <p:spPr/>
+        <p:txBody>
+          <a:bodyPr>
+            <a:normAutofit fontScale="92500" lnSpcReduction="20000"/>
+          </a:bodyPr>
+          <a:lstStyle/>
+          <a:p>
+            <a:r>
+              <a:rPr lang="en-US" sz="3600" dirty="0"/>
+              <a:t>Type One</a:t>
+            </a:r>
+          </a:p>
+          <a:p>
+            <a:pPr marL="342900" indent="-342900">
+              <a:buAutoNum type="arabicPeriod"/>
+            </a:pPr>
+            <a:endParaRPr lang="en-US" sz="3600" dirty="0"/>
+          </a:p>
+          <a:p>
+            <a:pPr marL="342900" indent="-342900">
+              <a:buAutoNum type="arabicPeriod"/>
+            </a:pPr>
+            <a:r>
+              <a:rPr lang="en-US" sz="3600" dirty="0"/>
+              <a:t>That does not return any value. </a:t>
+            </a:r>
+          </a:p>
+          <a:p>
+            <a:pPr marL="342900" indent="-342900">
+              <a:buAutoNum type="arabicPeriod"/>
+            </a:pPr>
+            <a:r>
+              <a:rPr lang="en-US" sz="3600" dirty="0"/>
+              <a:t>That does not accept any parameters/arguments/variables</a:t>
+            </a:r>
+          </a:p>
+        </p:txBody>
+      </p:sp>
+    </p:spTree>
+    <p:extLst>
+      <p:ext uri="{BB962C8B-B14F-4D97-AF65-F5344CB8AC3E}">
+        <p14:creationId xmlns:p14="http://schemas.microsoft.com/office/powerpoint/2010/main" val="3064162172"/>
+      </p:ext>
+    </p:extLst>
+  </p:cSld>
+  <p:clrMapOvr>
+    <a:masterClrMapping/>
+  </p:clrMapOvr>
+  <mc:AlternateContent xmlns:mc="http://schemas.openxmlformats.org/markup-compatibility/2006">
+    <mc:Choice xmlns:p14="http://schemas.microsoft.com/office/powerpoint/2010/main" Requires="p14">
+      <p:transition spd="med" p14:dur="700">
+        <p:fade/>
+      </p:transition>
+    </mc:Choice>
+    <mc:Fallback>
+      <p:transition spd="med">
+        <p:fade/>
+      </p:transition>
+    </mc:Fallback>
+  </mc:AlternateContent>
+</p:sld>
+</file>
+
+<file path=ppt/slides/slide17.xml><?xml version="1.0" encoding="utf-8"?>
+<p:sld xmlns:a="http://schemas.openxmlformats.org/drawingml/2006/main" xmlns:r="http://schemas.openxmlformats.org/officeDocument/2006/relationships" xmlns:p="http://schemas.openxmlformats.org/presentationml/2006/main">
+  <p:cSld>
+    <p:bg>
+      <p:bgPr>
+        <a:solidFill>
+          <a:schemeClr val="accent3"/>
+        </a:solidFill>
+        <a:effectLst/>
+      </p:bgPr>
+    </p:bg>
+    <p:spTree>
+      <p:nvGrpSpPr>
+        <p:cNvPr id="1" name=""/>
+        <p:cNvGrpSpPr/>
+        <p:nvPr/>
+      </p:nvGrpSpPr>
+      <p:grpSpPr>
+        <a:xfrm>
+          <a:off x="0" y="0"/>
+          <a:ext cx="0" cy="0"/>
+          <a:chOff x="0" y="0"/>
+          <a:chExt cx="0" cy="0"/>
+        </a:xfrm>
+      </p:grpSpPr>
+      <p:sp>
+        <p:nvSpPr>
+          <p:cNvPr id="5" name="Title 4">
+            <a:extLst>
+              <a:ext uri="{FF2B5EF4-FFF2-40B4-BE49-F238E27FC236}">
+                <a16:creationId xmlns:a16="http://schemas.microsoft.com/office/drawing/2014/main" id="{E8C5EA60-12FC-4FB7-9CED-CDC28177F4B1}"/>
+              </a:ext>
+            </a:extLst>
+          </p:cNvPr>
+          <p:cNvSpPr>
+            <a:spLocks noGrp="1"/>
+          </p:cNvSpPr>
+          <p:nvPr>
+            <p:ph type="title"/>
+          </p:nvPr>
+        </p:nvSpPr>
+        <p:spPr/>
+        <p:txBody>
+          <a:bodyPr/>
+          <a:lstStyle/>
+          <a:p>
+            <a:r>
+              <a:rPr lang="en-US" dirty="0"/>
+              <a:t>Day 3 : Functions Continue</a:t>
+            </a:r>
+          </a:p>
+        </p:txBody>
+      </p:sp>
+      <p:sp>
+        <p:nvSpPr>
+          <p:cNvPr id="3" name="TextBox 2">
+            <a:extLst>
+              <a:ext uri="{FF2B5EF4-FFF2-40B4-BE49-F238E27FC236}">
+                <a16:creationId xmlns:a16="http://schemas.microsoft.com/office/drawing/2014/main" id="{25F00EF3-70C3-32DB-02AF-51455AB20D6F}"/>
+              </a:ext>
+            </a:extLst>
+          </p:cNvPr>
+          <p:cNvSpPr txBox="1"/>
+          <p:nvPr/>
+        </p:nvSpPr>
+        <p:spPr>
+          <a:xfrm>
+            <a:off x="569343" y="6142039"/>
+            <a:ext cx="3226279" cy="276999"/>
+          </a:xfrm>
+          <a:prstGeom prst="rect">
+            <a:avLst/>
+          </a:prstGeom>
+          <a:noFill/>
+        </p:spPr>
+        <p:txBody>
+          <a:bodyPr wrap="square" rtlCol="0">
+            <a:spAutoFit/>
+          </a:bodyPr>
+          <a:lstStyle/>
+          <a:p>
+            <a:r>
+              <a:rPr lang="en-US" sz="1200" dirty="0"/>
+              <a:t>C Sharp Workshop for Bucks College Group</a:t>
+            </a:r>
+          </a:p>
+        </p:txBody>
+      </p:sp>
+      <p:sp>
+        <p:nvSpPr>
+          <p:cNvPr id="4" name="TextBox 3">
+            <a:extLst>
+              <a:ext uri="{FF2B5EF4-FFF2-40B4-BE49-F238E27FC236}">
+                <a16:creationId xmlns:a16="http://schemas.microsoft.com/office/drawing/2014/main" id="{49E4D80E-8AAB-6C00-1319-EA17C69A7EDE}"/>
+              </a:ext>
+            </a:extLst>
+          </p:cNvPr>
+          <p:cNvSpPr txBox="1"/>
+          <p:nvPr/>
+        </p:nvSpPr>
+        <p:spPr>
+          <a:xfrm>
+            <a:off x="8589034" y="6143024"/>
+            <a:ext cx="3226279" cy="276999"/>
+          </a:xfrm>
+          <a:prstGeom prst="rect">
+            <a:avLst/>
+          </a:prstGeom>
+          <a:noFill/>
+        </p:spPr>
+        <p:txBody>
+          <a:bodyPr wrap="square" rtlCol="0">
+            <a:spAutoFit/>
+          </a:bodyPr>
+          <a:lstStyle/>
+          <a:p>
+            <a:r>
+              <a:rPr lang="en-US" sz="1200" dirty="0"/>
+              <a:t>Programming Tutor: Jay (Vijayasimha BR)</a:t>
+            </a:r>
+          </a:p>
+        </p:txBody>
+      </p:sp>
+      <p:sp>
+        <p:nvSpPr>
+          <p:cNvPr id="7" name="Text Placeholder 6">
+            <a:extLst>
+              <a:ext uri="{FF2B5EF4-FFF2-40B4-BE49-F238E27FC236}">
+                <a16:creationId xmlns:a16="http://schemas.microsoft.com/office/drawing/2014/main" id="{A57B6225-E75A-5E18-4AE2-2C0630D1140F}"/>
+              </a:ext>
+            </a:extLst>
+          </p:cNvPr>
+          <p:cNvSpPr>
+            <a:spLocks noGrp="1"/>
+          </p:cNvSpPr>
+          <p:nvPr>
+            <p:ph type="body" sz="quarter" idx="11"/>
+          </p:nvPr>
+        </p:nvSpPr>
+        <p:spPr/>
+        <p:txBody>
+          <a:bodyPr>
+            <a:normAutofit lnSpcReduction="10000"/>
+          </a:bodyPr>
+          <a:lstStyle/>
+          <a:p>
+            <a:r>
+              <a:rPr lang="en-US" sz="3600" dirty="0"/>
+              <a:t>Type Two</a:t>
+            </a:r>
+          </a:p>
+          <a:p>
+            <a:pPr marL="342900" indent="-342900">
+              <a:buAutoNum type="arabicPeriod"/>
+            </a:pPr>
+            <a:endParaRPr lang="en-US" sz="3600" dirty="0"/>
+          </a:p>
+          <a:p>
+            <a:pPr marL="342900" indent="-342900">
+              <a:buAutoNum type="arabicPeriod"/>
+            </a:pPr>
+            <a:r>
+              <a:rPr lang="en-US" sz="3600" dirty="0"/>
+              <a:t>That does not return any value. </a:t>
+            </a:r>
+          </a:p>
+          <a:p>
+            <a:pPr marL="342900" indent="-342900">
+              <a:buAutoNum type="arabicPeriod"/>
+            </a:pPr>
+            <a:r>
+              <a:rPr lang="en-US" sz="3600" dirty="0"/>
+              <a:t>Accepts 1 or more parameters</a:t>
+            </a:r>
+          </a:p>
+        </p:txBody>
+      </p:sp>
+    </p:spTree>
+    <p:extLst>
+      <p:ext uri="{BB962C8B-B14F-4D97-AF65-F5344CB8AC3E}">
+        <p14:creationId xmlns:p14="http://schemas.microsoft.com/office/powerpoint/2010/main" val="4192256835"/>
+      </p:ext>
+    </p:extLst>
+  </p:cSld>
+  <p:clrMapOvr>
+    <a:masterClrMapping/>
+  </p:clrMapOvr>
+  <mc:AlternateContent xmlns:mc="http://schemas.openxmlformats.org/markup-compatibility/2006">
+    <mc:Choice xmlns:p14="http://schemas.microsoft.com/office/powerpoint/2010/main" Requires="p14">
+      <p:transition spd="med" p14:dur="700">
+        <p:fade/>
+      </p:transition>
+    </mc:Choice>
+    <mc:Fallback>
+      <p:transition spd="med">
+        <p:fade/>
+      </p:transition>
+    </mc:Fallback>
+  </mc:AlternateContent>
+</p:sld>
+</file>
+
+<file path=ppt/slides/slide18.xml><?xml version="1.0" encoding="utf-8"?>
+<p:sld xmlns:a="http://schemas.openxmlformats.org/drawingml/2006/main" xmlns:r="http://schemas.openxmlformats.org/officeDocument/2006/relationships" xmlns:p="http://schemas.openxmlformats.org/presentationml/2006/main">
+  <p:cSld>
+    <p:bg>
+      <p:bgPr>
+        <a:solidFill>
+          <a:schemeClr val="accent3"/>
+        </a:solidFill>
+        <a:effectLst/>
+      </p:bgPr>
+    </p:bg>
+    <p:spTree>
+      <p:nvGrpSpPr>
+        <p:cNvPr id="1" name=""/>
+        <p:cNvGrpSpPr/>
+        <p:nvPr/>
+      </p:nvGrpSpPr>
+      <p:grpSpPr>
+        <a:xfrm>
+          <a:off x="0" y="0"/>
+          <a:ext cx="0" cy="0"/>
+          <a:chOff x="0" y="0"/>
+          <a:chExt cx="0" cy="0"/>
+        </a:xfrm>
+      </p:grpSpPr>
+      <p:sp>
+        <p:nvSpPr>
+          <p:cNvPr id="5" name="Title 4">
+            <a:extLst>
+              <a:ext uri="{FF2B5EF4-FFF2-40B4-BE49-F238E27FC236}">
+                <a16:creationId xmlns:a16="http://schemas.microsoft.com/office/drawing/2014/main" id="{E8C5EA60-12FC-4FB7-9CED-CDC28177F4B1}"/>
+              </a:ext>
+            </a:extLst>
+          </p:cNvPr>
+          <p:cNvSpPr>
+            <a:spLocks noGrp="1"/>
+          </p:cNvSpPr>
+          <p:nvPr>
+            <p:ph type="title"/>
+          </p:nvPr>
+        </p:nvSpPr>
+        <p:spPr/>
+        <p:txBody>
+          <a:bodyPr/>
+          <a:lstStyle/>
+          <a:p>
+            <a:r>
+              <a:rPr lang="en-US" dirty="0"/>
+              <a:t>Day 3 : Functions Continue</a:t>
+            </a:r>
+          </a:p>
+        </p:txBody>
+      </p:sp>
+      <p:sp>
+        <p:nvSpPr>
+          <p:cNvPr id="3" name="TextBox 2">
+            <a:extLst>
+              <a:ext uri="{FF2B5EF4-FFF2-40B4-BE49-F238E27FC236}">
+                <a16:creationId xmlns:a16="http://schemas.microsoft.com/office/drawing/2014/main" id="{25F00EF3-70C3-32DB-02AF-51455AB20D6F}"/>
+              </a:ext>
+            </a:extLst>
+          </p:cNvPr>
+          <p:cNvSpPr txBox="1"/>
+          <p:nvPr/>
+        </p:nvSpPr>
+        <p:spPr>
+          <a:xfrm>
+            <a:off x="569343" y="6142039"/>
+            <a:ext cx="3226279" cy="276999"/>
+          </a:xfrm>
+          <a:prstGeom prst="rect">
+            <a:avLst/>
+          </a:prstGeom>
+          <a:noFill/>
+        </p:spPr>
+        <p:txBody>
+          <a:bodyPr wrap="square" rtlCol="0">
+            <a:spAutoFit/>
+          </a:bodyPr>
+          <a:lstStyle/>
+          <a:p>
+            <a:r>
+              <a:rPr lang="en-US" sz="1200" dirty="0"/>
+              <a:t>C Sharp Workshop for Bucks College Group</a:t>
+            </a:r>
+          </a:p>
+        </p:txBody>
+      </p:sp>
+      <p:sp>
+        <p:nvSpPr>
+          <p:cNvPr id="4" name="TextBox 3">
+            <a:extLst>
+              <a:ext uri="{FF2B5EF4-FFF2-40B4-BE49-F238E27FC236}">
+                <a16:creationId xmlns:a16="http://schemas.microsoft.com/office/drawing/2014/main" id="{49E4D80E-8AAB-6C00-1319-EA17C69A7EDE}"/>
+              </a:ext>
+            </a:extLst>
+          </p:cNvPr>
+          <p:cNvSpPr txBox="1"/>
+          <p:nvPr/>
+        </p:nvSpPr>
+        <p:spPr>
+          <a:xfrm>
+            <a:off x="8589034" y="6143024"/>
+            <a:ext cx="3226279" cy="276999"/>
+          </a:xfrm>
+          <a:prstGeom prst="rect">
+            <a:avLst/>
+          </a:prstGeom>
+          <a:noFill/>
+        </p:spPr>
+        <p:txBody>
+          <a:bodyPr wrap="square" rtlCol="0">
+            <a:spAutoFit/>
+          </a:bodyPr>
+          <a:lstStyle/>
+          <a:p>
+            <a:r>
+              <a:rPr lang="en-US" sz="1200" dirty="0"/>
+              <a:t>Programming Tutor: Jay (Vijayasimha BR)</a:t>
+            </a:r>
+          </a:p>
+        </p:txBody>
+      </p:sp>
+      <p:sp>
+        <p:nvSpPr>
+          <p:cNvPr id="7" name="Text Placeholder 6">
+            <a:extLst>
+              <a:ext uri="{FF2B5EF4-FFF2-40B4-BE49-F238E27FC236}">
+                <a16:creationId xmlns:a16="http://schemas.microsoft.com/office/drawing/2014/main" id="{A57B6225-E75A-5E18-4AE2-2C0630D1140F}"/>
+              </a:ext>
+            </a:extLst>
+          </p:cNvPr>
+          <p:cNvSpPr>
+            <a:spLocks noGrp="1"/>
+          </p:cNvSpPr>
+          <p:nvPr>
+            <p:ph type="body" sz="quarter" idx="11"/>
+          </p:nvPr>
+        </p:nvSpPr>
+        <p:spPr/>
+        <p:txBody>
+          <a:bodyPr>
+            <a:normAutofit/>
+          </a:bodyPr>
+          <a:lstStyle/>
+          <a:p>
+            <a:r>
+              <a:rPr lang="en-US" sz="3600" dirty="0"/>
+              <a:t>Type Three</a:t>
+            </a:r>
+          </a:p>
+          <a:p>
+            <a:pPr marL="342900" indent="-342900">
+              <a:buAutoNum type="arabicPeriod"/>
+            </a:pPr>
+            <a:endParaRPr lang="en-US" sz="3600" dirty="0"/>
+          </a:p>
+          <a:p>
+            <a:pPr marL="342900" indent="-342900">
+              <a:buAutoNum type="arabicPeriod"/>
+            </a:pPr>
+            <a:r>
+              <a:rPr lang="en-US" sz="3600" dirty="0"/>
+              <a:t>It does return the value</a:t>
+            </a:r>
+          </a:p>
+          <a:p>
+            <a:pPr marL="342900" indent="-342900">
+              <a:buAutoNum type="arabicPeriod"/>
+            </a:pPr>
+            <a:r>
+              <a:rPr lang="en-US" sz="3600" dirty="0"/>
+              <a:t>Accepts 1 or more parameters</a:t>
+            </a:r>
+          </a:p>
+        </p:txBody>
+      </p:sp>
+    </p:spTree>
+    <p:extLst>
+      <p:ext uri="{BB962C8B-B14F-4D97-AF65-F5344CB8AC3E}">
+        <p14:creationId xmlns:p14="http://schemas.microsoft.com/office/powerpoint/2010/main" val="1121987190"/>
+      </p:ext>
+    </p:extLst>
+  </p:cSld>
+  <p:clrMapOvr>
+    <a:masterClrMapping/>
+  </p:clrMapOvr>
+  <mc:AlternateContent xmlns:mc="http://schemas.openxmlformats.org/markup-compatibility/2006">
+    <mc:Choice xmlns:p14="http://schemas.microsoft.com/office/powerpoint/2010/main" Requires="p14">
+      <p:transition spd="med" p14:dur="700">
+        <p:fade/>
+      </p:transition>
+    </mc:Choice>
+    <mc:Fallback>
+      <p:transition spd="med">
+        <p:fade/>
+      </p:transition>
+    </mc:Fallback>
+  </mc:AlternateContent>
+</p:sld>
+</file>
+
+<file path=ppt/slides/slide19.xml><?xml version="1.0" encoding="utf-8"?>
+<p:sld xmlns:a="http://schemas.openxmlformats.org/drawingml/2006/main" xmlns:r="http://schemas.openxmlformats.org/officeDocument/2006/relationships" xmlns:p="http://schemas.openxmlformats.org/presentationml/2006/main">
+  <p:cSld>
+    <p:bg>
+      <p:bgPr>
+        <a:solidFill>
+          <a:schemeClr val="accent3"/>
+        </a:solidFill>
+        <a:effectLst/>
+      </p:bgPr>
+    </p:bg>
+    <p:spTree>
+      <p:nvGrpSpPr>
+        <p:cNvPr id="1" name=""/>
+        <p:cNvGrpSpPr/>
+        <p:nvPr/>
+      </p:nvGrpSpPr>
+      <p:grpSpPr>
+        <a:xfrm>
+          <a:off x="0" y="0"/>
+          <a:ext cx="0" cy="0"/>
+          <a:chOff x="0" y="0"/>
+          <a:chExt cx="0" cy="0"/>
+        </a:xfrm>
+      </p:grpSpPr>
+      <p:sp>
+        <p:nvSpPr>
+          <p:cNvPr id="5" name="Title 4">
+            <a:extLst>
+              <a:ext uri="{FF2B5EF4-FFF2-40B4-BE49-F238E27FC236}">
+                <a16:creationId xmlns:a16="http://schemas.microsoft.com/office/drawing/2014/main" id="{E8C5EA60-12FC-4FB7-9CED-CDC28177F4B1}"/>
+              </a:ext>
+            </a:extLst>
+          </p:cNvPr>
+          <p:cNvSpPr>
+            <a:spLocks noGrp="1"/>
+          </p:cNvSpPr>
+          <p:nvPr>
+            <p:ph type="title"/>
+          </p:nvPr>
+        </p:nvSpPr>
+        <p:spPr/>
+        <p:txBody>
+          <a:bodyPr/>
+          <a:lstStyle/>
+          <a:p>
+            <a:r>
+              <a:rPr lang="en-US" dirty="0"/>
+              <a:t>Day 3 : Functions Continue</a:t>
+            </a:r>
+          </a:p>
+        </p:txBody>
+      </p:sp>
+      <p:sp>
+        <p:nvSpPr>
+          <p:cNvPr id="3" name="TextBox 2">
+            <a:extLst>
+              <a:ext uri="{FF2B5EF4-FFF2-40B4-BE49-F238E27FC236}">
+                <a16:creationId xmlns:a16="http://schemas.microsoft.com/office/drawing/2014/main" id="{25F00EF3-70C3-32DB-02AF-51455AB20D6F}"/>
+              </a:ext>
+            </a:extLst>
+          </p:cNvPr>
+          <p:cNvSpPr txBox="1"/>
+          <p:nvPr/>
+        </p:nvSpPr>
+        <p:spPr>
+          <a:xfrm>
+            <a:off x="569343" y="6142039"/>
+            <a:ext cx="3226279" cy="276999"/>
+          </a:xfrm>
+          <a:prstGeom prst="rect">
+            <a:avLst/>
+          </a:prstGeom>
+          <a:noFill/>
+        </p:spPr>
+        <p:txBody>
+          <a:bodyPr wrap="square" rtlCol="0">
+            <a:spAutoFit/>
+          </a:bodyPr>
+          <a:lstStyle/>
+          <a:p>
+            <a:r>
+              <a:rPr lang="en-US" sz="1200" dirty="0"/>
+              <a:t>C Sharp Workshop for Bucks College Group</a:t>
+            </a:r>
+          </a:p>
+        </p:txBody>
+      </p:sp>
+      <p:sp>
+        <p:nvSpPr>
+          <p:cNvPr id="4" name="TextBox 3">
+            <a:extLst>
+              <a:ext uri="{FF2B5EF4-FFF2-40B4-BE49-F238E27FC236}">
+                <a16:creationId xmlns:a16="http://schemas.microsoft.com/office/drawing/2014/main" id="{49E4D80E-8AAB-6C00-1319-EA17C69A7EDE}"/>
+              </a:ext>
+            </a:extLst>
+          </p:cNvPr>
+          <p:cNvSpPr txBox="1"/>
+          <p:nvPr/>
+        </p:nvSpPr>
+        <p:spPr>
+          <a:xfrm>
+            <a:off x="8589034" y="6143024"/>
+            <a:ext cx="3226279" cy="276999"/>
+          </a:xfrm>
+          <a:prstGeom prst="rect">
+            <a:avLst/>
+          </a:prstGeom>
+          <a:noFill/>
+        </p:spPr>
+        <p:txBody>
+          <a:bodyPr wrap="square" rtlCol="0">
+            <a:spAutoFit/>
+          </a:bodyPr>
+          <a:lstStyle/>
+          <a:p>
+            <a:r>
+              <a:rPr lang="en-US" sz="1200" dirty="0"/>
+              <a:t>Programming Tutor: Jay (Vijayasimha BR)</a:t>
+            </a:r>
+          </a:p>
+        </p:txBody>
+      </p:sp>
+      <p:sp>
+        <p:nvSpPr>
+          <p:cNvPr id="7" name="Text Placeholder 6">
+            <a:extLst>
+              <a:ext uri="{FF2B5EF4-FFF2-40B4-BE49-F238E27FC236}">
+                <a16:creationId xmlns:a16="http://schemas.microsoft.com/office/drawing/2014/main" id="{A57B6225-E75A-5E18-4AE2-2C0630D1140F}"/>
+              </a:ext>
+            </a:extLst>
+          </p:cNvPr>
+          <p:cNvSpPr>
+            <a:spLocks noGrp="1"/>
+          </p:cNvSpPr>
+          <p:nvPr>
+            <p:ph type="body" sz="quarter" idx="11"/>
+          </p:nvPr>
+        </p:nvSpPr>
+        <p:spPr/>
+        <p:txBody>
+          <a:bodyPr>
+            <a:normAutofit/>
+          </a:bodyPr>
+          <a:lstStyle/>
+          <a:p>
+            <a:r>
+              <a:rPr lang="en-US" sz="3600" dirty="0"/>
+              <a:t>Type Four</a:t>
+            </a:r>
+          </a:p>
+          <a:p>
+            <a:pPr marL="342900" indent="-342900">
+              <a:buAutoNum type="arabicPeriod"/>
+            </a:pPr>
+            <a:endParaRPr lang="en-US" sz="3600" dirty="0"/>
+          </a:p>
+          <a:p>
+            <a:pPr marL="342900" indent="-342900">
+              <a:buAutoNum type="arabicPeriod"/>
+            </a:pPr>
+            <a:r>
+              <a:rPr lang="en-US" sz="3600" dirty="0"/>
+              <a:t>It does return the value</a:t>
+            </a:r>
+          </a:p>
+          <a:p>
+            <a:pPr marL="342900" indent="-342900">
+              <a:buAutoNum type="arabicPeriod"/>
+            </a:pPr>
+            <a:r>
+              <a:rPr lang="en-US" sz="3600" dirty="0"/>
+              <a:t>Not accepting any parameters</a:t>
+            </a:r>
+          </a:p>
+        </p:txBody>
+      </p:sp>
+    </p:spTree>
+    <p:extLst>
+      <p:ext uri="{BB962C8B-B14F-4D97-AF65-F5344CB8AC3E}">
+        <p14:creationId xmlns:p14="http://schemas.microsoft.com/office/powerpoint/2010/main" val="3914018256"/>
+      </p:ext>
+    </p:extLst>
+  </p:cSld>
+  <p:clrMapOvr>
+    <a:masterClrMapping/>
+  </p:clrMapOvr>
+  <mc:AlternateContent xmlns:mc="http://schemas.openxmlformats.org/markup-compatibility/2006">
+    <mc:Choice xmlns:p14="http://schemas.microsoft.com/office/powerpoint/2010/main" Requires="p14">
+      <p:transition spd="med" p14:dur="700">
+        <p:fade/>
+      </p:transition>
+    </mc:Choice>
+    <mc:Fallback>
+      <p:transition spd="med">
+        <p:fade/>
+      </p:transition>
+    </mc:Fallback>
+  </mc:AlternateContent>
+</p:sld>
+</file>
+
+<file path=ppt/slides/slide2.xml><?xml version="1.0" encoding="utf-8"?>
+<p:sld xmlns:a="http://schemas.openxmlformats.org/drawingml/2006/main" xmlns:r="http://schemas.openxmlformats.org/officeDocument/2006/relationships" xmlns:p="http://schemas.openxmlformats.org/presentationml/2006/main">
+  <p:cSld>
+    <p:spTree>
+      <p:nvGrpSpPr>
+        <p:cNvPr id="1" name=""/>
+        <p:cNvGrpSpPr/>
+        <p:nvPr/>
+      </p:nvGrpSpPr>
+      <p:grpSpPr>
+        <a:xfrm>
+          <a:off x="0" y="0"/>
+          <a:ext cx="0" cy="0"/>
+          <a:chOff x="0" y="0"/>
+          <a:chExt cx="0" cy="0"/>
+        </a:xfrm>
+      </p:grpSpPr>
+      <p:sp>
+        <p:nvSpPr>
+          <p:cNvPr id="6" name="Title 5">
+            <a:extLst>
+              <a:ext uri="{FF2B5EF4-FFF2-40B4-BE49-F238E27FC236}">
+                <a16:creationId xmlns:a16="http://schemas.microsoft.com/office/drawing/2014/main" id="{F168E5CF-FC82-40DA-8E6D-0BFF887BD80E}"/>
+              </a:ext>
+            </a:extLst>
+          </p:cNvPr>
+          <p:cNvSpPr>
+            <a:spLocks noGrp="1"/>
+          </p:cNvSpPr>
+          <p:nvPr>
+            <p:ph type="title"/>
+          </p:nvPr>
+        </p:nvSpPr>
+        <p:spPr>
+          <a:xfrm>
+            <a:off x="2584704" y="1480349"/>
+            <a:ext cx="7022592" cy="1453149"/>
+          </a:xfrm>
+        </p:spPr>
+        <p:txBody>
+          <a:bodyPr anchor="ctr">
+            <a:normAutofit/>
+          </a:bodyPr>
+          <a:lstStyle/>
+          <a:p>
+            <a:r>
+              <a:rPr lang="en-US" sz="2800" b="1" dirty="0"/>
+              <a:t>Programming Tutor: Jay (Vijayasimha BR) (just google my name and you  will find me)</a:t>
+            </a:r>
+          </a:p>
+        </p:txBody>
+      </p:sp>
+      <p:sp>
+        <p:nvSpPr>
+          <p:cNvPr id="2" name="Title 5">
+            <a:extLst>
+              <a:ext uri="{FF2B5EF4-FFF2-40B4-BE49-F238E27FC236}">
+                <a16:creationId xmlns:a16="http://schemas.microsoft.com/office/drawing/2014/main" id="{B723D126-04BF-DEE6-BDBC-25444CCA6A51}"/>
+              </a:ext>
+            </a:extLst>
+          </p:cNvPr>
+          <p:cNvSpPr txBox="1">
+            <a:spLocks/>
+          </p:cNvSpPr>
+          <p:nvPr/>
+        </p:nvSpPr>
+        <p:spPr>
+          <a:xfrm>
+            <a:off x="2897958" y="198924"/>
+            <a:ext cx="7022592" cy="1281425"/>
+          </a:xfrm>
+          <a:prstGeom prst="rect">
+            <a:avLst/>
+          </a:prstGeom>
+        </p:spPr>
+        <p:txBody>
+          <a:bodyPr vert="horz" lIns="91440" tIns="45720" rIns="91440" bIns="45720" rtlCol="0" anchor="ctr">
+            <a:normAutofit lnSpcReduction="10000"/>
+          </a:bodyPr>
+          <a:lstStyle>
+            <a:lvl1pPr algn="ctr" defTabSz="914400" rtl="0" eaLnBrk="1" latinLnBrk="0" hangingPunct="1">
+              <a:lnSpc>
+                <a:spcPct val="90000"/>
+              </a:lnSpc>
+              <a:spcBef>
+                <a:spcPct val="0"/>
+              </a:spcBef>
+              <a:buNone/>
+              <a:defRPr lang="en-US" sz="4800" b="1" kern="1200">
+                <a:solidFill>
+                  <a:schemeClr val="accent4">
+                    <a:lumMod val="75000"/>
+                  </a:schemeClr>
+                </a:solidFill>
+                <a:latin typeface="+mj-lt"/>
+                <a:ea typeface="+mn-ea"/>
+                <a:cs typeface="+mn-cs"/>
+              </a:defRPr>
+            </a:lvl1pPr>
+          </a:lstStyle>
+          <a:p>
+            <a:pPr fontAlgn="auto">
+              <a:spcAft>
+                <a:spcPts val="0"/>
+              </a:spcAft>
+            </a:pPr>
+            <a:r>
+              <a:rPr lang="en-US" dirty="0"/>
+              <a:t>Code and Essential Details</a:t>
+            </a:r>
+          </a:p>
+        </p:txBody>
+      </p:sp>
+      <p:sp>
+        <p:nvSpPr>
+          <p:cNvPr id="3" name="Title 5">
+            <a:extLst>
+              <a:ext uri="{FF2B5EF4-FFF2-40B4-BE49-F238E27FC236}">
+                <a16:creationId xmlns:a16="http://schemas.microsoft.com/office/drawing/2014/main" id="{A1C947B7-D070-AA4C-0528-0174E91D728F}"/>
+              </a:ext>
+            </a:extLst>
+          </p:cNvPr>
+          <p:cNvSpPr txBox="1">
+            <a:spLocks/>
+          </p:cNvSpPr>
+          <p:nvPr/>
+        </p:nvSpPr>
+        <p:spPr>
+          <a:xfrm>
+            <a:off x="2584704" y="4565214"/>
+            <a:ext cx="7022592" cy="1453149"/>
+          </a:xfrm>
+          <a:prstGeom prst="rect">
+            <a:avLst/>
+          </a:prstGeom>
+        </p:spPr>
+        <p:txBody>
+          <a:bodyPr vert="horz" lIns="91440" tIns="45720" rIns="91440" bIns="45720" rtlCol="0" anchor="ctr">
+            <a:normAutofit/>
+          </a:bodyPr>
+          <a:lstStyle>
+            <a:lvl1pPr algn="ctr" defTabSz="914400" rtl="0" eaLnBrk="1" latinLnBrk="0" hangingPunct="1">
+              <a:lnSpc>
+                <a:spcPct val="90000"/>
+              </a:lnSpc>
+              <a:spcBef>
+                <a:spcPct val="0"/>
+              </a:spcBef>
+              <a:buNone/>
+              <a:defRPr lang="en-US" sz="4800" b="1" kern="1200">
+                <a:solidFill>
+                  <a:schemeClr val="accent4">
+                    <a:lumMod val="75000"/>
+                  </a:schemeClr>
+                </a:solidFill>
+                <a:latin typeface="+mj-lt"/>
+                <a:ea typeface="+mn-ea"/>
+                <a:cs typeface="+mn-cs"/>
+              </a:defRPr>
+            </a:lvl1pPr>
+          </a:lstStyle>
+          <a:p>
+            <a:pPr fontAlgn="auto">
+              <a:spcAft>
+                <a:spcPts val="0"/>
+              </a:spcAft>
+            </a:pPr>
+            <a:r>
+              <a:rPr lang="en-US" sz="2800" dirty="0"/>
+              <a:t>Code and PPTs: </a:t>
+            </a:r>
+            <a:r>
+              <a:rPr lang="en-US" sz="2800" dirty="0">
+                <a:hlinkClick r:id="rId3"/>
+              </a:rPr>
+              <a:t>github.com/Jay-study-nildana/</a:t>
+            </a:r>
+            <a:r>
+              <a:rPr lang="en-US" sz="2800" dirty="0" err="1">
+                <a:hlinkClick r:id="rId3"/>
+              </a:rPr>
+              <a:t>CSharpWorkShopforBucksCollegeGroup</a:t>
+            </a:r>
+            <a:endParaRPr lang="en-US" sz="2800" dirty="0"/>
+          </a:p>
+        </p:txBody>
+      </p:sp>
+      <p:sp>
+        <p:nvSpPr>
+          <p:cNvPr id="4" name="Title 5">
+            <a:extLst>
+              <a:ext uri="{FF2B5EF4-FFF2-40B4-BE49-F238E27FC236}">
+                <a16:creationId xmlns:a16="http://schemas.microsoft.com/office/drawing/2014/main" id="{8DB4A87F-3C0A-67AE-6AC5-08EC9BDDCEBD}"/>
+              </a:ext>
+            </a:extLst>
+          </p:cNvPr>
+          <p:cNvSpPr txBox="1">
+            <a:spLocks/>
+          </p:cNvSpPr>
+          <p:nvPr/>
+        </p:nvSpPr>
+        <p:spPr>
+          <a:xfrm>
+            <a:off x="2659466" y="2849074"/>
+            <a:ext cx="7022592" cy="1453149"/>
+          </a:xfrm>
+          <a:prstGeom prst="rect">
+            <a:avLst/>
+          </a:prstGeom>
+        </p:spPr>
+        <p:txBody>
+          <a:bodyPr vert="horz" lIns="91440" tIns="45720" rIns="91440" bIns="45720" rtlCol="0" anchor="ctr">
+            <a:normAutofit/>
+          </a:bodyPr>
+          <a:lstStyle>
+            <a:lvl1pPr algn="ctr" defTabSz="914400" rtl="0" eaLnBrk="1" latinLnBrk="0" hangingPunct="1">
+              <a:lnSpc>
+                <a:spcPct val="90000"/>
+              </a:lnSpc>
+              <a:spcBef>
+                <a:spcPct val="0"/>
+              </a:spcBef>
+              <a:buNone/>
+              <a:defRPr lang="en-US" sz="4800" b="1" kern="1200">
+                <a:solidFill>
+                  <a:schemeClr val="accent4">
+                    <a:lumMod val="75000"/>
+                  </a:schemeClr>
+                </a:solidFill>
+                <a:latin typeface="+mj-lt"/>
+                <a:ea typeface="+mn-ea"/>
+                <a:cs typeface="+mn-cs"/>
+              </a:defRPr>
+            </a:lvl1pPr>
+          </a:lstStyle>
+          <a:p>
+            <a:pPr fontAlgn="auto">
+              <a:spcAft>
+                <a:spcPts val="0"/>
+              </a:spcAft>
+            </a:pPr>
+            <a:r>
+              <a:rPr lang="en-US" sz="2800" dirty="0"/>
+              <a:t>After googling me, feel free to follow me on GitHub, LinkedIn, Twitter and other socials if you feel like.</a:t>
+            </a:r>
+          </a:p>
+        </p:txBody>
+      </p:sp>
+    </p:spTree>
+    <p:extLst>
+      <p:ext uri="{BB962C8B-B14F-4D97-AF65-F5344CB8AC3E}">
+        <p14:creationId xmlns:p14="http://schemas.microsoft.com/office/powerpoint/2010/main" val="3938073609"/>
+      </p:ext>
+    </p:extLst>
+  </p:cSld>
+  <p:clrMapOvr>
+    <a:masterClrMapping/>
+  </p:clrMapOvr>
+  <mc:AlternateContent xmlns:mc="http://schemas.openxmlformats.org/markup-compatibility/2006" xmlns:p14="http://schemas.microsoft.com/office/powerpoint/2010/main">
+    <mc:Choice Requires="p14">
+      <p:transition spd="med" p14:dur="700">
+        <p:fade/>
+      </p:transition>
+    </mc:Choice>
+    <mc:Fallback xmlns="">
+      <p:transition spd="med">
+        <p:fade/>
+      </p:transition>
+    </mc:Fallback>
+  </mc:AlternateContent>
+</p:sld>
+</file>
+
+<file path=ppt/slides/slide20.xml><?xml version="1.0" encoding="utf-8"?>
+<p:sld xmlns:a="http://schemas.openxmlformats.org/drawingml/2006/main" xmlns:r="http://schemas.openxmlformats.org/officeDocument/2006/relationships" xmlns:p="http://schemas.openxmlformats.org/presentationml/2006/main">
+  <p:cSld>
+    <p:bg>
+      <p:bgPr>
+        <a:solidFill>
+          <a:schemeClr val="accent3"/>
+        </a:solidFill>
+        <a:effectLst/>
+      </p:bgPr>
+    </p:bg>
+    <p:spTree>
+      <p:nvGrpSpPr>
+        <p:cNvPr id="1" name=""/>
+        <p:cNvGrpSpPr/>
+        <p:nvPr/>
+      </p:nvGrpSpPr>
+      <p:grpSpPr>
+        <a:xfrm>
+          <a:off x="0" y="0"/>
+          <a:ext cx="0" cy="0"/>
+          <a:chOff x="0" y="0"/>
+          <a:chExt cx="0" cy="0"/>
+        </a:xfrm>
+      </p:grpSpPr>
+      <p:sp>
+        <p:nvSpPr>
+          <p:cNvPr id="3" name="TextBox 2">
+            <a:extLst>
+              <a:ext uri="{FF2B5EF4-FFF2-40B4-BE49-F238E27FC236}">
+                <a16:creationId xmlns:a16="http://schemas.microsoft.com/office/drawing/2014/main" id="{25F00EF3-70C3-32DB-02AF-51455AB20D6F}"/>
+              </a:ext>
+            </a:extLst>
+          </p:cNvPr>
+          <p:cNvSpPr txBox="1"/>
+          <p:nvPr/>
+        </p:nvSpPr>
+        <p:spPr>
+          <a:xfrm>
+            <a:off x="569343" y="6142039"/>
+            <a:ext cx="3226279" cy="276999"/>
+          </a:xfrm>
+          <a:prstGeom prst="rect">
+            <a:avLst/>
+          </a:prstGeom>
+          <a:noFill/>
+        </p:spPr>
+        <p:txBody>
+          <a:bodyPr wrap="square" rtlCol="0">
+            <a:spAutoFit/>
+          </a:bodyPr>
+          <a:lstStyle/>
+          <a:p>
+            <a:r>
+              <a:rPr lang="en-US" sz="1200" dirty="0"/>
+              <a:t>C Sharp Workshop for Bucks College Group</a:t>
+            </a:r>
+          </a:p>
+        </p:txBody>
+      </p:sp>
+      <p:sp>
+        <p:nvSpPr>
+          <p:cNvPr id="4" name="TextBox 3">
+            <a:extLst>
+              <a:ext uri="{FF2B5EF4-FFF2-40B4-BE49-F238E27FC236}">
+                <a16:creationId xmlns:a16="http://schemas.microsoft.com/office/drawing/2014/main" id="{49E4D80E-8AAB-6C00-1319-EA17C69A7EDE}"/>
+              </a:ext>
+            </a:extLst>
+          </p:cNvPr>
+          <p:cNvSpPr txBox="1"/>
+          <p:nvPr/>
+        </p:nvSpPr>
+        <p:spPr>
+          <a:xfrm>
+            <a:off x="8589034" y="6143024"/>
+            <a:ext cx="3226279" cy="276999"/>
+          </a:xfrm>
+          <a:prstGeom prst="rect">
+            <a:avLst/>
+          </a:prstGeom>
+          <a:noFill/>
+        </p:spPr>
+        <p:txBody>
+          <a:bodyPr wrap="square" rtlCol="0">
+            <a:spAutoFit/>
+          </a:bodyPr>
+          <a:lstStyle/>
+          <a:p>
+            <a:r>
+              <a:rPr lang="en-US" sz="1200" dirty="0"/>
+              <a:t>Programming Tutor: Jay (Vijayasimha BR)</a:t>
+            </a:r>
+          </a:p>
+        </p:txBody>
+      </p:sp>
+      <p:sp>
+        <p:nvSpPr>
+          <p:cNvPr id="7" name="Text Placeholder 6">
+            <a:extLst>
+              <a:ext uri="{FF2B5EF4-FFF2-40B4-BE49-F238E27FC236}">
+                <a16:creationId xmlns:a16="http://schemas.microsoft.com/office/drawing/2014/main" id="{A57B6225-E75A-5E18-4AE2-2C0630D1140F}"/>
+              </a:ext>
+            </a:extLst>
+          </p:cNvPr>
+          <p:cNvSpPr>
+            <a:spLocks noGrp="1"/>
+          </p:cNvSpPr>
+          <p:nvPr>
+            <p:ph type="body" sz="quarter" idx="11"/>
+          </p:nvPr>
+        </p:nvSpPr>
+        <p:spPr>
+          <a:xfrm>
+            <a:off x="762000" y="1905000"/>
+            <a:ext cx="10245306" cy="3633158"/>
+          </a:xfrm>
+        </p:spPr>
+        <p:txBody>
+          <a:bodyPr>
+            <a:normAutofit/>
+          </a:bodyPr>
+          <a:lstStyle/>
+          <a:p>
+            <a:r>
+              <a:rPr lang="en-US" sz="7200" dirty="0"/>
+              <a:t>Random </a:t>
+            </a:r>
+            <a:r>
+              <a:rPr lang="en-US" sz="7200" dirty="0" err="1"/>
+              <a:t>random</a:t>
+            </a:r>
+            <a:r>
+              <a:rPr lang="en-US" sz="7200" dirty="0"/>
+              <a:t> = new Random();</a:t>
+            </a:r>
+          </a:p>
+        </p:txBody>
+      </p:sp>
+    </p:spTree>
+    <p:extLst>
+      <p:ext uri="{BB962C8B-B14F-4D97-AF65-F5344CB8AC3E}">
+        <p14:creationId xmlns:p14="http://schemas.microsoft.com/office/powerpoint/2010/main" val="2052411139"/>
+      </p:ext>
+    </p:extLst>
+  </p:cSld>
+  <p:clrMapOvr>
+    <a:masterClrMapping/>
+  </p:clrMapOvr>
+  <mc:AlternateContent xmlns:mc="http://schemas.openxmlformats.org/markup-compatibility/2006">
+    <mc:Choice xmlns:p14="http://schemas.microsoft.com/office/powerpoint/2010/main" Requires="p14">
+      <p:transition spd="med" p14:dur="700">
+        <p:fade/>
+      </p:transition>
+    </mc:Choice>
+    <mc:Fallback>
+      <p:transition spd="med">
+        <p:fade/>
+      </p:transition>
+    </mc:Fallback>
+  </mc:AlternateContent>
+</p:sld>
+</file>
+
+<file path=ppt/slides/slide21.xml><?xml version="1.0" encoding="utf-8"?>
+<p:sld xmlns:a="http://schemas.openxmlformats.org/drawingml/2006/main" xmlns:r="http://schemas.openxmlformats.org/officeDocument/2006/relationships" xmlns:p="http://schemas.openxmlformats.org/presentationml/2006/main">
+  <p:cSld>
+    <p:bg>
+      <p:bgPr>
+        <a:solidFill>
+          <a:schemeClr val="accent3"/>
+        </a:solidFill>
+        <a:effectLst/>
+      </p:bgPr>
+    </p:bg>
+    <p:spTree>
+      <p:nvGrpSpPr>
+        <p:cNvPr id="1" name=""/>
+        <p:cNvGrpSpPr/>
+        <p:nvPr/>
+      </p:nvGrpSpPr>
+      <p:grpSpPr>
+        <a:xfrm>
+          <a:off x="0" y="0"/>
+          <a:ext cx="0" cy="0"/>
+          <a:chOff x="0" y="0"/>
+          <a:chExt cx="0" cy="0"/>
+        </a:xfrm>
+      </p:grpSpPr>
+      <p:sp>
+        <p:nvSpPr>
+          <p:cNvPr id="5" name="Title 4">
+            <a:extLst>
+              <a:ext uri="{FF2B5EF4-FFF2-40B4-BE49-F238E27FC236}">
+                <a16:creationId xmlns:a16="http://schemas.microsoft.com/office/drawing/2014/main" id="{E8C5EA60-12FC-4FB7-9CED-CDC28177F4B1}"/>
+              </a:ext>
+            </a:extLst>
+          </p:cNvPr>
+          <p:cNvSpPr>
+            <a:spLocks noGrp="1"/>
+          </p:cNvSpPr>
+          <p:nvPr>
+            <p:ph type="title"/>
+          </p:nvPr>
+        </p:nvSpPr>
+        <p:spPr>
+          <a:xfrm>
+            <a:off x="865516" y="224990"/>
+            <a:ext cx="6476999" cy="1189037"/>
+          </a:xfrm>
+        </p:spPr>
+        <p:txBody>
+          <a:bodyPr/>
+          <a:lstStyle/>
+          <a:p>
+            <a:r>
+              <a:rPr lang="en-US" dirty="0"/>
+              <a:t>Functions </a:t>
+            </a:r>
+          </a:p>
+        </p:txBody>
+      </p:sp>
+      <p:sp>
+        <p:nvSpPr>
+          <p:cNvPr id="2" name="Text Placeholder 1">
+            <a:extLst>
+              <a:ext uri="{FF2B5EF4-FFF2-40B4-BE49-F238E27FC236}">
+                <a16:creationId xmlns:a16="http://schemas.microsoft.com/office/drawing/2014/main" id="{3F36812B-2065-4A2B-B59B-8957022687BC}"/>
+              </a:ext>
+            </a:extLst>
+          </p:cNvPr>
+          <p:cNvSpPr>
+            <a:spLocks noGrp="1"/>
+          </p:cNvSpPr>
+          <p:nvPr>
+            <p:ph type="body" sz="quarter" idx="11"/>
+          </p:nvPr>
+        </p:nvSpPr>
+        <p:spPr>
+          <a:xfrm>
+            <a:off x="569343" y="1190445"/>
+            <a:ext cx="10032521" cy="4848046"/>
+          </a:xfrm>
+        </p:spPr>
+        <p:txBody>
+          <a:bodyPr vert="horz" lIns="91440" tIns="45720" rIns="91440" bIns="45720" rtlCol="0" anchor="t">
+            <a:normAutofit fontScale="92500" lnSpcReduction="20000"/>
+          </a:bodyPr>
+          <a:lstStyle/>
+          <a:p>
+            <a:pPr marL="914400" indent="-914400">
+              <a:buAutoNum type="arabicPeriod"/>
+            </a:pPr>
+            <a:r>
+              <a:rPr lang="en-US" altLang="en-US" sz="5400" dirty="0"/>
+              <a:t>Function Definition</a:t>
+            </a:r>
+          </a:p>
+          <a:p>
+            <a:pPr marL="914400" indent="-914400">
+              <a:buAutoNum type="arabicPeriod"/>
+            </a:pPr>
+            <a:r>
+              <a:rPr lang="en-US" altLang="en-US" sz="5400" dirty="0"/>
+              <a:t>Calling Function</a:t>
+            </a:r>
+          </a:p>
+          <a:p>
+            <a:pPr marL="914400" indent="-914400">
+              <a:buAutoNum type="arabicPeriod"/>
+            </a:pPr>
+            <a:r>
+              <a:rPr lang="en-US" altLang="en-US" sz="5400" dirty="0"/>
+              <a:t>Called Function</a:t>
+            </a:r>
+          </a:p>
+          <a:p>
+            <a:pPr marL="914400" indent="-914400">
+              <a:buAutoNum type="arabicPeriod"/>
+            </a:pPr>
+            <a:r>
+              <a:rPr lang="en-US" altLang="en-US" sz="5400" dirty="0"/>
+              <a:t>Parameters (arguments, variables)</a:t>
+            </a:r>
+          </a:p>
+          <a:p>
+            <a:pPr marL="914400" indent="-914400">
+              <a:buAutoNum type="arabicPeriod"/>
+            </a:pPr>
+            <a:r>
+              <a:rPr lang="en-US" altLang="en-US" sz="5400" dirty="0"/>
+              <a:t>Return value from the called function</a:t>
+            </a:r>
+          </a:p>
+        </p:txBody>
+      </p:sp>
+      <p:sp>
+        <p:nvSpPr>
+          <p:cNvPr id="3" name="TextBox 2">
+            <a:extLst>
+              <a:ext uri="{FF2B5EF4-FFF2-40B4-BE49-F238E27FC236}">
+                <a16:creationId xmlns:a16="http://schemas.microsoft.com/office/drawing/2014/main" id="{25F00EF3-70C3-32DB-02AF-51455AB20D6F}"/>
+              </a:ext>
+            </a:extLst>
+          </p:cNvPr>
+          <p:cNvSpPr txBox="1"/>
+          <p:nvPr/>
+        </p:nvSpPr>
+        <p:spPr>
+          <a:xfrm>
+            <a:off x="569343" y="6142039"/>
+            <a:ext cx="3226279" cy="276999"/>
+          </a:xfrm>
+          <a:prstGeom prst="rect">
+            <a:avLst/>
+          </a:prstGeom>
+          <a:noFill/>
+        </p:spPr>
+        <p:txBody>
+          <a:bodyPr wrap="square" rtlCol="0">
+            <a:spAutoFit/>
+          </a:bodyPr>
+          <a:lstStyle/>
+          <a:p>
+            <a:r>
+              <a:rPr lang="en-US" sz="1200" dirty="0"/>
+              <a:t>C Sharp Workshop for Bucks College Group</a:t>
+            </a:r>
+          </a:p>
+        </p:txBody>
+      </p:sp>
+      <p:sp>
+        <p:nvSpPr>
+          <p:cNvPr id="4" name="TextBox 3">
+            <a:extLst>
+              <a:ext uri="{FF2B5EF4-FFF2-40B4-BE49-F238E27FC236}">
+                <a16:creationId xmlns:a16="http://schemas.microsoft.com/office/drawing/2014/main" id="{49E4D80E-8AAB-6C00-1319-EA17C69A7EDE}"/>
+              </a:ext>
+            </a:extLst>
+          </p:cNvPr>
+          <p:cNvSpPr txBox="1"/>
+          <p:nvPr/>
+        </p:nvSpPr>
+        <p:spPr>
+          <a:xfrm>
+            <a:off x="8589034" y="6143024"/>
+            <a:ext cx="3226279" cy="276999"/>
+          </a:xfrm>
+          <a:prstGeom prst="rect">
+            <a:avLst/>
+          </a:prstGeom>
+          <a:noFill/>
+        </p:spPr>
+        <p:txBody>
+          <a:bodyPr wrap="square" rtlCol="0">
+            <a:spAutoFit/>
+          </a:bodyPr>
+          <a:lstStyle/>
+          <a:p>
+            <a:r>
+              <a:rPr lang="en-US" sz="1200" dirty="0"/>
+              <a:t>Programming Tutor: Jay (Vijayasimha BR)</a:t>
+            </a:r>
+          </a:p>
+        </p:txBody>
+      </p:sp>
+    </p:spTree>
+    <p:extLst>
+      <p:ext uri="{BB962C8B-B14F-4D97-AF65-F5344CB8AC3E}">
+        <p14:creationId xmlns:p14="http://schemas.microsoft.com/office/powerpoint/2010/main" val="323873673"/>
+      </p:ext>
+    </p:extLst>
+  </p:cSld>
+  <p:clrMapOvr>
+    <a:masterClrMapping/>
+  </p:clrMapOvr>
+  <mc:AlternateContent xmlns:mc="http://schemas.openxmlformats.org/markup-compatibility/2006">
+    <mc:Choice xmlns:p14="http://schemas.microsoft.com/office/powerpoint/2010/main" Requires="p14">
+      <p:transition spd="med" p14:dur="700">
+        <p:fade/>
+      </p:transition>
+    </mc:Choice>
+    <mc:Fallback>
+      <p:transition spd="med">
+        <p:fade/>
+      </p:transition>
+    </mc:Fallback>
+  </mc:AlternateContent>
+</p:sld>
+</file>
+
+<file path=ppt/slides/slide22.xml><?xml version="1.0" encoding="utf-8"?>
+<p:sld xmlns:a="http://schemas.openxmlformats.org/drawingml/2006/main" xmlns:r="http://schemas.openxmlformats.org/officeDocument/2006/relationships" xmlns:p="http://schemas.openxmlformats.org/presentationml/2006/main">
+  <p:cSld>
+    <p:bg>
+      <p:bgPr>
+        <a:solidFill>
+          <a:schemeClr val="accent3"/>
+        </a:solidFill>
+        <a:effectLst/>
+      </p:bgPr>
+    </p:bg>
+    <p:spTree>
+      <p:nvGrpSpPr>
+        <p:cNvPr id="1" name=""/>
+        <p:cNvGrpSpPr/>
+        <p:nvPr/>
+      </p:nvGrpSpPr>
+      <p:grpSpPr>
+        <a:xfrm>
+          <a:off x="0" y="0"/>
+          <a:ext cx="0" cy="0"/>
+          <a:chOff x="0" y="0"/>
+          <a:chExt cx="0" cy="0"/>
+        </a:xfrm>
+      </p:grpSpPr>
+      <p:sp>
+        <p:nvSpPr>
+          <p:cNvPr id="5" name="Title 4">
+            <a:extLst>
+              <a:ext uri="{FF2B5EF4-FFF2-40B4-BE49-F238E27FC236}">
+                <a16:creationId xmlns:a16="http://schemas.microsoft.com/office/drawing/2014/main" id="{E8C5EA60-12FC-4FB7-9CED-CDC28177F4B1}"/>
+              </a:ext>
+            </a:extLst>
+          </p:cNvPr>
+          <p:cNvSpPr>
+            <a:spLocks noGrp="1"/>
+          </p:cNvSpPr>
+          <p:nvPr>
+            <p:ph type="title"/>
+          </p:nvPr>
+        </p:nvSpPr>
+        <p:spPr>
+          <a:xfrm>
+            <a:off x="865516" y="224990"/>
+            <a:ext cx="6476999" cy="1189037"/>
+          </a:xfrm>
+        </p:spPr>
+        <p:txBody>
+          <a:bodyPr/>
+          <a:lstStyle/>
+          <a:p>
+            <a:r>
+              <a:rPr lang="en-US" dirty="0"/>
+              <a:t>Functions </a:t>
+            </a:r>
+          </a:p>
+        </p:txBody>
+      </p:sp>
+      <p:sp>
+        <p:nvSpPr>
+          <p:cNvPr id="2" name="Text Placeholder 1">
+            <a:extLst>
+              <a:ext uri="{FF2B5EF4-FFF2-40B4-BE49-F238E27FC236}">
+                <a16:creationId xmlns:a16="http://schemas.microsoft.com/office/drawing/2014/main" id="{3F36812B-2065-4A2B-B59B-8957022687BC}"/>
+              </a:ext>
+            </a:extLst>
+          </p:cNvPr>
+          <p:cNvSpPr>
+            <a:spLocks noGrp="1"/>
+          </p:cNvSpPr>
+          <p:nvPr>
+            <p:ph type="body" sz="quarter" idx="11"/>
+          </p:nvPr>
+        </p:nvSpPr>
+        <p:spPr>
+          <a:xfrm>
+            <a:off x="569343" y="1190445"/>
+            <a:ext cx="10032521" cy="4848046"/>
+          </a:xfrm>
+        </p:spPr>
+        <p:txBody>
+          <a:bodyPr vert="horz" lIns="91440" tIns="45720" rIns="91440" bIns="45720" rtlCol="0" anchor="t">
+            <a:normAutofit/>
+          </a:bodyPr>
+          <a:lstStyle/>
+          <a:p>
+            <a:r>
+              <a:rPr lang="en-US" altLang="en-US" sz="5400" dirty="0"/>
+              <a:t>Calculator </a:t>
+            </a:r>
+          </a:p>
+        </p:txBody>
+      </p:sp>
+      <p:sp>
+        <p:nvSpPr>
+          <p:cNvPr id="3" name="TextBox 2">
+            <a:extLst>
+              <a:ext uri="{FF2B5EF4-FFF2-40B4-BE49-F238E27FC236}">
+                <a16:creationId xmlns:a16="http://schemas.microsoft.com/office/drawing/2014/main" id="{25F00EF3-70C3-32DB-02AF-51455AB20D6F}"/>
+              </a:ext>
+            </a:extLst>
+          </p:cNvPr>
+          <p:cNvSpPr txBox="1"/>
+          <p:nvPr/>
+        </p:nvSpPr>
+        <p:spPr>
+          <a:xfrm>
+            <a:off x="569343" y="6142039"/>
+            <a:ext cx="3226279" cy="276999"/>
+          </a:xfrm>
+          <a:prstGeom prst="rect">
+            <a:avLst/>
+          </a:prstGeom>
+          <a:noFill/>
+        </p:spPr>
+        <p:txBody>
+          <a:bodyPr wrap="square" rtlCol="0">
+            <a:spAutoFit/>
+          </a:bodyPr>
+          <a:lstStyle/>
+          <a:p>
+            <a:r>
+              <a:rPr lang="en-US" sz="1200" dirty="0"/>
+              <a:t>C Sharp Workshop for Bucks College Group</a:t>
+            </a:r>
+          </a:p>
+        </p:txBody>
+      </p:sp>
+      <p:sp>
+        <p:nvSpPr>
+          <p:cNvPr id="4" name="TextBox 3">
+            <a:extLst>
+              <a:ext uri="{FF2B5EF4-FFF2-40B4-BE49-F238E27FC236}">
+                <a16:creationId xmlns:a16="http://schemas.microsoft.com/office/drawing/2014/main" id="{49E4D80E-8AAB-6C00-1319-EA17C69A7EDE}"/>
+              </a:ext>
+            </a:extLst>
+          </p:cNvPr>
+          <p:cNvSpPr txBox="1"/>
+          <p:nvPr/>
+        </p:nvSpPr>
+        <p:spPr>
+          <a:xfrm>
+            <a:off x="8589034" y="6143024"/>
+            <a:ext cx="3226279" cy="276999"/>
+          </a:xfrm>
+          <a:prstGeom prst="rect">
+            <a:avLst/>
+          </a:prstGeom>
+          <a:noFill/>
+        </p:spPr>
+        <p:txBody>
+          <a:bodyPr wrap="square" rtlCol="0">
+            <a:spAutoFit/>
+          </a:bodyPr>
+          <a:lstStyle/>
+          <a:p>
+            <a:r>
+              <a:rPr lang="en-US" sz="1200" dirty="0"/>
+              <a:t>Programming Tutor: Jay (Vijayasimha BR)</a:t>
+            </a:r>
+          </a:p>
+        </p:txBody>
+      </p:sp>
+    </p:spTree>
+    <p:extLst>
+      <p:ext uri="{BB962C8B-B14F-4D97-AF65-F5344CB8AC3E}">
+        <p14:creationId xmlns:p14="http://schemas.microsoft.com/office/powerpoint/2010/main" val="3674315690"/>
+      </p:ext>
+    </p:extLst>
+  </p:cSld>
+  <p:clrMapOvr>
+    <a:masterClrMapping/>
+  </p:clrMapOvr>
+  <mc:AlternateContent xmlns:mc="http://schemas.openxmlformats.org/markup-compatibility/2006">
+    <mc:Choice xmlns:p14="http://schemas.microsoft.com/office/powerpoint/2010/main" Requires="p14">
+      <p:transition spd="med" p14:dur="700">
+        <p:fade/>
+      </p:transition>
+    </mc:Choice>
+    <mc:Fallback>
+      <p:transition spd="med">
+        <p:fade/>
+      </p:transition>
+    </mc:Fallback>
+  </mc:AlternateContent>
+</p:sld>
+</file>
+
+<file path=ppt/slides/slide23.xml><?xml version="1.0" encoding="utf-8"?>
+<p:sld xmlns:a="http://schemas.openxmlformats.org/drawingml/2006/main" xmlns:r="http://schemas.openxmlformats.org/officeDocument/2006/relationships" xmlns:p="http://schemas.openxmlformats.org/presentationml/2006/main">
+  <p:cSld>
+    <p:bg>
+      <p:bgPr>
+        <a:solidFill>
+          <a:schemeClr val="accent3"/>
+        </a:solidFill>
+        <a:effectLst/>
+      </p:bgPr>
+    </p:bg>
+    <p:spTree>
+      <p:nvGrpSpPr>
+        <p:cNvPr id="1" name=""/>
+        <p:cNvGrpSpPr/>
+        <p:nvPr/>
+      </p:nvGrpSpPr>
+      <p:grpSpPr>
+        <a:xfrm>
+          <a:off x="0" y="0"/>
+          <a:ext cx="0" cy="0"/>
+          <a:chOff x="0" y="0"/>
+          <a:chExt cx="0" cy="0"/>
+        </a:xfrm>
+      </p:grpSpPr>
+      <p:sp>
+        <p:nvSpPr>
+          <p:cNvPr id="5" name="Title 4">
+            <a:extLst>
+              <a:ext uri="{FF2B5EF4-FFF2-40B4-BE49-F238E27FC236}">
+                <a16:creationId xmlns:a16="http://schemas.microsoft.com/office/drawing/2014/main" id="{E8C5EA60-12FC-4FB7-9CED-CDC28177F4B1}"/>
+              </a:ext>
+            </a:extLst>
+          </p:cNvPr>
+          <p:cNvSpPr>
+            <a:spLocks noGrp="1"/>
+          </p:cNvSpPr>
+          <p:nvPr>
+            <p:ph type="title"/>
+          </p:nvPr>
+        </p:nvSpPr>
+        <p:spPr>
+          <a:xfrm>
+            <a:off x="865516" y="224990"/>
+            <a:ext cx="6476999" cy="1189037"/>
+          </a:xfrm>
+        </p:spPr>
+        <p:txBody>
+          <a:bodyPr/>
+          <a:lstStyle/>
+          <a:p>
+            <a:r>
+              <a:rPr lang="en-US" dirty="0"/>
+              <a:t>Functions </a:t>
+            </a:r>
+          </a:p>
+        </p:txBody>
+      </p:sp>
+      <p:sp>
+        <p:nvSpPr>
+          <p:cNvPr id="2" name="Text Placeholder 1">
+            <a:extLst>
+              <a:ext uri="{FF2B5EF4-FFF2-40B4-BE49-F238E27FC236}">
+                <a16:creationId xmlns:a16="http://schemas.microsoft.com/office/drawing/2014/main" id="{3F36812B-2065-4A2B-B59B-8957022687BC}"/>
+              </a:ext>
+            </a:extLst>
+          </p:cNvPr>
+          <p:cNvSpPr>
+            <a:spLocks noGrp="1"/>
+          </p:cNvSpPr>
+          <p:nvPr>
+            <p:ph type="body" sz="quarter" idx="11"/>
+          </p:nvPr>
+        </p:nvSpPr>
+        <p:spPr>
+          <a:xfrm>
+            <a:off x="569343" y="1190445"/>
+            <a:ext cx="10032521" cy="4848046"/>
+          </a:xfrm>
+        </p:spPr>
+        <p:txBody>
+          <a:bodyPr vert="horz" lIns="91440" tIns="45720" rIns="91440" bIns="45720" rtlCol="0" anchor="t">
+            <a:normAutofit/>
+          </a:bodyPr>
+          <a:lstStyle/>
+          <a:p>
+            <a:r>
+              <a:rPr lang="en-US" altLang="en-US" sz="5400" dirty="0"/>
+              <a:t>Calculator </a:t>
+            </a:r>
+          </a:p>
+        </p:txBody>
+      </p:sp>
+      <p:sp>
+        <p:nvSpPr>
+          <p:cNvPr id="3" name="TextBox 2">
+            <a:extLst>
+              <a:ext uri="{FF2B5EF4-FFF2-40B4-BE49-F238E27FC236}">
+                <a16:creationId xmlns:a16="http://schemas.microsoft.com/office/drawing/2014/main" id="{25F00EF3-70C3-32DB-02AF-51455AB20D6F}"/>
+              </a:ext>
+            </a:extLst>
+          </p:cNvPr>
+          <p:cNvSpPr txBox="1"/>
+          <p:nvPr/>
+        </p:nvSpPr>
+        <p:spPr>
+          <a:xfrm>
+            <a:off x="569343" y="6142039"/>
+            <a:ext cx="3226279" cy="276999"/>
+          </a:xfrm>
+          <a:prstGeom prst="rect">
+            <a:avLst/>
+          </a:prstGeom>
+          <a:noFill/>
+        </p:spPr>
+        <p:txBody>
+          <a:bodyPr wrap="square" rtlCol="0">
+            <a:spAutoFit/>
+          </a:bodyPr>
+          <a:lstStyle/>
+          <a:p>
+            <a:r>
+              <a:rPr lang="en-US" sz="1200" dirty="0"/>
+              <a:t>C Sharp Workshop for Bucks College Group</a:t>
+            </a:r>
+          </a:p>
+        </p:txBody>
+      </p:sp>
+      <p:sp>
+        <p:nvSpPr>
+          <p:cNvPr id="4" name="TextBox 3">
+            <a:extLst>
+              <a:ext uri="{FF2B5EF4-FFF2-40B4-BE49-F238E27FC236}">
+                <a16:creationId xmlns:a16="http://schemas.microsoft.com/office/drawing/2014/main" id="{49E4D80E-8AAB-6C00-1319-EA17C69A7EDE}"/>
+              </a:ext>
+            </a:extLst>
+          </p:cNvPr>
+          <p:cNvSpPr txBox="1"/>
+          <p:nvPr/>
+        </p:nvSpPr>
+        <p:spPr>
+          <a:xfrm>
+            <a:off x="8589034" y="6143024"/>
+            <a:ext cx="3226279" cy="276999"/>
+          </a:xfrm>
+          <a:prstGeom prst="rect">
+            <a:avLst/>
+          </a:prstGeom>
+          <a:noFill/>
+        </p:spPr>
+        <p:txBody>
+          <a:bodyPr wrap="square" rtlCol="0">
+            <a:spAutoFit/>
+          </a:bodyPr>
+          <a:lstStyle/>
+          <a:p>
+            <a:r>
+              <a:rPr lang="en-US" sz="1200" dirty="0"/>
+              <a:t>Programming Tutor: Jay (Vijayasimha BR)</a:t>
+            </a:r>
+          </a:p>
+        </p:txBody>
+      </p:sp>
+    </p:spTree>
+    <p:extLst>
+      <p:ext uri="{BB962C8B-B14F-4D97-AF65-F5344CB8AC3E}">
+        <p14:creationId xmlns:p14="http://schemas.microsoft.com/office/powerpoint/2010/main" val="4290358539"/>
+      </p:ext>
+    </p:extLst>
+  </p:cSld>
+  <p:clrMapOvr>
+    <a:masterClrMapping/>
+  </p:clrMapOvr>
+  <mc:AlternateContent xmlns:mc="http://schemas.openxmlformats.org/markup-compatibility/2006">
+    <mc:Choice xmlns:p14="http://schemas.microsoft.com/office/powerpoint/2010/main" Requires="p14">
+      <p:transition spd="med" p14:dur="700">
+        <p:fade/>
+      </p:transition>
+    </mc:Choice>
+    <mc:Fallback>
+      <p:transition spd="med">
+        <p:fade/>
+      </p:transition>
+    </mc:Fallback>
+  </mc:AlternateContent>
+</p:sld>
+</file>
+
+<file path=ppt/slides/slide24.xml><?xml version="1.0" encoding="utf-8"?>
+<p:sld xmlns:a="http://schemas.openxmlformats.org/drawingml/2006/main" xmlns:r="http://schemas.openxmlformats.org/officeDocument/2006/relationships" xmlns:p="http://schemas.openxmlformats.org/presentationml/2006/main">
+  <p:cSld>
+    <p:bg>
+      <p:bgPr>
+        <a:solidFill>
+          <a:schemeClr val="accent3"/>
+        </a:solidFill>
+        <a:effectLst/>
+      </p:bgPr>
+    </p:bg>
+    <p:spTree>
+      <p:nvGrpSpPr>
+        <p:cNvPr id="1" name=""/>
+        <p:cNvGrpSpPr/>
+        <p:nvPr/>
+      </p:nvGrpSpPr>
+      <p:grpSpPr>
+        <a:xfrm>
+          <a:off x="0" y="0"/>
+          <a:ext cx="0" cy="0"/>
+          <a:chOff x="0" y="0"/>
+          <a:chExt cx="0" cy="0"/>
+        </a:xfrm>
+      </p:grpSpPr>
+      <p:sp>
+        <p:nvSpPr>
+          <p:cNvPr id="5" name="Title 4">
+            <a:extLst>
+              <a:ext uri="{FF2B5EF4-FFF2-40B4-BE49-F238E27FC236}">
+                <a16:creationId xmlns:a16="http://schemas.microsoft.com/office/drawing/2014/main" id="{E8C5EA60-12FC-4FB7-9CED-CDC28177F4B1}"/>
+              </a:ext>
+            </a:extLst>
+          </p:cNvPr>
+          <p:cNvSpPr>
+            <a:spLocks noGrp="1"/>
+          </p:cNvSpPr>
+          <p:nvPr>
+            <p:ph type="title"/>
+          </p:nvPr>
+        </p:nvSpPr>
+        <p:spPr/>
+        <p:txBody>
+          <a:bodyPr/>
+          <a:lstStyle/>
+          <a:p>
+            <a:r>
+              <a:rPr lang="en-US" dirty="0"/>
+              <a:t>Day X : Introduction to C # and.NET</a:t>
             </a:r>
           </a:p>
         </p:txBody>
@@ -6330,7 +8193,7 @@
 </p:sld>
 </file>
 
-<file path=ppt/slides/slide17.xml><?xml version="1.0" encoding="utf-8"?>
+<file path=ppt/slides/slide25.xml><?xml version="1.0" encoding="utf-8"?>
 <p:sld xmlns:a="http://schemas.openxmlformats.org/drawingml/2006/main" xmlns:r="http://schemas.openxmlformats.org/officeDocument/2006/relationships" xmlns:p="http://schemas.openxmlformats.org/presentationml/2006/main">
   <p:cSld>
     <p:spTree>
@@ -6616,7 +8479,7 @@
 </p:sld>
 </file>
 
-<file path=ppt/slides/slide18.xml><?xml version="1.0" encoding="utf-8"?>
+<file path=ppt/slides/slide26.xml><?xml version="1.0" encoding="utf-8"?>
 <p:sld xmlns:a="http://schemas.openxmlformats.org/drawingml/2006/main" xmlns:r="http://schemas.openxmlformats.org/officeDocument/2006/relationships" xmlns:p="http://schemas.openxmlformats.org/presentationml/2006/main">
   <p:cSld>
     <p:spTree>
@@ -6824,279 +8687,6 @@
     <p:extLst>
       <p:ext uri="{BB962C8B-B14F-4D97-AF65-F5344CB8AC3E}">
         <p14:creationId xmlns:p14="http://schemas.microsoft.com/office/powerpoint/2010/main" val="1236220360"/>
-      </p:ext>
-    </p:extLst>
-  </p:cSld>
-  <p:clrMapOvr>
-    <a:masterClrMapping/>
-  </p:clrMapOvr>
-  <mc:AlternateContent xmlns:mc="http://schemas.openxmlformats.org/markup-compatibility/2006" xmlns:p14="http://schemas.microsoft.com/office/powerpoint/2010/main">
-    <mc:Choice Requires="p14">
-      <p:transition spd="med" p14:dur="700">
-        <p:fade/>
-      </p:transition>
-    </mc:Choice>
-    <mc:Fallback xmlns="">
-      <p:transition spd="med">
-        <p:fade/>
-      </p:transition>
-    </mc:Fallback>
-  </mc:AlternateContent>
-</p:sld>
-</file>
-
-<file path=ppt/slides/slide2.xml><?xml version="1.0" encoding="utf-8"?>
-<p:sld xmlns:a="http://schemas.openxmlformats.org/drawingml/2006/main" xmlns:r="http://schemas.openxmlformats.org/officeDocument/2006/relationships" xmlns:p="http://schemas.openxmlformats.org/presentationml/2006/main">
-  <p:cSld>
-    <p:spTree>
-      <p:nvGrpSpPr>
-        <p:cNvPr id="1" name=""/>
-        <p:cNvGrpSpPr/>
-        <p:nvPr/>
-      </p:nvGrpSpPr>
-      <p:grpSpPr>
-        <a:xfrm>
-          <a:off x="0" y="0"/>
-          <a:ext cx="0" cy="0"/>
-          <a:chOff x="0" y="0"/>
-          <a:chExt cx="0" cy="0"/>
-        </a:xfrm>
-      </p:grpSpPr>
-      <p:sp>
-        <p:nvSpPr>
-          <p:cNvPr id="6" name="Title 5">
-            <a:extLst>
-              <a:ext uri="{FF2B5EF4-FFF2-40B4-BE49-F238E27FC236}">
-                <a16:creationId xmlns:a16="http://schemas.microsoft.com/office/drawing/2014/main" id="{F168E5CF-FC82-40DA-8E6D-0BFF887BD80E}"/>
-              </a:ext>
-            </a:extLst>
-          </p:cNvPr>
-          <p:cNvSpPr>
-            <a:spLocks noGrp="1"/>
-          </p:cNvSpPr>
-          <p:nvPr>
-            <p:ph type="title"/>
-          </p:nvPr>
-        </p:nvSpPr>
-        <p:spPr>
-          <a:xfrm>
-            <a:off x="2584704" y="1480349"/>
-            <a:ext cx="7022592" cy="1453149"/>
-          </a:xfrm>
-        </p:spPr>
-        <p:txBody>
-          <a:bodyPr anchor="ctr">
-            <a:normAutofit/>
-          </a:bodyPr>
-          <a:lstStyle/>
-          <a:p>
-            <a:r>
-              <a:rPr lang="en-US" sz="2800" b="1" dirty="0"/>
-              <a:t>Programming Tutor: Jay (Vijayasimha BR) (just google my name and you  will find me)</a:t>
-            </a:r>
-          </a:p>
-        </p:txBody>
-      </p:sp>
-      <p:sp>
-        <p:nvSpPr>
-          <p:cNvPr id="2" name="Title 5">
-            <a:extLst>
-              <a:ext uri="{FF2B5EF4-FFF2-40B4-BE49-F238E27FC236}">
-                <a16:creationId xmlns:a16="http://schemas.microsoft.com/office/drawing/2014/main" id="{B723D126-04BF-DEE6-BDBC-25444CCA6A51}"/>
-              </a:ext>
-            </a:extLst>
-          </p:cNvPr>
-          <p:cNvSpPr txBox="1">
-            <a:spLocks/>
-          </p:cNvSpPr>
-          <p:nvPr/>
-        </p:nvSpPr>
-        <p:spPr>
-          <a:xfrm>
-            <a:off x="2897958" y="198924"/>
-            <a:ext cx="7022592" cy="1281425"/>
-          </a:xfrm>
-          <a:prstGeom prst="rect">
-            <a:avLst/>
-          </a:prstGeom>
-        </p:spPr>
-        <p:txBody>
-          <a:bodyPr vert="horz" lIns="91440" tIns="45720" rIns="91440" bIns="45720" rtlCol="0" anchor="ctr">
-            <a:normAutofit lnSpcReduction="10000"/>
-          </a:bodyPr>
-          <a:lstStyle>
-            <a:lvl1pPr algn="ctr" defTabSz="914400" rtl="0" eaLnBrk="1" latinLnBrk="0" hangingPunct="1">
-              <a:lnSpc>
-                <a:spcPct val="90000"/>
-              </a:lnSpc>
-              <a:spcBef>
-                <a:spcPct val="0"/>
-              </a:spcBef>
-              <a:buNone/>
-              <a:defRPr lang="en-US" sz="4800" b="1" kern="1200">
-                <a:solidFill>
-                  <a:schemeClr val="accent4">
-                    <a:lumMod val="75000"/>
-                  </a:schemeClr>
-                </a:solidFill>
-                <a:latin typeface="+mj-lt"/>
-                <a:ea typeface="+mn-ea"/>
-                <a:cs typeface="+mn-cs"/>
-              </a:defRPr>
-            </a:lvl1pPr>
-          </a:lstStyle>
-          <a:p>
-            <a:pPr fontAlgn="auto">
-              <a:spcAft>
-                <a:spcPts val="0"/>
-              </a:spcAft>
-            </a:pPr>
-            <a:r>
-              <a:rPr lang="en-US" dirty="0"/>
-              <a:t>Code and Essential Details</a:t>
-            </a:r>
-          </a:p>
-        </p:txBody>
-      </p:sp>
-      <p:sp>
-        <p:nvSpPr>
-          <p:cNvPr id="3" name="Title 5">
-            <a:extLst>
-              <a:ext uri="{FF2B5EF4-FFF2-40B4-BE49-F238E27FC236}">
-                <a16:creationId xmlns:a16="http://schemas.microsoft.com/office/drawing/2014/main" id="{A1C947B7-D070-AA4C-0528-0174E91D728F}"/>
-              </a:ext>
-            </a:extLst>
-          </p:cNvPr>
-          <p:cNvSpPr txBox="1">
-            <a:spLocks/>
-          </p:cNvSpPr>
-          <p:nvPr/>
-        </p:nvSpPr>
-        <p:spPr>
-          <a:xfrm>
-            <a:off x="2584704" y="4565214"/>
-            <a:ext cx="7022592" cy="1453149"/>
-          </a:xfrm>
-          <a:prstGeom prst="rect">
-            <a:avLst/>
-          </a:prstGeom>
-        </p:spPr>
-        <p:txBody>
-          <a:bodyPr vert="horz" lIns="91440" tIns="45720" rIns="91440" bIns="45720" rtlCol="0" anchor="ctr">
-            <a:normAutofit/>
-          </a:bodyPr>
-          <a:lstStyle>
-            <a:lvl1pPr algn="ctr" defTabSz="914400" rtl="0" eaLnBrk="1" latinLnBrk="0" hangingPunct="1">
-              <a:lnSpc>
-                <a:spcPct val="90000"/>
-              </a:lnSpc>
-              <a:spcBef>
-                <a:spcPct val="0"/>
-              </a:spcBef>
-              <a:buNone/>
-              <a:defRPr lang="en-US" sz="4800" b="1" kern="1200">
-                <a:solidFill>
-                  <a:schemeClr val="accent4">
-                    <a:lumMod val="75000"/>
-                  </a:schemeClr>
-                </a:solidFill>
-                <a:latin typeface="+mj-lt"/>
-                <a:ea typeface="+mn-ea"/>
-                <a:cs typeface="+mn-cs"/>
-              </a:defRPr>
-            </a:lvl1pPr>
-          </a:lstStyle>
-          <a:p>
-            <a:pPr fontAlgn="auto">
-              <a:spcAft>
-                <a:spcPts val="0"/>
-              </a:spcAft>
-            </a:pPr>
-            <a:r>
-              <a:rPr lang="en-US" sz="2800" dirty="0"/>
-              <a:t>Code and PPTs: </a:t>
-            </a:r>
-            <a:r>
-              <a:rPr lang="en-US" sz="2800" dirty="0">
-                <a:hlinkClick r:id="rId3"/>
-              </a:rPr>
-              <a:t>github.com/Jay-study-nildana/</a:t>
-            </a:r>
-            <a:r>
-              <a:rPr lang="en-US" sz="2800" dirty="0" err="1">
-                <a:hlinkClick r:id="rId3"/>
-              </a:rPr>
-              <a:t>CSharpWorkShopforBucksCollegeGroup</a:t>
-            </a:r>
-            <a:endParaRPr lang="en-US" sz="2800" dirty="0"/>
-          </a:p>
-        </p:txBody>
-      </p:sp>
-      <p:sp>
-        <p:nvSpPr>
-          <p:cNvPr id="4" name="Title 5">
-            <a:extLst>
-              <a:ext uri="{FF2B5EF4-FFF2-40B4-BE49-F238E27FC236}">
-                <a16:creationId xmlns:a16="http://schemas.microsoft.com/office/drawing/2014/main" id="{8DB4A87F-3C0A-67AE-6AC5-08EC9BDDCEBD}"/>
-              </a:ext>
-            </a:extLst>
-          </p:cNvPr>
-          <p:cNvSpPr txBox="1">
-            <a:spLocks/>
-          </p:cNvSpPr>
-          <p:nvPr/>
-        </p:nvSpPr>
-        <p:spPr>
-          <a:xfrm>
-            <a:off x="2659466" y="2849074"/>
-            <a:ext cx="7022592" cy="1453149"/>
-          </a:xfrm>
-          <a:prstGeom prst="rect">
-            <a:avLst/>
-          </a:prstGeom>
-        </p:spPr>
-        <p:txBody>
-          <a:bodyPr vert="horz" lIns="91440" tIns="45720" rIns="91440" bIns="45720" rtlCol="0" anchor="ctr">
-            <a:normAutofit/>
-          </a:bodyPr>
-          <a:lstStyle>
-            <a:lvl1pPr algn="ctr" defTabSz="914400" rtl="0" eaLnBrk="1" latinLnBrk="0" hangingPunct="1">
-              <a:lnSpc>
-                <a:spcPct val="90000"/>
-              </a:lnSpc>
-              <a:spcBef>
-                <a:spcPct val="0"/>
-              </a:spcBef>
-              <a:buNone/>
-              <a:defRPr lang="en-US" sz="4800" b="1" kern="1200">
-                <a:solidFill>
-                  <a:schemeClr val="accent4">
-                    <a:lumMod val="75000"/>
-                  </a:schemeClr>
-                </a:solidFill>
-                <a:latin typeface="+mj-lt"/>
-                <a:ea typeface="+mn-ea"/>
-                <a:cs typeface="+mn-cs"/>
-              </a:defRPr>
-            </a:lvl1pPr>
-          </a:lstStyle>
-          <a:p>
-            <a:pPr fontAlgn="auto">
-              <a:spcAft>
-                <a:spcPts val="0"/>
-              </a:spcAft>
-            </a:pPr>
-            <a:r>
-              <a:rPr lang="en-US" sz="2800" dirty="0"/>
-              <a:t>After googling me, feel free to follow me on GitHub, LinkedIn, Twitter and other socials if you feel like.</a:t>
-            </a:r>
-          </a:p>
-        </p:txBody>
-      </p:sp>
-    </p:spTree>
-    <p:extLst>
-      <p:ext uri="{BB962C8B-B14F-4D97-AF65-F5344CB8AC3E}">
-        <p14:creationId xmlns:p14="http://schemas.microsoft.com/office/powerpoint/2010/main" val="3938073609"/>
       </p:ext>
     </p:extLst>
   </p:cSld>
@@ -9443,6 +11033,25 @@
 </file>
 
 <file path=customXml/item1.xml><?xml version="1.0" encoding="utf-8"?>
+<p:properties xmlns:p="http://schemas.microsoft.com/office/2006/metadata/properties" xmlns:xsi="http://www.w3.org/2001/XMLSchema-instance" xmlns:pc="http://schemas.microsoft.com/office/infopath/2007/PartnerControls">
+  <documentManagement>
+    <Status xmlns="71af3243-3dd4-4a8d-8c0d-dd76da1f02a5">Not started</Status>
+    <_ip_UnifiedCompliancePolicyUIAction xmlns="http://schemas.microsoft.com/sharepoint/v3" xsi:nil="true"/>
+    <Image xmlns="71af3243-3dd4-4a8d-8c0d-dd76da1f02a5">
+      <Url xsi:nil="true"/>
+      <Description xsi:nil="true"/>
+    </Image>
+    <_ip_UnifiedCompliancePolicyProperties xmlns="http://schemas.microsoft.com/sharepoint/v3" xsi:nil="true"/>
+    <lcf76f155ced4ddcb4097134ff3c332f xmlns="71af3243-3dd4-4a8d-8c0d-dd76da1f02a5">
+      <Terms xmlns="http://schemas.microsoft.com/office/infopath/2007/PartnerControls"/>
+    </lcf76f155ced4ddcb4097134ff3c332f>
+    <TaxCatchAll xmlns="230e9df3-be65-4c73-a93b-d1236ebd677e"/>
+    <MediaServiceKeyPoints xmlns="71af3243-3dd4-4a8d-8c0d-dd76da1f02a5" xsi:nil="true"/>
+  </documentManagement>
+</p:properties>
+</file>
+
+<file path=customXml/item2.xml><?xml version="1.0" encoding="utf-8"?>
 <ct:contentTypeSchema xmlns:ct="http://schemas.microsoft.com/office/2006/metadata/contentType" xmlns:ma="http://schemas.microsoft.com/office/2006/metadata/properties/metaAttributes" ct:_="" ma:_="" ma:contentTypeName="Document" ma:contentTypeID="0x01010079F111ED35F8CC479449609E8A0923A6" ma:contentTypeVersion="18" ma:contentTypeDescription="Create a new document." ma:contentTypeScope="" ma:versionID="22a266b9fa9a230c5a512669d8b298c3">
   <xsd:schema xmlns:xsd="http://www.w3.org/2001/XMLSchema" xmlns:xs="http://www.w3.org/2001/XMLSchema" xmlns:p="http://schemas.microsoft.com/office/2006/metadata/properties" xmlns:ns1="http://schemas.microsoft.com/sharepoint/v3" xmlns:ns2="71af3243-3dd4-4a8d-8c0d-dd76da1f02a5" xmlns:ns3="16c05727-aa75-4e4a-9b5f-8a80a1165891" xmlns:ns4="230e9df3-be65-4c73-a93b-d1236ebd677e" targetNamespace="http://schemas.microsoft.com/office/2006/metadata/properties" ma:root="true" ma:fieldsID="eddc33fff6b14141ee5c74a0d29ea6a1" ns1:_="" ns2:_="" ns3:_="" ns4:_="">
     <xsd:import namespace="http://schemas.microsoft.com/sharepoint/v3"/>
@@ -9718,25 +11327,6 @@
 </ct:contentTypeSchema>
 </file>
 
-<file path=customXml/item2.xml><?xml version="1.0" encoding="utf-8"?>
-<p:properties xmlns:p="http://schemas.microsoft.com/office/2006/metadata/properties" xmlns:xsi="http://www.w3.org/2001/XMLSchema-instance" xmlns:pc="http://schemas.microsoft.com/office/infopath/2007/PartnerControls">
-  <documentManagement>
-    <Status xmlns="71af3243-3dd4-4a8d-8c0d-dd76da1f02a5">Not started</Status>
-    <_ip_UnifiedCompliancePolicyUIAction xmlns="http://schemas.microsoft.com/sharepoint/v3" xsi:nil="true"/>
-    <Image xmlns="71af3243-3dd4-4a8d-8c0d-dd76da1f02a5">
-      <Url xsi:nil="true"/>
-      <Description xsi:nil="true"/>
-    </Image>
-    <_ip_UnifiedCompliancePolicyProperties xmlns="http://schemas.microsoft.com/sharepoint/v3" xsi:nil="true"/>
-    <lcf76f155ced4ddcb4097134ff3c332f xmlns="71af3243-3dd4-4a8d-8c0d-dd76da1f02a5">
-      <Terms xmlns="http://schemas.microsoft.com/office/infopath/2007/PartnerControls"/>
-    </lcf76f155ced4ddcb4097134ff3c332f>
-    <TaxCatchAll xmlns="230e9df3-be65-4c73-a93b-d1236ebd677e"/>
-    <MediaServiceKeyPoints xmlns="71af3243-3dd4-4a8d-8c0d-dd76da1f02a5" xsi:nil="true"/>
-  </documentManagement>
-</p:properties>
-</file>
-
 <file path=customXml/item3.xml><?xml version="1.0" encoding="utf-8"?>
 <?mso-contentType ?>
 <FormTemplates xmlns="http://schemas.microsoft.com/sharepoint/v3/contenttype/forms">
@@ -9747,6 +11337,18 @@
 </file>
 
 <file path=customXml/itemProps1.xml><?xml version="1.0" encoding="utf-8"?>
+<ds:datastoreItem xmlns:ds="http://schemas.openxmlformats.org/officeDocument/2006/customXml" ds:itemID="{4E18D074-6F3D-488C-8220-03C2DEFDE854}">
+  <ds:schemaRefs>
+    <ds:schemaRef ds:uri="http://schemas.microsoft.com/office/2006/metadata/properties"/>
+    <ds:schemaRef ds:uri="http://schemas.microsoft.com/office/infopath/2007/PartnerControls"/>
+    <ds:schemaRef ds:uri="71af3243-3dd4-4a8d-8c0d-dd76da1f02a5"/>
+    <ds:schemaRef ds:uri="http://schemas.microsoft.com/sharepoint/v3"/>
+    <ds:schemaRef ds:uri="230e9df3-be65-4c73-a93b-d1236ebd677e"/>
+  </ds:schemaRefs>
+</ds:datastoreItem>
+</file>
+
+<file path=customXml/itemProps2.xml><?xml version="1.0" encoding="utf-8"?>
 <ds:datastoreItem xmlns:ds="http://schemas.openxmlformats.org/officeDocument/2006/customXml" ds:itemID="{1D141EBB-3386-4164-A294-111C6309E33E}">
   <ds:schemaRefs>
     <ds:schemaRef ds:uri="http://schemas.microsoft.com/office/2006/metadata/contentType"/>
@@ -9767,18 +11369,6 @@
 </ds:datastoreItem>
 </file>
 
-<file path=customXml/itemProps2.xml><?xml version="1.0" encoding="utf-8"?>
-<ds:datastoreItem xmlns:ds="http://schemas.openxmlformats.org/officeDocument/2006/customXml" ds:itemID="{4E18D074-6F3D-488C-8220-03C2DEFDE854}">
-  <ds:schemaRefs>
-    <ds:schemaRef ds:uri="http://schemas.microsoft.com/office/2006/metadata/properties"/>
-    <ds:schemaRef ds:uri="http://schemas.microsoft.com/office/infopath/2007/PartnerControls"/>
-    <ds:schemaRef ds:uri="71af3243-3dd4-4a8d-8c0d-dd76da1f02a5"/>
-    <ds:schemaRef ds:uri="http://schemas.microsoft.com/sharepoint/v3"/>
-    <ds:schemaRef ds:uri="230e9df3-be65-4c73-a93b-d1236ebd677e"/>
-  </ds:schemaRefs>
-</ds:datastoreItem>
-</file>
-
 <file path=customXml/itemProps3.xml><?xml version="1.0" encoding="utf-8"?>
 <ds:datastoreItem xmlns:ds="http://schemas.openxmlformats.org/officeDocument/2006/customXml" ds:itemID="{0F9CE79C-5104-4273-B83B-D03AD839A8F7}">
   <ds:schemaRefs>

</xml_diff>

<commit_message>
wrapping up day 4
added homework

started with classes
</commit_message>
<xml_diff>
--- a/PresentationPPTPDFS/Day 3 Onwards - C Sharp Workshop Bucks College Group.pptx
+++ b/PresentationPPTPDFS/Day 3 Onwards - C Sharp Workshop Bucks College Group.pptx
@@ -5,10 +5,10 @@
     <p:sldMasterId id="2147483705" r:id="rId4"/>
   </p:sldMasterIdLst>
   <p:notesMasterIdLst>
-    <p:notesMasterId r:id="rId31"/>
+    <p:notesMasterId r:id="rId35"/>
   </p:notesMasterIdLst>
   <p:handoutMasterIdLst>
-    <p:handoutMasterId r:id="rId32"/>
+    <p:handoutMasterId r:id="rId36"/>
   </p:handoutMasterIdLst>
   <p:sldIdLst>
     <p:sldId id="1866" r:id="rId5"/>
@@ -35,8 +35,12 @@
     <p:sldId id="1897" r:id="rId26"/>
     <p:sldId id="1898" r:id="rId27"/>
     <p:sldId id="1884" r:id="rId28"/>
-    <p:sldId id="1875" r:id="rId29"/>
-    <p:sldId id="1876" r:id="rId30"/>
+    <p:sldId id="1899" r:id="rId29"/>
+    <p:sldId id="1900" r:id="rId30"/>
+    <p:sldId id="1901" r:id="rId31"/>
+    <p:sldId id="1902" r:id="rId32"/>
+    <p:sldId id="1875" r:id="rId33"/>
+    <p:sldId id="1876" r:id="rId34"/>
   </p:sldIdLst>
   <p:sldSz cx="12192000" cy="6858000"/>
   <p:notesSz cx="6858000" cy="9144000"/>
@@ -194,6 +198,10 @@
             <p14:sldId id="1897"/>
             <p14:sldId id="1898"/>
             <p14:sldId id="1884"/>
+            <p14:sldId id="1899"/>
+            <p14:sldId id="1900"/>
+            <p14:sldId id="1901"/>
+            <p14:sldId id="1902"/>
             <p14:sldId id="1875"/>
             <p14:sldId id="1876"/>
           </p14:sldIdLst>
@@ -506,7 +514,7 @@
           <a:p>
             <a:fld id="{148EE06D-E2C5-4DF1-B3C1-8E9169AAB10D}" type="datetimeFigureOut">
               <a:rPr lang="en-US" smtClean="0"/>
-              <a:t>6/20/2023</a:t>
+              <a:t>6/22/2023</a:t>
             </a:fld>
             <a:endParaRPr lang="en-US" dirty="0"/>
           </a:p>
@@ -1657,7 +1665,7 @@
             <a:fld id="{6DEB7EE2-04A2-4FB2-9625-C9C73AC4D32F}" type="slidenum">
               <a:rPr lang="en-US" altLang="en-US" smtClean="0"/>
               <a:pPr/>
-              <a:t>25</a:t>
+              <a:t>29</a:t>
             </a:fld>
             <a:endParaRPr lang="en-US" altLang="en-US" dirty="0"/>
           </a:p>
@@ -2284,7 +2292,7 @@
           <a:p>
             <a:fld id="{50A1B9BC-7BE7-4893-90FD-CC95830FD8F2}" type="datetimeFigureOut">
               <a:rPr lang="en-US" smtClean="0"/>
-              <a:t>6/20/2023</a:t>
+              <a:t>6/22/2023</a:t>
             </a:fld>
             <a:endParaRPr lang="en-US" dirty="0"/>
           </a:p>
@@ -4377,7 +4385,7 @@
             <a:fld id="{1D364696-E1F3-49EF-AEC8-730A16D9A23F}" type="datetimeFigureOut">
               <a:rPr lang="en-US" altLang="en-US" smtClean="0"/>
               <a:pPr/>
-              <a:t>6/20/2023</a:t>
+              <a:t>6/22/2023</a:t>
             </a:fld>
             <a:endParaRPr lang="en-US" altLang="en-US" dirty="0"/>
           </a:p>
@@ -6316,13 +6324,13 @@
   <p:clrMapOvr>
     <a:masterClrMapping/>
   </p:clrMapOvr>
-  <mc:AlternateContent xmlns:mc="http://schemas.openxmlformats.org/markup-compatibility/2006">
-    <mc:Choice xmlns:p14="http://schemas.microsoft.com/office/powerpoint/2010/main" Requires="p14">
+  <mc:AlternateContent xmlns:mc="http://schemas.openxmlformats.org/markup-compatibility/2006" xmlns:p14="http://schemas.microsoft.com/office/powerpoint/2010/main">
+    <mc:Choice Requires="p14">
       <p:transition spd="med" p14:dur="700">
         <p:fade/>
       </p:transition>
     </mc:Choice>
-    <mc:Fallback>
+    <mc:Fallback xmlns="">
       <p:transition spd="med">
         <p:fade/>
       </p:transition>
@@ -6518,13 +6526,13 @@
   <p:clrMapOvr>
     <a:masterClrMapping/>
   </p:clrMapOvr>
-  <mc:AlternateContent xmlns:mc="http://schemas.openxmlformats.org/markup-compatibility/2006">
-    <mc:Choice xmlns:p14="http://schemas.microsoft.com/office/powerpoint/2010/main" Requires="p14">
+  <mc:AlternateContent xmlns:mc="http://schemas.openxmlformats.org/markup-compatibility/2006" xmlns:p14="http://schemas.microsoft.com/office/powerpoint/2010/main">
+    <mc:Choice Requires="p14">
       <p:transition spd="med" p14:dur="700">
         <p:fade/>
       </p:transition>
     </mc:Choice>
-    <mc:Fallback>
+    <mc:Fallback xmlns="">
       <p:transition spd="med">
         <p:fade/>
       </p:transition>
@@ -6720,13 +6728,13 @@
   <p:clrMapOvr>
     <a:masterClrMapping/>
   </p:clrMapOvr>
-  <mc:AlternateContent xmlns:mc="http://schemas.openxmlformats.org/markup-compatibility/2006">
-    <mc:Choice xmlns:p14="http://schemas.microsoft.com/office/powerpoint/2010/main" Requires="p14">
+  <mc:AlternateContent xmlns:mc="http://schemas.openxmlformats.org/markup-compatibility/2006" xmlns:p14="http://schemas.microsoft.com/office/powerpoint/2010/main">
+    <mc:Choice Requires="p14">
       <p:transition spd="med" p14:dur="700">
         <p:fade/>
       </p:transition>
     </mc:Choice>
-    <mc:Fallback>
+    <mc:Fallback xmlns="">
       <p:transition spd="med">
         <p:fade/>
       </p:transition>
@@ -6922,13 +6930,13 @@
   <p:clrMapOvr>
     <a:masterClrMapping/>
   </p:clrMapOvr>
-  <mc:AlternateContent xmlns:mc="http://schemas.openxmlformats.org/markup-compatibility/2006">
-    <mc:Choice xmlns:p14="http://schemas.microsoft.com/office/powerpoint/2010/main" Requires="p14">
+  <mc:AlternateContent xmlns:mc="http://schemas.openxmlformats.org/markup-compatibility/2006" xmlns:p14="http://schemas.microsoft.com/office/powerpoint/2010/main">
+    <mc:Choice Requires="p14">
       <p:transition spd="med" p14:dur="700">
         <p:fade/>
       </p:transition>
     </mc:Choice>
-    <mc:Fallback>
+    <mc:Fallback xmlns="">
       <p:transition spd="med">
         <p:fade/>
       </p:transition>
@@ -7358,13 +7366,13 @@
   <p:clrMapOvr>
     <a:masterClrMapping/>
   </p:clrMapOvr>
-  <mc:AlternateContent xmlns:mc="http://schemas.openxmlformats.org/markup-compatibility/2006">
-    <mc:Choice xmlns:p14="http://schemas.microsoft.com/office/powerpoint/2010/main" Requires="p14">
+  <mc:AlternateContent xmlns:mc="http://schemas.openxmlformats.org/markup-compatibility/2006" xmlns:p14="http://schemas.microsoft.com/office/powerpoint/2010/main">
+    <mc:Choice Requires="p14">
       <p:transition spd="med" p14:dur="700">
         <p:fade/>
       </p:transition>
     </mc:Choice>
-    <mc:Fallback>
+    <mc:Fallback xmlns="">
       <p:transition spd="med">
         <p:fade/>
       </p:transition>
@@ -7585,13 +7593,13 @@
   <p:clrMapOvr>
     <a:masterClrMapping/>
   </p:clrMapOvr>
-  <mc:AlternateContent xmlns:mc="http://schemas.openxmlformats.org/markup-compatibility/2006">
-    <mc:Choice xmlns:p14="http://schemas.microsoft.com/office/powerpoint/2010/main" Requires="p14">
+  <mc:AlternateContent xmlns:mc="http://schemas.openxmlformats.org/markup-compatibility/2006" xmlns:p14="http://schemas.microsoft.com/office/powerpoint/2010/main">
+    <mc:Choice Requires="p14">
       <p:transition spd="med" p14:dur="700">
         <p:fade/>
       </p:transition>
     </mc:Choice>
-    <mc:Fallback>
+    <mc:Fallback xmlns="">
       <p:transition spd="med">
         <p:fade/>
       </p:transition>
@@ -7773,13 +7781,13 @@
   <p:clrMapOvr>
     <a:masterClrMapping/>
   </p:clrMapOvr>
-  <mc:AlternateContent xmlns:mc="http://schemas.openxmlformats.org/markup-compatibility/2006">
-    <mc:Choice xmlns:p14="http://schemas.microsoft.com/office/powerpoint/2010/main" Requires="p14">
+  <mc:AlternateContent xmlns:mc="http://schemas.openxmlformats.org/markup-compatibility/2006" xmlns:p14="http://schemas.microsoft.com/office/powerpoint/2010/main">
+    <mc:Choice Requires="p14">
       <p:transition spd="med" p14:dur="700">
         <p:fade/>
       </p:transition>
     </mc:Choice>
-    <mc:Fallback>
+    <mc:Fallback xmlns="">
       <p:transition spd="med">
         <p:fade/>
       </p:transition>
@@ -7961,13 +7969,13 @@
   <p:clrMapOvr>
     <a:masterClrMapping/>
   </p:clrMapOvr>
-  <mc:AlternateContent xmlns:mc="http://schemas.openxmlformats.org/markup-compatibility/2006">
-    <mc:Choice xmlns:p14="http://schemas.microsoft.com/office/powerpoint/2010/main" Requires="p14">
+  <mc:AlternateContent xmlns:mc="http://schemas.openxmlformats.org/markup-compatibility/2006" xmlns:p14="http://schemas.microsoft.com/office/powerpoint/2010/main">
+    <mc:Choice Requires="p14">
       <p:transition spd="med" p14:dur="700">
         <p:fade/>
       </p:transition>
     </mc:Choice>
-    <mc:Fallback>
+    <mc:Fallback xmlns="">
       <p:transition spd="med">
         <p:fade/>
       </p:transition>
@@ -8196,6 +8204,14 @@
 <file path=ppt/slides/slide25.xml><?xml version="1.0" encoding="utf-8"?>
 <p:sld xmlns:a="http://schemas.openxmlformats.org/drawingml/2006/main" xmlns:r="http://schemas.openxmlformats.org/officeDocument/2006/relationships" xmlns:p="http://schemas.openxmlformats.org/presentationml/2006/main">
   <p:cSld>
+    <p:bg>
+      <p:bgPr>
+        <a:solidFill>
+          <a:schemeClr val="accent3"/>
+        </a:solidFill>
+        <a:effectLst/>
+      </p:bgPr>
+    </p:bg>
     <p:spTree>
       <p:nvGrpSpPr>
         <p:cNvPr id="1" name=""/>
@@ -8212,10 +8228,10 @@
       </p:grpSpPr>
       <p:sp>
         <p:nvSpPr>
-          <p:cNvPr id="4" name="Title 3">
-            <a:extLst>
-              <a:ext uri="{FF2B5EF4-FFF2-40B4-BE49-F238E27FC236}">
-                <a16:creationId xmlns:a16="http://schemas.microsoft.com/office/drawing/2014/main" id="{068DF32A-D165-40DA-AAE8-A6E9579E2F79}"/>
+          <p:cNvPr id="5" name="Title 4">
+            <a:extLst>
+              <a:ext uri="{FF2B5EF4-FFF2-40B4-BE49-F238E27FC236}">
+                <a16:creationId xmlns:a16="http://schemas.microsoft.com/office/drawing/2014/main" id="{E8C5EA60-12FC-4FB7-9CED-CDC28177F4B1}"/>
               </a:ext>
             </a:extLst>
           </p:cNvPr>
@@ -8226,43 +8242,24 @@
             <p:ph type="title"/>
           </p:nvPr>
         </p:nvSpPr>
-        <p:spPr>
-          <a:xfrm>
-            <a:off x="1525301" y="615241"/>
-            <a:ext cx="9141397" cy="615553"/>
-          </a:xfrm>
-        </p:spPr>
+        <p:spPr/>
         <p:txBody>
           <a:bodyPr/>
           <a:lstStyle/>
           <a:p>
             <a:r>
               <a:rPr lang="en-US" dirty="0"/>
-              <a:t>Questions </a:t>
-            </a:r>
-            <a:r>
-              <a:rPr lang="en-US" dirty="0">
-                <a:solidFill>
-                  <a:schemeClr val="accent4">
-                    <a:lumMod val="50000"/>
-                  </a:schemeClr>
-                </a:solidFill>
-              </a:rPr>
-              <a:t>&amp;</a:t>
-            </a:r>
-            <a:r>
-              <a:rPr lang="en-US" dirty="0"/>
-              <a:t> answers</a:t>
-            </a:r>
-          </a:p>
-        </p:txBody>
-      </p:sp>
-      <p:sp>
-        <p:nvSpPr>
-          <p:cNvPr id="7" name="Text Placeholder 6">
-            <a:extLst>
-              <a:ext uri="{FF2B5EF4-FFF2-40B4-BE49-F238E27FC236}">
-                <a16:creationId xmlns:a16="http://schemas.microsoft.com/office/drawing/2014/main" id="{C3BC92DE-1779-4A44-AED9-0261C2497DD9}"/>
+              <a:t>Day 4 : Object Oriented Programming</a:t>
+            </a:r>
+          </a:p>
+        </p:txBody>
+      </p:sp>
+      <p:sp>
+        <p:nvSpPr>
+          <p:cNvPr id="2" name="Text Placeholder 1">
+            <a:extLst>
+              <a:ext uri="{FF2B5EF4-FFF2-40B4-BE49-F238E27FC236}">
+                <a16:creationId xmlns:a16="http://schemas.microsoft.com/office/drawing/2014/main" id="{3F36812B-2065-4A2B-B59B-8957022687BC}"/>
               </a:ext>
             </a:extLst>
           </p:cNvPr>
@@ -8270,118 +8267,88 @@
             <a:spLocks noGrp="1"/>
           </p:cNvSpPr>
           <p:nvPr>
-            <p:ph type="body" sz="quarter" idx="12"/>
+            <p:ph type="body" sz="quarter" idx="11"/>
           </p:nvPr>
         </p:nvSpPr>
         <p:spPr>
           <a:xfrm>
-            <a:off x="2101416" y="1733829"/>
-            <a:ext cx="7799387" cy="3899220"/>
-          </a:xfrm>
-        </p:spPr>
-        <p:txBody>
-          <a:bodyPr/>
+            <a:off x="762000" y="1905000"/>
+            <a:ext cx="6477000" cy="3276600"/>
+          </a:xfrm>
+        </p:spPr>
+        <p:txBody>
+          <a:bodyPr vert="horz" lIns="91440" tIns="45720" rIns="91440" bIns="45720" rtlCol="0" anchor="t">
+            <a:normAutofit/>
+          </a:bodyPr>
           <a:lstStyle/>
           <a:p>
-            <a:r>
-              <a:rPr lang="en-US" altLang="en-US" sz="2800" dirty="0">
-                <a:solidFill>
-                  <a:schemeClr val="accent4">
-                    <a:lumMod val="50000"/>
-                  </a:schemeClr>
-                </a:solidFill>
-              </a:rPr>
-              <a:t>Ask any questions you have folks. Thanks.</a:t>
-            </a:r>
-          </a:p>
-          <a:p>
-            <a:endParaRPr lang="en-US" altLang="en-US" sz="2800" dirty="0">
-              <a:solidFill>
-                <a:schemeClr val="accent4">
-                  <a:lumMod val="50000"/>
-                </a:schemeClr>
-              </a:solidFill>
-            </a:endParaRPr>
-          </a:p>
-          <a:p>
-            <a:r>
-              <a:rPr lang="en-US" altLang="en-US" sz="2800" dirty="0">
-                <a:solidFill>
-                  <a:schemeClr val="accent4">
-                    <a:lumMod val="50000"/>
-                  </a:schemeClr>
-                </a:solidFill>
-              </a:rPr>
-              <a:t>Important Note: I have a “Discussion Forum” setup on GitHub. You (and anybody in the world, really) can ask questions about C Sharp on this open-source forum. </a:t>
-            </a:r>
-          </a:p>
-          <a:p>
-            <a:endParaRPr lang="en-US" altLang="en-US" sz="2800" dirty="0">
-              <a:solidFill>
-                <a:schemeClr val="accent4">
-                  <a:lumMod val="50000"/>
-                </a:schemeClr>
-              </a:solidFill>
-            </a:endParaRPr>
-          </a:p>
-          <a:p>
-            <a:r>
-              <a:rPr lang="en-US" altLang="en-US" sz="2800" dirty="0">
-                <a:solidFill>
-                  <a:schemeClr val="accent4">
-                    <a:lumMod val="50000"/>
-                  </a:schemeClr>
-                </a:solidFill>
-              </a:rPr>
-              <a:t>Discussion Forum Link: </a:t>
-            </a:r>
-            <a:r>
-              <a:rPr lang="en-US" altLang="en-US" sz="2800" dirty="0">
-                <a:solidFill>
-                  <a:srgbClr val="00B0F0"/>
-                </a:solidFill>
-                <a:hlinkClick r:id="rId3">
-                  <a:extLst>
-                    <a:ext uri="{A12FA001-AC4F-418D-AE19-62706E023703}">
-                      <ahyp:hlinkClr xmlns:ahyp="http://schemas.microsoft.com/office/drawing/2018/hyperlinkcolor" val="tx"/>
-                    </a:ext>
-                  </a:extLst>
-                </a:hlinkClick>
-              </a:rPr>
-              <a:t>https://github.com/Jay-study-nildana/CSharpForStudents/discussions</a:t>
-            </a:r>
-            <a:endParaRPr lang="en-US" altLang="en-US" sz="2800" dirty="0">
-              <a:solidFill>
-                <a:srgbClr val="00B0F0"/>
-              </a:solidFill>
-            </a:endParaRPr>
-          </a:p>
-          <a:p>
-            <a:endParaRPr lang="en-US" altLang="en-US" sz="2800" dirty="0">
-              <a:solidFill>
-                <a:schemeClr val="accent4">
-                  <a:lumMod val="50000"/>
-                </a:schemeClr>
-              </a:solidFill>
-            </a:endParaRPr>
-          </a:p>
-          <a:p>
-            <a:endParaRPr lang="en-US" sz="2800" dirty="0">
-              <a:solidFill>
-                <a:schemeClr val="accent4">
-                  <a:lumMod val="50000"/>
-                </a:schemeClr>
-              </a:solidFill>
-            </a:endParaRPr>
-          </a:p>
-        </p:txBody>
-      </p:sp>
-      <p:sp>
-        <p:nvSpPr>
-          <p:cNvPr id="2" name="TextBox 1">
-            <a:extLst>
-              <a:ext uri="{FF2B5EF4-FFF2-40B4-BE49-F238E27FC236}">
-                <a16:creationId xmlns:a16="http://schemas.microsoft.com/office/drawing/2014/main" id="{25DAA477-06A5-446C-5921-E2D4851F613A}"/>
+            <a:pPr marL="285750" indent="-285750">
+              <a:buFont typeface="Arial" panose="020B0604020202020204" pitchFamily="34" charset="0"/>
+              <a:buChar char="•"/>
+            </a:pPr>
+            <a:r>
+              <a:rPr lang="en-US" altLang="en-US" sz="2400" dirty="0"/>
+              <a:t>OOPS</a:t>
+            </a:r>
+          </a:p>
+          <a:p>
+            <a:pPr marL="285750" indent="-285750">
+              <a:buFont typeface="Arial" panose="020B0604020202020204" pitchFamily="34" charset="0"/>
+              <a:buChar char="•"/>
+            </a:pPr>
+            <a:r>
+              <a:rPr lang="en-US" altLang="en-US" sz="2400" dirty="0"/>
+              <a:t>Types (Variable Types)</a:t>
+            </a:r>
+          </a:p>
+          <a:p>
+            <a:pPr marL="285750" indent="-285750">
+              <a:buFont typeface="Arial" panose="020B0604020202020204" pitchFamily="34" charset="0"/>
+              <a:buChar char="•"/>
+            </a:pPr>
+            <a:r>
+              <a:rPr lang="en-US" altLang="en-US" sz="2400" dirty="0"/>
+              <a:t>Data Type</a:t>
+            </a:r>
+          </a:p>
+          <a:p>
+            <a:pPr marL="285750" indent="-285750">
+              <a:buFont typeface="Arial" panose="020B0604020202020204" pitchFamily="34" charset="0"/>
+              <a:buChar char="•"/>
+            </a:pPr>
+            <a:r>
+              <a:rPr lang="en-US" altLang="en-US" sz="2400" dirty="0"/>
+              <a:t>Setters and Getters </a:t>
+            </a:r>
+          </a:p>
+          <a:p>
+            <a:pPr marL="285750" indent="-285750">
+              <a:buFont typeface="Arial" panose="020B0604020202020204" pitchFamily="34" charset="0"/>
+              <a:buChar char="•"/>
+            </a:pPr>
+            <a:r>
+              <a:rPr lang="en-US" altLang="en-US" sz="2400" dirty="0"/>
+              <a:t>Data aka Variables aka Properties</a:t>
+            </a:r>
+          </a:p>
+          <a:p>
+            <a:pPr marL="285750" indent="-285750">
+              <a:buFont typeface="Arial" panose="020B0604020202020204" pitchFamily="34" charset="0"/>
+              <a:buChar char="•"/>
+            </a:pPr>
+            <a:r>
+              <a:rPr lang="en-US" altLang="en-US" sz="2400" dirty="0"/>
+              <a:t>Constructor</a:t>
+            </a:r>
+          </a:p>
+        </p:txBody>
+      </p:sp>
+      <p:sp>
+        <p:nvSpPr>
+          <p:cNvPr id="3" name="TextBox 2">
+            <a:extLst>
+              <a:ext uri="{FF2B5EF4-FFF2-40B4-BE49-F238E27FC236}">
+                <a16:creationId xmlns:a16="http://schemas.microsoft.com/office/drawing/2014/main" id="{25F00EF3-70C3-32DB-02AF-51455AB20D6F}"/>
               </a:ext>
             </a:extLst>
           </p:cNvPr>
@@ -8405,11 +8372,7 @@
           <a:lstStyle/>
           <a:p>
             <a:r>
-              <a:rPr lang="en-US" sz="1200" dirty="0">
-                <a:solidFill>
-                  <a:schemeClr val="bg2"/>
-                </a:solidFill>
-              </a:rPr>
+              <a:rPr lang="en-US" sz="1200" dirty="0"/>
               <a:t>C Sharp Workshop for Bucks College Group</a:t>
             </a:r>
           </a:p>
@@ -8417,10 +8380,10 @@
       </p:sp>
       <p:sp>
         <p:nvSpPr>
-          <p:cNvPr id="3" name="TextBox 2">
-            <a:extLst>
-              <a:ext uri="{FF2B5EF4-FFF2-40B4-BE49-F238E27FC236}">
-                <a16:creationId xmlns:a16="http://schemas.microsoft.com/office/drawing/2014/main" id="{9BDF811F-255D-A91F-FD44-D4EDA9D20914}"/>
+          <p:cNvPr id="4" name="TextBox 3">
+            <a:extLst>
+              <a:ext uri="{FF2B5EF4-FFF2-40B4-BE49-F238E27FC236}">
+                <a16:creationId xmlns:a16="http://schemas.microsoft.com/office/drawing/2014/main" id="{49E4D80E-8AAB-6C00-1319-EA17C69A7EDE}"/>
               </a:ext>
             </a:extLst>
           </p:cNvPr>
@@ -8444,11 +8407,7 @@
           <a:lstStyle/>
           <a:p>
             <a:r>
-              <a:rPr lang="en-US" sz="1200" dirty="0">
-                <a:solidFill>
-                  <a:schemeClr val="bg2"/>
-                </a:solidFill>
-              </a:rPr>
+              <a:rPr lang="en-US" sz="1200" dirty="0"/>
               <a:t>Programming Tutor: Jay (Vijayasimha BR)</a:t>
             </a:r>
           </a:p>
@@ -8457,20 +8416,20 @@
     </p:spTree>
     <p:extLst>
       <p:ext uri="{BB962C8B-B14F-4D97-AF65-F5344CB8AC3E}">
-        <p14:creationId xmlns:p14="http://schemas.microsoft.com/office/powerpoint/2010/main" val="3828224163"/>
+        <p14:creationId xmlns:p14="http://schemas.microsoft.com/office/powerpoint/2010/main" val="365425487"/>
       </p:ext>
     </p:extLst>
   </p:cSld>
   <p:clrMapOvr>
     <a:masterClrMapping/>
   </p:clrMapOvr>
-  <mc:AlternateContent xmlns:mc="http://schemas.openxmlformats.org/markup-compatibility/2006" xmlns:p14="http://schemas.microsoft.com/office/powerpoint/2010/main">
-    <mc:Choice Requires="p14">
+  <mc:AlternateContent xmlns:mc="http://schemas.openxmlformats.org/markup-compatibility/2006">
+    <mc:Choice xmlns:p14="http://schemas.microsoft.com/office/powerpoint/2010/main" Requires="p14">
       <p:transition spd="med" p14:dur="700">
         <p:fade/>
       </p:transition>
     </mc:Choice>
-    <mc:Fallback xmlns="">
+    <mc:Fallback>
       <p:transition spd="med">
         <p:fade/>
       </p:transition>
@@ -8480,6 +8439,604 @@
 </file>
 
 <file path=ppt/slides/slide26.xml><?xml version="1.0" encoding="utf-8"?>
+<p:sld xmlns:a="http://schemas.openxmlformats.org/drawingml/2006/main" xmlns:r="http://schemas.openxmlformats.org/officeDocument/2006/relationships" xmlns:p="http://schemas.openxmlformats.org/presentationml/2006/main">
+  <p:cSld>
+    <p:bg>
+      <p:bgPr>
+        <a:solidFill>
+          <a:schemeClr val="accent3"/>
+        </a:solidFill>
+        <a:effectLst/>
+      </p:bgPr>
+    </p:bg>
+    <p:spTree>
+      <p:nvGrpSpPr>
+        <p:cNvPr id="1" name=""/>
+        <p:cNvGrpSpPr/>
+        <p:nvPr/>
+      </p:nvGrpSpPr>
+      <p:grpSpPr>
+        <a:xfrm>
+          <a:off x="0" y="0"/>
+          <a:ext cx="0" cy="0"/>
+          <a:chOff x="0" y="0"/>
+          <a:chExt cx="0" cy="0"/>
+        </a:xfrm>
+      </p:grpSpPr>
+      <p:sp>
+        <p:nvSpPr>
+          <p:cNvPr id="5" name="Title 4">
+            <a:extLst>
+              <a:ext uri="{FF2B5EF4-FFF2-40B4-BE49-F238E27FC236}">
+                <a16:creationId xmlns:a16="http://schemas.microsoft.com/office/drawing/2014/main" id="{E8C5EA60-12FC-4FB7-9CED-CDC28177F4B1}"/>
+              </a:ext>
+            </a:extLst>
+          </p:cNvPr>
+          <p:cNvSpPr>
+            <a:spLocks noGrp="1"/>
+          </p:cNvSpPr>
+          <p:nvPr>
+            <p:ph type="title"/>
+          </p:nvPr>
+        </p:nvSpPr>
+        <p:spPr/>
+        <p:txBody>
+          <a:bodyPr/>
+          <a:lstStyle/>
+          <a:p>
+            <a:r>
+              <a:rPr lang="en-US" dirty="0"/>
+              <a:t>Movie</a:t>
+            </a:r>
+          </a:p>
+        </p:txBody>
+      </p:sp>
+      <p:sp>
+        <p:nvSpPr>
+          <p:cNvPr id="2" name="Text Placeholder 1">
+            <a:extLst>
+              <a:ext uri="{FF2B5EF4-FFF2-40B4-BE49-F238E27FC236}">
+                <a16:creationId xmlns:a16="http://schemas.microsoft.com/office/drawing/2014/main" id="{3F36812B-2065-4A2B-B59B-8957022687BC}"/>
+              </a:ext>
+            </a:extLst>
+          </p:cNvPr>
+          <p:cNvSpPr>
+            <a:spLocks noGrp="1"/>
+          </p:cNvSpPr>
+          <p:nvPr>
+            <p:ph type="body" sz="quarter" idx="11"/>
+          </p:nvPr>
+        </p:nvSpPr>
+        <p:spPr>
+          <a:xfrm>
+            <a:off x="762000" y="1905000"/>
+            <a:ext cx="6477000" cy="3276600"/>
+          </a:xfrm>
+        </p:spPr>
+        <p:txBody>
+          <a:bodyPr vert="horz" lIns="91440" tIns="45720" rIns="91440" bIns="45720" rtlCol="0" anchor="t">
+            <a:normAutofit/>
+          </a:bodyPr>
+          <a:lstStyle/>
+          <a:p>
+            <a:pPr marL="285750" indent="-285750">
+              <a:buFont typeface="Arial" panose="020B0604020202020204" pitchFamily="34" charset="0"/>
+              <a:buChar char="•"/>
+            </a:pPr>
+            <a:r>
+              <a:rPr lang="en-US" altLang="en-US" sz="2400" dirty="0"/>
+              <a:t>Title (String)</a:t>
+            </a:r>
+          </a:p>
+          <a:p>
+            <a:pPr marL="285750" indent="-285750">
+              <a:buFont typeface="Arial" panose="020B0604020202020204" pitchFamily="34" charset="0"/>
+              <a:buChar char="•"/>
+            </a:pPr>
+            <a:r>
+              <a:rPr lang="en-US" altLang="en-US" sz="2400" dirty="0"/>
+              <a:t>Language  (String)</a:t>
+            </a:r>
+          </a:p>
+          <a:p>
+            <a:pPr marL="285750" indent="-285750">
+              <a:buFont typeface="Arial" panose="020B0604020202020204" pitchFamily="34" charset="0"/>
+              <a:buChar char="•"/>
+            </a:pPr>
+            <a:r>
+              <a:rPr lang="en-US" altLang="en-US" sz="2400" dirty="0"/>
+              <a:t>Director (String)</a:t>
+            </a:r>
+          </a:p>
+          <a:p>
+            <a:pPr marL="285750" indent="-285750">
+              <a:buFont typeface="Arial" panose="020B0604020202020204" pitchFamily="34" charset="0"/>
+              <a:buChar char="•"/>
+            </a:pPr>
+            <a:r>
+              <a:rPr lang="en-US" altLang="en-US" sz="2400" dirty="0"/>
+              <a:t>Actors and Actresses (Collection/Arrays/Lists)</a:t>
+            </a:r>
+          </a:p>
+          <a:p>
+            <a:pPr marL="285750" indent="-285750">
+              <a:buFont typeface="Arial" panose="020B0604020202020204" pitchFamily="34" charset="0"/>
+              <a:buChar char="•"/>
+            </a:pPr>
+            <a:r>
+              <a:rPr lang="en-US" altLang="en-US" sz="2400" dirty="0"/>
+              <a:t>Year of Release (int)</a:t>
+            </a:r>
+          </a:p>
+          <a:p>
+            <a:pPr marL="285750" indent="-285750">
+              <a:buFont typeface="Arial" panose="020B0604020202020204" pitchFamily="34" charset="0"/>
+              <a:buChar char="•"/>
+            </a:pPr>
+            <a:endParaRPr lang="en-US" altLang="en-US" sz="2400" dirty="0"/>
+          </a:p>
+        </p:txBody>
+      </p:sp>
+      <p:sp>
+        <p:nvSpPr>
+          <p:cNvPr id="3" name="TextBox 2">
+            <a:extLst>
+              <a:ext uri="{FF2B5EF4-FFF2-40B4-BE49-F238E27FC236}">
+                <a16:creationId xmlns:a16="http://schemas.microsoft.com/office/drawing/2014/main" id="{25F00EF3-70C3-32DB-02AF-51455AB20D6F}"/>
+              </a:ext>
+            </a:extLst>
+          </p:cNvPr>
+          <p:cNvSpPr txBox="1"/>
+          <p:nvPr/>
+        </p:nvSpPr>
+        <p:spPr>
+          <a:xfrm>
+            <a:off x="569343" y="6142039"/>
+            <a:ext cx="3226279" cy="276999"/>
+          </a:xfrm>
+          <a:prstGeom prst="rect">
+            <a:avLst/>
+          </a:prstGeom>
+          <a:noFill/>
+        </p:spPr>
+        <p:txBody>
+          <a:bodyPr wrap="square" rtlCol="0">
+            <a:spAutoFit/>
+          </a:bodyPr>
+          <a:lstStyle/>
+          <a:p>
+            <a:r>
+              <a:rPr lang="en-US" sz="1200" dirty="0"/>
+              <a:t>C Sharp Workshop for Bucks College Group</a:t>
+            </a:r>
+          </a:p>
+        </p:txBody>
+      </p:sp>
+      <p:sp>
+        <p:nvSpPr>
+          <p:cNvPr id="4" name="TextBox 3">
+            <a:extLst>
+              <a:ext uri="{FF2B5EF4-FFF2-40B4-BE49-F238E27FC236}">
+                <a16:creationId xmlns:a16="http://schemas.microsoft.com/office/drawing/2014/main" id="{49E4D80E-8AAB-6C00-1319-EA17C69A7EDE}"/>
+              </a:ext>
+            </a:extLst>
+          </p:cNvPr>
+          <p:cNvSpPr txBox="1"/>
+          <p:nvPr/>
+        </p:nvSpPr>
+        <p:spPr>
+          <a:xfrm>
+            <a:off x="8589034" y="6143024"/>
+            <a:ext cx="3226279" cy="276999"/>
+          </a:xfrm>
+          <a:prstGeom prst="rect">
+            <a:avLst/>
+          </a:prstGeom>
+          <a:noFill/>
+        </p:spPr>
+        <p:txBody>
+          <a:bodyPr wrap="square" rtlCol="0">
+            <a:spAutoFit/>
+          </a:bodyPr>
+          <a:lstStyle/>
+          <a:p>
+            <a:r>
+              <a:rPr lang="en-US" sz="1200" dirty="0"/>
+              <a:t>Programming Tutor: Jay (Vijayasimha BR)</a:t>
+            </a:r>
+          </a:p>
+        </p:txBody>
+      </p:sp>
+    </p:spTree>
+    <p:extLst>
+      <p:ext uri="{BB962C8B-B14F-4D97-AF65-F5344CB8AC3E}">
+        <p14:creationId xmlns:p14="http://schemas.microsoft.com/office/powerpoint/2010/main" val="3813906580"/>
+      </p:ext>
+    </p:extLst>
+  </p:cSld>
+  <p:clrMapOvr>
+    <a:masterClrMapping/>
+  </p:clrMapOvr>
+  <mc:AlternateContent xmlns:mc="http://schemas.openxmlformats.org/markup-compatibility/2006">
+    <mc:Choice xmlns:p14="http://schemas.microsoft.com/office/powerpoint/2010/main" Requires="p14">
+      <p:transition spd="med" p14:dur="700">
+        <p:fade/>
+      </p:transition>
+    </mc:Choice>
+    <mc:Fallback>
+      <p:transition spd="med">
+        <p:fade/>
+      </p:transition>
+    </mc:Fallback>
+  </mc:AlternateContent>
+</p:sld>
+</file>
+
+<file path=ppt/slides/slide27.xml><?xml version="1.0" encoding="utf-8"?>
+<p:sld xmlns:a="http://schemas.openxmlformats.org/drawingml/2006/main" xmlns:r="http://schemas.openxmlformats.org/officeDocument/2006/relationships" xmlns:p="http://schemas.openxmlformats.org/presentationml/2006/main">
+  <p:cSld>
+    <p:bg>
+      <p:bgPr>
+        <a:solidFill>
+          <a:schemeClr val="accent3"/>
+        </a:solidFill>
+        <a:effectLst/>
+      </p:bgPr>
+    </p:bg>
+    <p:spTree>
+      <p:nvGrpSpPr>
+        <p:cNvPr id="1" name=""/>
+        <p:cNvGrpSpPr/>
+        <p:nvPr/>
+      </p:nvGrpSpPr>
+      <p:grpSpPr>
+        <a:xfrm>
+          <a:off x="0" y="0"/>
+          <a:ext cx="0" cy="0"/>
+          <a:chOff x="0" y="0"/>
+          <a:chExt cx="0" cy="0"/>
+        </a:xfrm>
+      </p:grpSpPr>
+      <p:sp>
+        <p:nvSpPr>
+          <p:cNvPr id="2" name="Text Placeholder 1">
+            <a:extLst>
+              <a:ext uri="{FF2B5EF4-FFF2-40B4-BE49-F238E27FC236}">
+                <a16:creationId xmlns:a16="http://schemas.microsoft.com/office/drawing/2014/main" id="{3F36812B-2065-4A2B-B59B-8957022687BC}"/>
+              </a:ext>
+            </a:extLst>
+          </p:cNvPr>
+          <p:cNvSpPr>
+            <a:spLocks noGrp="1"/>
+          </p:cNvSpPr>
+          <p:nvPr>
+            <p:ph type="body" sz="quarter" idx="11"/>
+          </p:nvPr>
+        </p:nvSpPr>
+        <p:spPr>
+          <a:xfrm>
+            <a:off x="2332008" y="1526875"/>
+            <a:ext cx="7666008" cy="4198189"/>
+          </a:xfrm>
+        </p:spPr>
+        <p:txBody>
+          <a:bodyPr vert="horz" lIns="91440" tIns="45720" rIns="91440" bIns="45720" rtlCol="0" anchor="t">
+            <a:normAutofit/>
+          </a:bodyPr>
+          <a:lstStyle/>
+          <a:p>
+            <a:pPr marL="285750" indent="-285750">
+              <a:buFont typeface="Arial" panose="020B0604020202020204" pitchFamily="34" charset="0"/>
+              <a:buChar char="•"/>
+            </a:pPr>
+            <a:r>
+              <a:rPr lang="en-US" altLang="en-US" sz="2400" dirty="0"/>
+              <a:t> public class Movie</a:t>
+            </a:r>
+          </a:p>
+          <a:p>
+            <a:pPr marL="285750" indent="-285750">
+              <a:buFont typeface="Arial" panose="020B0604020202020204" pitchFamily="34" charset="0"/>
+              <a:buChar char="•"/>
+            </a:pPr>
+            <a:r>
+              <a:rPr lang="en-US" altLang="en-US" sz="2400" dirty="0"/>
+              <a:t>    {</a:t>
+            </a:r>
+          </a:p>
+          <a:p>
+            <a:pPr marL="285750" indent="-285750">
+              <a:buFont typeface="Arial" panose="020B0604020202020204" pitchFamily="34" charset="0"/>
+              <a:buChar char="•"/>
+            </a:pPr>
+            <a:r>
+              <a:rPr lang="en-US" altLang="en-US" sz="2400" dirty="0"/>
+              <a:t>        public string </a:t>
+            </a:r>
+            <a:r>
+              <a:rPr lang="en-US" altLang="en-US" sz="2400" dirty="0" err="1"/>
+              <a:t>MovieTitle</a:t>
+            </a:r>
+            <a:r>
+              <a:rPr lang="en-US" altLang="en-US" sz="2400" dirty="0"/>
+              <a:t> { get; set; }</a:t>
+            </a:r>
+          </a:p>
+          <a:p>
+            <a:pPr marL="285750" indent="-285750">
+              <a:buFont typeface="Arial" panose="020B0604020202020204" pitchFamily="34" charset="0"/>
+              <a:buChar char="•"/>
+            </a:pPr>
+            <a:r>
+              <a:rPr lang="en-US" altLang="en-US" sz="2400" dirty="0"/>
+              <a:t>    }</a:t>
+            </a:r>
+          </a:p>
+        </p:txBody>
+      </p:sp>
+      <p:sp>
+        <p:nvSpPr>
+          <p:cNvPr id="3" name="TextBox 2">
+            <a:extLst>
+              <a:ext uri="{FF2B5EF4-FFF2-40B4-BE49-F238E27FC236}">
+                <a16:creationId xmlns:a16="http://schemas.microsoft.com/office/drawing/2014/main" id="{25F00EF3-70C3-32DB-02AF-51455AB20D6F}"/>
+              </a:ext>
+            </a:extLst>
+          </p:cNvPr>
+          <p:cNvSpPr txBox="1"/>
+          <p:nvPr/>
+        </p:nvSpPr>
+        <p:spPr>
+          <a:xfrm>
+            <a:off x="569343" y="6142039"/>
+            <a:ext cx="3226279" cy="276999"/>
+          </a:xfrm>
+          <a:prstGeom prst="rect">
+            <a:avLst/>
+          </a:prstGeom>
+          <a:noFill/>
+        </p:spPr>
+        <p:txBody>
+          <a:bodyPr wrap="square" rtlCol="0">
+            <a:spAutoFit/>
+          </a:bodyPr>
+          <a:lstStyle/>
+          <a:p>
+            <a:r>
+              <a:rPr lang="en-US" sz="1200" dirty="0"/>
+              <a:t>C Sharp Workshop for Bucks College Group</a:t>
+            </a:r>
+          </a:p>
+        </p:txBody>
+      </p:sp>
+      <p:sp>
+        <p:nvSpPr>
+          <p:cNvPr id="4" name="TextBox 3">
+            <a:extLst>
+              <a:ext uri="{FF2B5EF4-FFF2-40B4-BE49-F238E27FC236}">
+                <a16:creationId xmlns:a16="http://schemas.microsoft.com/office/drawing/2014/main" id="{49E4D80E-8AAB-6C00-1319-EA17C69A7EDE}"/>
+              </a:ext>
+            </a:extLst>
+          </p:cNvPr>
+          <p:cNvSpPr txBox="1"/>
+          <p:nvPr/>
+        </p:nvSpPr>
+        <p:spPr>
+          <a:xfrm>
+            <a:off x="8589034" y="6143024"/>
+            <a:ext cx="3226279" cy="276999"/>
+          </a:xfrm>
+          <a:prstGeom prst="rect">
+            <a:avLst/>
+          </a:prstGeom>
+          <a:noFill/>
+        </p:spPr>
+        <p:txBody>
+          <a:bodyPr wrap="square" rtlCol="0">
+            <a:spAutoFit/>
+          </a:bodyPr>
+          <a:lstStyle/>
+          <a:p>
+            <a:r>
+              <a:rPr lang="en-US" sz="1200" dirty="0"/>
+              <a:t>Programming Tutor: Jay (Vijayasimha BR)</a:t>
+            </a:r>
+          </a:p>
+        </p:txBody>
+      </p:sp>
+    </p:spTree>
+    <p:extLst>
+      <p:ext uri="{BB962C8B-B14F-4D97-AF65-F5344CB8AC3E}">
+        <p14:creationId xmlns:p14="http://schemas.microsoft.com/office/powerpoint/2010/main" val="2314386744"/>
+      </p:ext>
+    </p:extLst>
+  </p:cSld>
+  <p:clrMapOvr>
+    <a:masterClrMapping/>
+  </p:clrMapOvr>
+  <mc:AlternateContent xmlns:mc="http://schemas.openxmlformats.org/markup-compatibility/2006">
+    <mc:Choice xmlns:p14="http://schemas.microsoft.com/office/powerpoint/2010/main" Requires="p14">
+      <p:transition spd="med" p14:dur="700">
+        <p:fade/>
+      </p:transition>
+    </mc:Choice>
+    <mc:Fallback>
+      <p:transition spd="med">
+        <p:fade/>
+      </p:transition>
+    </mc:Fallback>
+  </mc:AlternateContent>
+</p:sld>
+</file>
+
+<file path=ppt/slides/slide28.xml><?xml version="1.0" encoding="utf-8"?>
+<p:sld xmlns:a="http://schemas.openxmlformats.org/drawingml/2006/main" xmlns:r="http://schemas.openxmlformats.org/officeDocument/2006/relationships" xmlns:p="http://schemas.openxmlformats.org/presentationml/2006/main">
+  <p:cSld>
+    <p:bg>
+      <p:bgPr>
+        <a:solidFill>
+          <a:schemeClr val="accent3"/>
+        </a:solidFill>
+        <a:effectLst/>
+      </p:bgPr>
+    </p:bg>
+    <p:spTree>
+      <p:nvGrpSpPr>
+        <p:cNvPr id="1" name=""/>
+        <p:cNvGrpSpPr/>
+        <p:nvPr/>
+      </p:nvGrpSpPr>
+      <p:grpSpPr>
+        <a:xfrm>
+          <a:off x="0" y="0"/>
+          <a:ext cx="0" cy="0"/>
+          <a:chOff x="0" y="0"/>
+          <a:chExt cx="0" cy="0"/>
+        </a:xfrm>
+      </p:grpSpPr>
+      <p:sp>
+        <p:nvSpPr>
+          <p:cNvPr id="2" name="Text Placeholder 1">
+            <a:extLst>
+              <a:ext uri="{FF2B5EF4-FFF2-40B4-BE49-F238E27FC236}">
+                <a16:creationId xmlns:a16="http://schemas.microsoft.com/office/drawing/2014/main" id="{3F36812B-2065-4A2B-B59B-8957022687BC}"/>
+              </a:ext>
+            </a:extLst>
+          </p:cNvPr>
+          <p:cNvSpPr>
+            <a:spLocks noGrp="1"/>
+          </p:cNvSpPr>
+          <p:nvPr>
+            <p:ph type="body" sz="quarter" idx="11"/>
+          </p:nvPr>
+        </p:nvSpPr>
+        <p:spPr>
+          <a:xfrm>
+            <a:off x="923026" y="879894"/>
+            <a:ext cx="7666008" cy="4198189"/>
+          </a:xfrm>
+        </p:spPr>
+        <p:txBody>
+          <a:bodyPr vert="horz" lIns="91440" tIns="45720" rIns="91440" bIns="45720" rtlCol="0" anchor="t">
+            <a:normAutofit/>
+          </a:bodyPr>
+          <a:lstStyle/>
+          <a:p>
+            <a:pPr marL="285750" indent="-285750">
+              <a:buFont typeface="Arial" panose="020B0604020202020204" pitchFamily="34" charset="0"/>
+              <a:buChar char="•"/>
+            </a:pPr>
+            <a:r>
+              <a:rPr lang="en-US" altLang="en-US" sz="4400" dirty="0"/>
+              <a:t>Movie </a:t>
+            </a:r>
+            <a:r>
+              <a:rPr lang="en-US" altLang="en-US" sz="4400" dirty="0" err="1"/>
+              <a:t>firstmovie</a:t>
+            </a:r>
+            <a:r>
+              <a:rPr lang="en-US" altLang="en-US" sz="4400" dirty="0"/>
+              <a:t> = new Movie();</a:t>
+            </a:r>
+          </a:p>
+        </p:txBody>
+      </p:sp>
+      <p:sp>
+        <p:nvSpPr>
+          <p:cNvPr id="3" name="TextBox 2">
+            <a:extLst>
+              <a:ext uri="{FF2B5EF4-FFF2-40B4-BE49-F238E27FC236}">
+                <a16:creationId xmlns:a16="http://schemas.microsoft.com/office/drawing/2014/main" id="{25F00EF3-70C3-32DB-02AF-51455AB20D6F}"/>
+              </a:ext>
+            </a:extLst>
+          </p:cNvPr>
+          <p:cNvSpPr txBox="1"/>
+          <p:nvPr/>
+        </p:nvSpPr>
+        <p:spPr>
+          <a:xfrm>
+            <a:off x="569343" y="6142039"/>
+            <a:ext cx="3226279" cy="276999"/>
+          </a:xfrm>
+          <a:prstGeom prst="rect">
+            <a:avLst/>
+          </a:prstGeom>
+          <a:noFill/>
+        </p:spPr>
+        <p:txBody>
+          <a:bodyPr wrap="square" rtlCol="0">
+            <a:spAutoFit/>
+          </a:bodyPr>
+          <a:lstStyle/>
+          <a:p>
+            <a:r>
+              <a:rPr lang="en-US" sz="1200" dirty="0"/>
+              <a:t>C Sharp Workshop for Bucks College Group</a:t>
+            </a:r>
+          </a:p>
+        </p:txBody>
+      </p:sp>
+      <p:sp>
+        <p:nvSpPr>
+          <p:cNvPr id="4" name="TextBox 3">
+            <a:extLst>
+              <a:ext uri="{FF2B5EF4-FFF2-40B4-BE49-F238E27FC236}">
+                <a16:creationId xmlns:a16="http://schemas.microsoft.com/office/drawing/2014/main" id="{49E4D80E-8AAB-6C00-1319-EA17C69A7EDE}"/>
+              </a:ext>
+            </a:extLst>
+          </p:cNvPr>
+          <p:cNvSpPr txBox="1"/>
+          <p:nvPr/>
+        </p:nvSpPr>
+        <p:spPr>
+          <a:xfrm>
+            <a:off x="8589034" y="6143024"/>
+            <a:ext cx="3226279" cy="276999"/>
+          </a:xfrm>
+          <a:prstGeom prst="rect">
+            <a:avLst/>
+          </a:prstGeom>
+          <a:noFill/>
+        </p:spPr>
+        <p:txBody>
+          <a:bodyPr wrap="square" rtlCol="0">
+            <a:spAutoFit/>
+          </a:bodyPr>
+          <a:lstStyle/>
+          <a:p>
+            <a:r>
+              <a:rPr lang="en-US" sz="1200" dirty="0"/>
+              <a:t>Programming Tutor: Jay (Vijayasimha BR)</a:t>
+            </a:r>
+          </a:p>
+        </p:txBody>
+      </p:sp>
+    </p:spTree>
+    <p:extLst>
+      <p:ext uri="{BB962C8B-B14F-4D97-AF65-F5344CB8AC3E}">
+        <p14:creationId xmlns:p14="http://schemas.microsoft.com/office/powerpoint/2010/main" val="334967142"/>
+      </p:ext>
+    </p:extLst>
+  </p:cSld>
+  <p:clrMapOvr>
+    <a:masterClrMapping/>
+  </p:clrMapOvr>
+  <mc:AlternateContent xmlns:mc="http://schemas.openxmlformats.org/markup-compatibility/2006">
+    <mc:Choice xmlns:p14="http://schemas.microsoft.com/office/powerpoint/2010/main" Requires="p14">
+      <p:transition spd="med" p14:dur="700">
+        <p:fade/>
+      </p:transition>
+    </mc:Choice>
+    <mc:Fallback>
+      <p:transition spd="med">
+        <p:fade/>
+      </p:transition>
+    </mc:Fallback>
+  </mc:AlternateContent>
+</p:sld>
+</file>
+
+<file path=ppt/slides/slide29.xml><?xml version="1.0" encoding="utf-8"?>
 <p:sld xmlns:a="http://schemas.openxmlformats.org/drawingml/2006/main" xmlns:r="http://schemas.openxmlformats.org/officeDocument/2006/relationships" xmlns:p="http://schemas.openxmlformats.org/presentationml/2006/main">
   <p:cSld>
     <p:spTree>
@@ -8498,10 +9055,10 @@
       </p:grpSpPr>
       <p:sp>
         <p:nvSpPr>
-          <p:cNvPr id="5" name="Title 4">
-            <a:extLst>
-              <a:ext uri="{FF2B5EF4-FFF2-40B4-BE49-F238E27FC236}">
-                <a16:creationId xmlns:a16="http://schemas.microsoft.com/office/drawing/2014/main" id="{99769EF9-1612-42F9-BB93-658619D321FF}"/>
+          <p:cNvPr id="4" name="Title 3">
+            <a:extLst>
+              <a:ext uri="{FF2B5EF4-FFF2-40B4-BE49-F238E27FC236}">
+                <a16:creationId xmlns:a16="http://schemas.microsoft.com/office/drawing/2014/main" id="{068DF32A-D165-40DA-AAE8-A6E9579E2F79}"/>
               </a:ext>
             </a:extLst>
           </p:cNvPr>
@@ -8512,28 +9069,43 @@
             <p:ph type="title"/>
           </p:nvPr>
         </p:nvSpPr>
-        <p:spPr/>
+        <p:spPr>
+          <a:xfrm>
+            <a:off x="1525301" y="615241"/>
+            <a:ext cx="9141397" cy="615553"/>
+          </a:xfrm>
+        </p:spPr>
         <p:txBody>
           <a:bodyPr/>
           <a:lstStyle/>
           <a:p>
             <a:r>
               <a:rPr lang="en-US" dirty="0"/>
-              <a:t>Resources</a:t>
-            </a:r>
-            <a:br>
+              <a:t>Questions </a:t>
+            </a:r>
+            <a:r>
+              <a:rPr lang="en-US" dirty="0">
+                <a:solidFill>
+                  <a:schemeClr val="accent4">
+                    <a:lumMod val="50000"/>
+                  </a:schemeClr>
+                </a:solidFill>
+              </a:rPr>
+              <a:t>&amp;</a:t>
+            </a:r>
+            <a:r>
               <a:rPr lang="en-US" dirty="0"/>
-            </a:br>
-            <a:endParaRPr lang="en-US" dirty="0"/>
-          </a:p>
-        </p:txBody>
-      </p:sp>
-      <p:sp>
-        <p:nvSpPr>
-          <p:cNvPr id="3" name="Text Placeholder 2">
-            <a:extLst>
-              <a:ext uri="{FF2B5EF4-FFF2-40B4-BE49-F238E27FC236}">
-                <a16:creationId xmlns:a16="http://schemas.microsoft.com/office/drawing/2014/main" id="{D3316BC9-7937-4417-B232-1B37F4796011}"/>
+              <a:t> answers</a:t>
+            </a:r>
+          </a:p>
+        </p:txBody>
+      </p:sp>
+      <p:sp>
+        <p:nvSpPr>
+          <p:cNvPr id="7" name="Text Placeholder 6">
+            <a:extLst>
+              <a:ext uri="{FF2B5EF4-FFF2-40B4-BE49-F238E27FC236}">
+                <a16:creationId xmlns:a16="http://schemas.microsoft.com/office/drawing/2014/main" id="{C3BC92DE-1779-4A44-AED9-0261C2497DD9}"/>
               </a:ext>
             </a:extLst>
           </p:cNvPr>
@@ -8541,67 +9113,147 @@
             <a:spLocks noGrp="1"/>
           </p:cNvSpPr>
           <p:nvPr>
-            <p:ph type="body" sz="quarter" idx="11"/>
+            <p:ph type="body" sz="quarter" idx="12"/>
           </p:nvPr>
         </p:nvSpPr>
         <p:spPr>
           <a:xfrm>
-            <a:off x="4457700" y="1905000"/>
-            <a:ext cx="7219043" cy="3276600"/>
-          </a:xfrm>
-        </p:spPr>
-        <p:txBody>
-          <a:bodyPr>
-            <a:normAutofit/>
-          </a:bodyPr>
+            <a:off x="2101416" y="1733829"/>
+            <a:ext cx="7799387" cy="3899220"/>
+          </a:xfrm>
+        </p:spPr>
+        <p:txBody>
+          <a:bodyPr/>
           <a:lstStyle/>
           <a:p>
             <a:r>
-              <a:rPr lang="en-US" altLang="en-US" dirty="0"/>
-              <a:t>List the resources you used for your research:</a:t>
-            </a:r>
-          </a:p>
-          <a:p>
-            <a:pPr lvl="1"/>
-            <a:r>
-              <a:rPr lang="fr-FR" dirty="0">
-                <a:hlinkClick r:id="rId2"/>
+              <a:rPr lang="en-US" altLang="en-US" sz="2800" dirty="0">
+                <a:solidFill>
+                  <a:schemeClr val="accent4">
+                    <a:lumMod val="50000"/>
+                  </a:schemeClr>
+                </a:solidFill>
               </a:rPr>
-              <a:t>https://github.com/Jay-study-nildana/CSharpWorkShopforBucksCollegeGroup</a:t>
-            </a:r>
-            <a:endParaRPr lang="fr-FR" dirty="0"/>
-          </a:p>
-          <a:p>
-            <a:pPr lvl="1"/>
-            <a:r>
-              <a:rPr lang="fr-FR" dirty="0">
-                <a:hlinkClick r:id="rId3"/>
+              <a:t>Ask any questions you have folks. Thanks.</a:t>
+            </a:r>
+          </a:p>
+          <a:p>
+            <a:endParaRPr lang="en-US" altLang="en-US" sz="2800" dirty="0">
+              <a:solidFill>
+                <a:schemeClr val="accent4">
+                  <a:lumMod val="50000"/>
+                </a:schemeClr>
+              </a:solidFill>
+            </a:endParaRPr>
+          </a:p>
+          <a:p>
+            <a:r>
+              <a:rPr lang="en-US" altLang="en-US" sz="2800" dirty="0">
+                <a:solidFill>
+                  <a:schemeClr val="accent4">
+                    <a:lumMod val="50000"/>
+                  </a:schemeClr>
+                </a:solidFill>
               </a:rPr>
-              <a:t>https://github.com/Jay-study-nildana/CSharpForStudents</a:t>
-            </a:r>
-            <a:endParaRPr lang="fr-FR" dirty="0"/>
-          </a:p>
-          <a:p>
-            <a:pPr lvl="1"/>
-            <a:r>
-              <a:rPr lang="fr-FR" dirty="0" err="1"/>
-              <a:t>Other</a:t>
-            </a:r>
-            <a:r>
-              <a:rPr lang="fr-FR" dirty="0"/>
-              <a:t> Notes Come </a:t>
-            </a:r>
-            <a:r>
-              <a:rPr lang="fr-FR" dirty="0" err="1"/>
-              <a:t>Here</a:t>
-            </a:r>
-            <a:r>
-              <a:rPr lang="fr-FR" dirty="0"/>
-              <a:t>.</a:t>
-            </a:r>
-          </a:p>
-          <a:p>
-            <a:endParaRPr lang="en-US" dirty="0"/>
+              <a:t>Important Note: I have a “Discussion Forum” setup on GitHub. You (and anybody in the world, really) can ask questions about C Sharp on this open-source forum. </a:t>
+            </a:r>
+          </a:p>
+          <a:p>
+            <a:endParaRPr lang="en-US" altLang="en-US" sz="2800" dirty="0">
+              <a:solidFill>
+                <a:schemeClr val="accent4">
+                  <a:lumMod val="50000"/>
+                </a:schemeClr>
+              </a:solidFill>
+            </a:endParaRPr>
+          </a:p>
+          <a:p>
+            <a:r>
+              <a:rPr lang="en-US" altLang="en-US" sz="2800" dirty="0">
+                <a:solidFill>
+                  <a:schemeClr val="accent4">
+                    <a:lumMod val="50000"/>
+                  </a:schemeClr>
+                </a:solidFill>
+              </a:rPr>
+              <a:t>Discord : </a:t>
+            </a:r>
+            <a:r>
+              <a:rPr lang="en-US" altLang="en-US" sz="2800" dirty="0" err="1">
+                <a:solidFill>
+                  <a:schemeClr val="accent4">
+                    <a:lumMod val="50000"/>
+                  </a:schemeClr>
+                </a:solidFill>
+              </a:rPr>
+              <a:t>jay_hismanyhobbies</a:t>
+            </a:r>
+            <a:endParaRPr lang="en-US" altLang="en-US" sz="2800" dirty="0">
+              <a:solidFill>
+                <a:schemeClr val="accent4">
+                  <a:lumMod val="50000"/>
+                </a:schemeClr>
+              </a:solidFill>
+            </a:endParaRPr>
+          </a:p>
+          <a:p>
+            <a:endParaRPr lang="en-US" altLang="en-US" sz="2800" dirty="0">
+              <a:solidFill>
+                <a:schemeClr val="accent4">
+                  <a:lumMod val="50000"/>
+                </a:schemeClr>
+              </a:solidFill>
+            </a:endParaRPr>
+          </a:p>
+          <a:p>
+            <a:r>
+              <a:rPr lang="en-US" altLang="en-US" sz="2800" dirty="0">
+                <a:solidFill>
+                  <a:schemeClr val="accent4">
+                    <a:lumMod val="50000"/>
+                  </a:schemeClr>
+                </a:solidFill>
+              </a:rPr>
+              <a:t>Discussion Forum Link: </a:t>
+            </a:r>
+            <a:r>
+              <a:rPr lang="en-US" altLang="en-US" sz="2800" dirty="0">
+                <a:solidFill>
+                  <a:srgbClr val="00B0F0"/>
+                </a:solidFill>
+                <a:hlinkClick r:id="rId3">
+                  <a:extLst>
+                    <a:ext uri="{A12FA001-AC4F-418D-AE19-62706E023703}">
+                      <ahyp:hlinkClr xmlns:ahyp="http://schemas.microsoft.com/office/drawing/2018/hyperlinkcolor" val="tx"/>
+                    </a:ext>
+                  </a:extLst>
+                </a:hlinkClick>
+              </a:rPr>
+              <a:t>https://github.com/Jay-study-nildana/CSharpForStudents/discussions</a:t>
+            </a:r>
+            <a:endParaRPr lang="en-US" altLang="en-US" sz="2800" dirty="0">
+              <a:solidFill>
+                <a:srgbClr val="00B0F0"/>
+              </a:solidFill>
+            </a:endParaRPr>
+          </a:p>
+          <a:p>
+            <a:endParaRPr lang="en-US" altLang="en-US" sz="2800" dirty="0">
+              <a:solidFill>
+                <a:schemeClr val="accent4">
+                  <a:lumMod val="50000"/>
+                </a:schemeClr>
+              </a:solidFill>
+            </a:endParaRPr>
+          </a:p>
+          <a:p>
+            <a:endParaRPr lang="en-US" sz="2800" dirty="0">
+              <a:solidFill>
+                <a:schemeClr val="accent4">
+                  <a:lumMod val="50000"/>
+                </a:schemeClr>
+              </a:solidFill>
+            </a:endParaRPr>
           </a:p>
         </p:txBody>
       </p:sp>
@@ -8610,7 +9262,7 @@
           <p:cNvPr id="2" name="TextBox 1">
             <a:extLst>
               <a:ext uri="{FF2B5EF4-FFF2-40B4-BE49-F238E27FC236}">
-                <a16:creationId xmlns:a16="http://schemas.microsoft.com/office/drawing/2014/main" id="{0794AE3F-9283-1E1C-144E-269122D1B03E}"/>
+                <a16:creationId xmlns:a16="http://schemas.microsoft.com/office/drawing/2014/main" id="{25DAA477-06A5-446C-5921-E2D4851F613A}"/>
               </a:ext>
             </a:extLst>
           </p:cNvPr>
@@ -8646,10 +9298,10 @@
       </p:sp>
       <p:sp>
         <p:nvSpPr>
-          <p:cNvPr id="4" name="TextBox 3">
-            <a:extLst>
-              <a:ext uri="{FF2B5EF4-FFF2-40B4-BE49-F238E27FC236}">
-                <a16:creationId xmlns:a16="http://schemas.microsoft.com/office/drawing/2014/main" id="{3EA72714-4D65-A7AA-26FE-DF15FC135B07}"/>
+          <p:cNvPr id="3" name="TextBox 2">
+            <a:extLst>
+              <a:ext uri="{FF2B5EF4-FFF2-40B4-BE49-F238E27FC236}">
+                <a16:creationId xmlns:a16="http://schemas.microsoft.com/office/drawing/2014/main" id="{9BDF811F-255D-A91F-FD44-D4EDA9D20914}"/>
               </a:ext>
             </a:extLst>
           </p:cNvPr>
@@ -8686,7 +9338,7 @@
     </p:spTree>
     <p:extLst>
       <p:ext uri="{BB962C8B-B14F-4D97-AF65-F5344CB8AC3E}">
-        <p14:creationId xmlns:p14="http://schemas.microsoft.com/office/powerpoint/2010/main" val="1236220360"/>
+        <p14:creationId xmlns:p14="http://schemas.microsoft.com/office/powerpoint/2010/main" val="3828224163"/>
       </p:ext>
     </p:extLst>
   </p:cSld>
@@ -8911,6 +9563,235 @@
     <p:extLst>
       <p:ext uri="{BB962C8B-B14F-4D97-AF65-F5344CB8AC3E}">
         <p14:creationId xmlns:p14="http://schemas.microsoft.com/office/powerpoint/2010/main" val="3174066405"/>
+      </p:ext>
+    </p:extLst>
+  </p:cSld>
+  <p:clrMapOvr>
+    <a:masterClrMapping/>
+  </p:clrMapOvr>
+  <mc:AlternateContent xmlns:mc="http://schemas.openxmlformats.org/markup-compatibility/2006" xmlns:p14="http://schemas.microsoft.com/office/powerpoint/2010/main">
+    <mc:Choice Requires="p14">
+      <p:transition spd="med" p14:dur="700">
+        <p:fade/>
+      </p:transition>
+    </mc:Choice>
+    <mc:Fallback xmlns="">
+      <p:transition spd="med">
+        <p:fade/>
+      </p:transition>
+    </mc:Fallback>
+  </mc:AlternateContent>
+</p:sld>
+</file>
+
+<file path=ppt/slides/slide30.xml><?xml version="1.0" encoding="utf-8"?>
+<p:sld xmlns:a="http://schemas.openxmlformats.org/drawingml/2006/main" xmlns:r="http://schemas.openxmlformats.org/officeDocument/2006/relationships" xmlns:p="http://schemas.openxmlformats.org/presentationml/2006/main">
+  <p:cSld>
+    <p:spTree>
+      <p:nvGrpSpPr>
+        <p:cNvPr id="1" name=""/>
+        <p:cNvGrpSpPr/>
+        <p:nvPr/>
+      </p:nvGrpSpPr>
+      <p:grpSpPr>
+        <a:xfrm>
+          <a:off x="0" y="0"/>
+          <a:ext cx="0" cy="0"/>
+          <a:chOff x="0" y="0"/>
+          <a:chExt cx="0" cy="0"/>
+        </a:xfrm>
+      </p:grpSpPr>
+      <p:sp>
+        <p:nvSpPr>
+          <p:cNvPr id="5" name="Title 4">
+            <a:extLst>
+              <a:ext uri="{FF2B5EF4-FFF2-40B4-BE49-F238E27FC236}">
+                <a16:creationId xmlns:a16="http://schemas.microsoft.com/office/drawing/2014/main" id="{99769EF9-1612-42F9-BB93-658619D321FF}"/>
+              </a:ext>
+            </a:extLst>
+          </p:cNvPr>
+          <p:cNvSpPr>
+            <a:spLocks noGrp="1"/>
+          </p:cNvSpPr>
+          <p:nvPr>
+            <p:ph type="title"/>
+          </p:nvPr>
+        </p:nvSpPr>
+        <p:spPr/>
+        <p:txBody>
+          <a:bodyPr/>
+          <a:lstStyle/>
+          <a:p>
+            <a:r>
+              <a:rPr lang="en-US" dirty="0"/>
+              <a:t>Resources</a:t>
+            </a:r>
+            <a:br>
+              <a:rPr lang="en-US" dirty="0"/>
+            </a:br>
+            <a:endParaRPr lang="en-US" dirty="0"/>
+          </a:p>
+        </p:txBody>
+      </p:sp>
+      <p:sp>
+        <p:nvSpPr>
+          <p:cNvPr id="3" name="Text Placeholder 2">
+            <a:extLst>
+              <a:ext uri="{FF2B5EF4-FFF2-40B4-BE49-F238E27FC236}">
+                <a16:creationId xmlns:a16="http://schemas.microsoft.com/office/drawing/2014/main" id="{D3316BC9-7937-4417-B232-1B37F4796011}"/>
+              </a:ext>
+            </a:extLst>
+          </p:cNvPr>
+          <p:cNvSpPr>
+            <a:spLocks noGrp="1"/>
+          </p:cNvSpPr>
+          <p:nvPr>
+            <p:ph type="body" sz="quarter" idx="11"/>
+          </p:nvPr>
+        </p:nvSpPr>
+        <p:spPr>
+          <a:xfrm>
+            <a:off x="4457700" y="1905000"/>
+            <a:ext cx="7219043" cy="3276600"/>
+          </a:xfrm>
+        </p:spPr>
+        <p:txBody>
+          <a:bodyPr>
+            <a:normAutofit/>
+          </a:bodyPr>
+          <a:lstStyle/>
+          <a:p>
+            <a:r>
+              <a:rPr lang="en-US" altLang="en-US" dirty="0"/>
+              <a:t>List the resources you used for your research:</a:t>
+            </a:r>
+          </a:p>
+          <a:p>
+            <a:pPr lvl="1"/>
+            <a:r>
+              <a:rPr lang="fr-FR" dirty="0">
+                <a:hlinkClick r:id="rId2"/>
+              </a:rPr>
+              <a:t>https://github.com/Jay-study-nildana/CSharpWorkShopforBucksCollegeGroup</a:t>
+            </a:r>
+            <a:endParaRPr lang="fr-FR" dirty="0"/>
+          </a:p>
+          <a:p>
+            <a:pPr lvl="1"/>
+            <a:r>
+              <a:rPr lang="fr-FR" dirty="0">
+                <a:hlinkClick r:id="rId3"/>
+              </a:rPr>
+              <a:t>https://github.com/Jay-study-nildana/CSharpForStudents</a:t>
+            </a:r>
+            <a:endParaRPr lang="fr-FR" dirty="0"/>
+          </a:p>
+          <a:p>
+            <a:pPr lvl="1"/>
+            <a:r>
+              <a:rPr lang="fr-FR" dirty="0" err="1"/>
+              <a:t>Other</a:t>
+            </a:r>
+            <a:r>
+              <a:rPr lang="fr-FR" dirty="0"/>
+              <a:t> Notes Come </a:t>
+            </a:r>
+            <a:r>
+              <a:rPr lang="fr-FR" dirty="0" err="1"/>
+              <a:t>Here</a:t>
+            </a:r>
+            <a:r>
+              <a:rPr lang="fr-FR" dirty="0"/>
+              <a:t>.</a:t>
+            </a:r>
+          </a:p>
+          <a:p>
+            <a:endParaRPr lang="en-US" dirty="0"/>
+          </a:p>
+        </p:txBody>
+      </p:sp>
+      <p:sp>
+        <p:nvSpPr>
+          <p:cNvPr id="2" name="TextBox 1">
+            <a:extLst>
+              <a:ext uri="{FF2B5EF4-FFF2-40B4-BE49-F238E27FC236}">
+                <a16:creationId xmlns:a16="http://schemas.microsoft.com/office/drawing/2014/main" id="{0794AE3F-9283-1E1C-144E-269122D1B03E}"/>
+              </a:ext>
+            </a:extLst>
+          </p:cNvPr>
+          <p:cNvSpPr txBox="1"/>
+          <p:nvPr/>
+        </p:nvSpPr>
+        <p:spPr>
+          <a:xfrm>
+            <a:off x="569343" y="6142039"/>
+            <a:ext cx="3226279" cy="276999"/>
+          </a:xfrm>
+          <a:prstGeom prst="rect">
+            <a:avLst/>
+          </a:prstGeom>
+          <a:noFill/>
+        </p:spPr>
+        <p:txBody>
+          <a:bodyPr wrap="square" rtlCol="0">
+            <a:spAutoFit/>
+          </a:bodyPr>
+          <a:lstStyle/>
+          <a:p>
+            <a:r>
+              <a:rPr lang="en-US" sz="1200" dirty="0">
+                <a:solidFill>
+                  <a:schemeClr val="bg2"/>
+                </a:solidFill>
+              </a:rPr>
+              <a:t>C Sharp Workshop for Bucks College Group</a:t>
+            </a:r>
+          </a:p>
+        </p:txBody>
+      </p:sp>
+      <p:sp>
+        <p:nvSpPr>
+          <p:cNvPr id="4" name="TextBox 3">
+            <a:extLst>
+              <a:ext uri="{FF2B5EF4-FFF2-40B4-BE49-F238E27FC236}">
+                <a16:creationId xmlns:a16="http://schemas.microsoft.com/office/drawing/2014/main" id="{3EA72714-4D65-A7AA-26FE-DF15FC135B07}"/>
+              </a:ext>
+            </a:extLst>
+          </p:cNvPr>
+          <p:cNvSpPr txBox="1"/>
+          <p:nvPr/>
+        </p:nvSpPr>
+        <p:spPr>
+          <a:xfrm>
+            <a:off x="8589034" y="6143024"/>
+            <a:ext cx="3226279" cy="276999"/>
+          </a:xfrm>
+          <a:prstGeom prst="rect">
+            <a:avLst/>
+          </a:prstGeom>
+          <a:noFill/>
+        </p:spPr>
+        <p:txBody>
+          <a:bodyPr wrap="square" rtlCol="0">
+            <a:spAutoFit/>
+          </a:bodyPr>
+          <a:lstStyle/>
+          <a:p>
+            <a:r>
+              <a:rPr lang="en-US" sz="1200" dirty="0">
+                <a:solidFill>
+                  <a:schemeClr val="bg2"/>
+                </a:solidFill>
+              </a:rPr>
+              <a:t>Programming Tutor: Jay (Vijayasimha BR)</a:t>
+            </a:r>
+          </a:p>
+        </p:txBody>
+      </p:sp>
+    </p:spTree>
+    <p:extLst>
+      <p:ext uri="{BB962C8B-B14F-4D97-AF65-F5344CB8AC3E}">
+        <p14:creationId xmlns:p14="http://schemas.microsoft.com/office/powerpoint/2010/main" val="1236220360"/>
       </p:ext>
     </p:extLst>
   </p:cSld>
@@ -11033,25 +11914,6 @@
 </file>
 
 <file path=customXml/item1.xml><?xml version="1.0" encoding="utf-8"?>
-<p:properties xmlns:p="http://schemas.microsoft.com/office/2006/metadata/properties" xmlns:xsi="http://www.w3.org/2001/XMLSchema-instance" xmlns:pc="http://schemas.microsoft.com/office/infopath/2007/PartnerControls">
-  <documentManagement>
-    <Status xmlns="71af3243-3dd4-4a8d-8c0d-dd76da1f02a5">Not started</Status>
-    <_ip_UnifiedCompliancePolicyUIAction xmlns="http://schemas.microsoft.com/sharepoint/v3" xsi:nil="true"/>
-    <Image xmlns="71af3243-3dd4-4a8d-8c0d-dd76da1f02a5">
-      <Url xsi:nil="true"/>
-      <Description xsi:nil="true"/>
-    </Image>
-    <_ip_UnifiedCompliancePolicyProperties xmlns="http://schemas.microsoft.com/sharepoint/v3" xsi:nil="true"/>
-    <lcf76f155ced4ddcb4097134ff3c332f xmlns="71af3243-3dd4-4a8d-8c0d-dd76da1f02a5">
-      <Terms xmlns="http://schemas.microsoft.com/office/infopath/2007/PartnerControls"/>
-    </lcf76f155ced4ddcb4097134ff3c332f>
-    <TaxCatchAll xmlns="230e9df3-be65-4c73-a93b-d1236ebd677e"/>
-    <MediaServiceKeyPoints xmlns="71af3243-3dd4-4a8d-8c0d-dd76da1f02a5" xsi:nil="true"/>
-  </documentManagement>
-</p:properties>
-</file>
-
-<file path=customXml/item2.xml><?xml version="1.0" encoding="utf-8"?>
 <ct:contentTypeSchema xmlns:ct="http://schemas.microsoft.com/office/2006/metadata/contentType" xmlns:ma="http://schemas.microsoft.com/office/2006/metadata/properties/metaAttributes" ct:_="" ma:_="" ma:contentTypeName="Document" ma:contentTypeID="0x01010079F111ED35F8CC479449609E8A0923A6" ma:contentTypeVersion="18" ma:contentTypeDescription="Create a new document." ma:contentTypeScope="" ma:versionID="22a266b9fa9a230c5a512669d8b298c3">
   <xsd:schema xmlns:xsd="http://www.w3.org/2001/XMLSchema" xmlns:xs="http://www.w3.org/2001/XMLSchema" xmlns:p="http://schemas.microsoft.com/office/2006/metadata/properties" xmlns:ns1="http://schemas.microsoft.com/sharepoint/v3" xmlns:ns2="71af3243-3dd4-4a8d-8c0d-dd76da1f02a5" xmlns:ns3="16c05727-aa75-4e4a-9b5f-8a80a1165891" xmlns:ns4="230e9df3-be65-4c73-a93b-d1236ebd677e" targetNamespace="http://schemas.microsoft.com/office/2006/metadata/properties" ma:root="true" ma:fieldsID="eddc33fff6b14141ee5c74a0d29ea6a1" ns1:_="" ns2:_="" ns3:_="" ns4:_="">
     <xsd:import namespace="http://schemas.microsoft.com/sharepoint/v3"/>
@@ -11327,6 +12189,25 @@
 </ct:contentTypeSchema>
 </file>
 
+<file path=customXml/item2.xml><?xml version="1.0" encoding="utf-8"?>
+<p:properties xmlns:p="http://schemas.microsoft.com/office/2006/metadata/properties" xmlns:xsi="http://www.w3.org/2001/XMLSchema-instance" xmlns:pc="http://schemas.microsoft.com/office/infopath/2007/PartnerControls">
+  <documentManagement>
+    <Status xmlns="71af3243-3dd4-4a8d-8c0d-dd76da1f02a5">Not started</Status>
+    <_ip_UnifiedCompliancePolicyUIAction xmlns="http://schemas.microsoft.com/sharepoint/v3" xsi:nil="true"/>
+    <Image xmlns="71af3243-3dd4-4a8d-8c0d-dd76da1f02a5">
+      <Url xsi:nil="true"/>
+      <Description xsi:nil="true"/>
+    </Image>
+    <_ip_UnifiedCompliancePolicyProperties xmlns="http://schemas.microsoft.com/sharepoint/v3" xsi:nil="true"/>
+    <lcf76f155ced4ddcb4097134ff3c332f xmlns="71af3243-3dd4-4a8d-8c0d-dd76da1f02a5">
+      <Terms xmlns="http://schemas.microsoft.com/office/infopath/2007/PartnerControls"/>
+    </lcf76f155ced4ddcb4097134ff3c332f>
+    <TaxCatchAll xmlns="230e9df3-be65-4c73-a93b-d1236ebd677e"/>
+    <MediaServiceKeyPoints xmlns="71af3243-3dd4-4a8d-8c0d-dd76da1f02a5" xsi:nil="true"/>
+  </documentManagement>
+</p:properties>
+</file>
+
 <file path=customXml/item3.xml><?xml version="1.0" encoding="utf-8"?>
 <?mso-contentType ?>
 <FormTemplates xmlns="http://schemas.microsoft.com/sharepoint/v3/contenttype/forms">
@@ -11337,18 +12218,6 @@
 </file>
 
 <file path=customXml/itemProps1.xml><?xml version="1.0" encoding="utf-8"?>
-<ds:datastoreItem xmlns:ds="http://schemas.openxmlformats.org/officeDocument/2006/customXml" ds:itemID="{4E18D074-6F3D-488C-8220-03C2DEFDE854}">
-  <ds:schemaRefs>
-    <ds:schemaRef ds:uri="http://schemas.microsoft.com/office/2006/metadata/properties"/>
-    <ds:schemaRef ds:uri="http://schemas.microsoft.com/office/infopath/2007/PartnerControls"/>
-    <ds:schemaRef ds:uri="71af3243-3dd4-4a8d-8c0d-dd76da1f02a5"/>
-    <ds:schemaRef ds:uri="http://schemas.microsoft.com/sharepoint/v3"/>
-    <ds:schemaRef ds:uri="230e9df3-be65-4c73-a93b-d1236ebd677e"/>
-  </ds:schemaRefs>
-</ds:datastoreItem>
-</file>
-
-<file path=customXml/itemProps2.xml><?xml version="1.0" encoding="utf-8"?>
 <ds:datastoreItem xmlns:ds="http://schemas.openxmlformats.org/officeDocument/2006/customXml" ds:itemID="{1D141EBB-3386-4164-A294-111C6309E33E}">
   <ds:schemaRefs>
     <ds:schemaRef ds:uri="http://schemas.microsoft.com/office/2006/metadata/contentType"/>
@@ -11369,6 +12238,18 @@
 </ds:datastoreItem>
 </file>
 
+<file path=customXml/itemProps2.xml><?xml version="1.0" encoding="utf-8"?>
+<ds:datastoreItem xmlns:ds="http://schemas.openxmlformats.org/officeDocument/2006/customXml" ds:itemID="{4E18D074-6F3D-488C-8220-03C2DEFDE854}">
+  <ds:schemaRefs>
+    <ds:schemaRef ds:uri="http://schemas.microsoft.com/office/2006/metadata/properties"/>
+    <ds:schemaRef ds:uri="http://schemas.microsoft.com/office/infopath/2007/PartnerControls"/>
+    <ds:schemaRef ds:uri="71af3243-3dd4-4a8d-8c0d-dd76da1f02a5"/>
+    <ds:schemaRef ds:uri="http://schemas.microsoft.com/sharepoint/v3"/>
+    <ds:schemaRef ds:uri="230e9df3-be65-4c73-a93b-d1236ebd677e"/>
+  </ds:schemaRefs>
+</ds:datastoreItem>
+</file>
+
 <file path=customXml/itemProps3.xml><?xml version="1.0" encoding="utf-8"?>
 <ds:datastoreItem xmlns:ds="http://schemas.openxmlformats.org/officeDocument/2006/customXml" ds:itemID="{0F9CE79C-5104-4273-B83B-D03AD839A8F7}">
   <ds:schemaRefs>

</xml_diff>

<commit_message>
wrapped up day 6
continued with classes
also while loop

one more session left to go.
</commit_message>
<xml_diff>
--- a/PresentationPPTPDFS/Day 3 Onwards - C Sharp Workshop Bucks College Group.pptx
+++ b/PresentationPPTPDFS/Day 3 Onwards - C Sharp Workshop Bucks College Group.pptx
@@ -5,10 +5,10 @@
     <p:sldMasterId id="2147483705" r:id="rId4"/>
   </p:sldMasterIdLst>
   <p:notesMasterIdLst>
-    <p:notesMasterId r:id="rId36"/>
+    <p:notesMasterId r:id="rId38"/>
   </p:notesMasterIdLst>
   <p:handoutMasterIdLst>
-    <p:handoutMasterId r:id="rId37"/>
+    <p:handoutMasterId r:id="rId39"/>
   </p:handoutMasterIdLst>
   <p:sldIdLst>
     <p:sldId id="1866" r:id="rId5"/>
@@ -40,8 +40,10 @@
     <p:sldId id="1901" r:id="rId31"/>
     <p:sldId id="1902" r:id="rId32"/>
     <p:sldId id="1903" r:id="rId33"/>
-    <p:sldId id="1875" r:id="rId34"/>
-    <p:sldId id="1876" r:id="rId35"/>
+    <p:sldId id="1904" r:id="rId34"/>
+    <p:sldId id="1905" r:id="rId35"/>
+    <p:sldId id="1875" r:id="rId36"/>
+    <p:sldId id="1876" r:id="rId37"/>
   </p:sldIdLst>
   <p:sldSz cx="12192000" cy="6858000"/>
   <p:notesSz cx="6858000" cy="9144000"/>
@@ -204,6 +206,8 @@
             <p14:sldId id="1901"/>
             <p14:sldId id="1902"/>
             <p14:sldId id="1903"/>
+            <p14:sldId id="1904"/>
+            <p14:sldId id="1905"/>
             <p14:sldId id="1875"/>
             <p14:sldId id="1876"/>
           </p14:sldIdLst>
@@ -516,7 +520,7 @@
           <a:p>
             <a:fld id="{148EE06D-E2C5-4DF1-B3C1-8E9169AAB10D}" type="datetimeFigureOut">
               <a:rPr lang="en-US" smtClean="0"/>
-              <a:t>6/27/2023</a:t>
+              <a:t>6/29/2023</a:t>
             </a:fld>
             <a:endParaRPr lang="en-US" dirty="0"/>
           </a:p>
@@ -1667,7 +1671,7 @@
             <a:fld id="{6DEB7EE2-04A2-4FB2-9625-C9C73AC4D32F}" type="slidenum">
               <a:rPr lang="en-US" altLang="en-US" smtClean="0"/>
               <a:pPr/>
-              <a:t>30</a:t>
+              <a:t>32</a:t>
             </a:fld>
             <a:endParaRPr lang="en-US" altLang="en-US" dirty="0"/>
           </a:p>
@@ -2294,7 +2298,7 @@
           <a:p>
             <a:fld id="{50A1B9BC-7BE7-4893-90FD-CC95830FD8F2}" type="datetimeFigureOut">
               <a:rPr lang="en-US" smtClean="0"/>
-              <a:t>6/27/2023</a:t>
+              <a:t>6/29/2023</a:t>
             </a:fld>
             <a:endParaRPr lang="en-US" dirty="0"/>
           </a:p>
@@ -4387,7 +4391,7 @@
             <a:fld id="{1D364696-E1F3-49EF-AEC8-730A16D9A23F}" type="datetimeFigureOut">
               <a:rPr lang="en-US" altLang="en-US" smtClean="0"/>
               <a:pPr/>
-              <a:t>6/27/2023</a:t>
+              <a:t>6/29/2023</a:t>
             </a:fld>
             <a:endParaRPr lang="en-US" altLang="en-US" dirty="0"/>
           </a:p>
@@ -9196,13 +9200,13 @@
   <p:clrMapOvr>
     <a:masterClrMapping/>
   </p:clrMapOvr>
-  <mc:AlternateContent xmlns:mc="http://schemas.openxmlformats.org/markup-compatibility/2006">
-    <mc:Choice xmlns:p14="http://schemas.microsoft.com/office/powerpoint/2010/main" Requires="p14">
+  <mc:AlternateContent xmlns:mc="http://schemas.openxmlformats.org/markup-compatibility/2006" xmlns:p14="http://schemas.microsoft.com/office/powerpoint/2010/main">
+    <mc:Choice Requires="p14">
       <p:transition spd="med" p14:dur="700">
         <p:fade/>
       </p:transition>
     </mc:Choice>
-    <mc:Fallback>
+    <mc:Fallback xmlns="">
       <p:transition spd="med">
         <p:fade/>
       </p:transition>
@@ -9438,6 +9442,404 @@
 <file path=ppt/slides/slide30.xml><?xml version="1.0" encoding="utf-8"?>
 <p:sld xmlns:a="http://schemas.openxmlformats.org/drawingml/2006/main" xmlns:r="http://schemas.openxmlformats.org/officeDocument/2006/relationships" xmlns:p="http://schemas.openxmlformats.org/presentationml/2006/main">
   <p:cSld>
+    <p:bg>
+      <p:bgPr>
+        <a:solidFill>
+          <a:schemeClr val="accent3"/>
+        </a:solidFill>
+        <a:effectLst/>
+      </p:bgPr>
+    </p:bg>
+    <p:spTree>
+      <p:nvGrpSpPr>
+        <p:cNvPr id="1" name=""/>
+        <p:cNvGrpSpPr/>
+        <p:nvPr/>
+      </p:nvGrpSpPr>
+      <p:grpSpPr>
+        <a:xfrm>
+          <a:off x="0" y="0"/>
+          <a:ext cx="0" cy="0"/>
+          <a:chOff x="0" y="0"/>
+          <a:chExt cx="0" cy="0"/>
+        </a:xfrm>
+      </p:grpSpPr>
+      <p:sp>
+        <p:nvSpPr>
+          <p:cNvPr id="2" name="Text Placeholder 1">
+            <a:extLst>
+              <a:ext uri="{FF2B5EF4-FFF2-40B4-BE49-F238E27FC236}">
+                <a16:creationId xmlns:a16="http://schemas.microsoft.com/office/drawing/2014/main" id="{3F36812B-2065-4A2B-B59B-8957022687BC}"/>
+              </a:ext>
+            </a:extLst>
+          </p:cNvPr>
+          <p:cNvSpPr>
+            <a:spLocks noGrp="1"/>
+          </p:cNvSpPr>
+          <p:nvPr>
+            <p:ph type="body" sz="quarter" idx="11"/>
+          </p:nvPr>
+        </p:nvSpPr>
+        <p:spPr>
+          <a:xfrm>
+            <a:off x="923026" y="879894"/>
+            <a:ext cx="7666008" cy="4198189"/>
+          </a:xfrm>
+        </p:spPr>
+        <p:txBody>
+          <a:bodyPr vert="horz" lIns="91440" tIns="45720" rIns="91440" bIns="45720" rtlCol="0" anchor="t">
+            <a:normAutofit/>
+          </a:bodyPr>
+          <a:lstStyle/>
+          <a:p>
+            <a:pPr marL="285750" indent="-285750">
+              <a:buFont typeface="Arial" panose="020B0604020202020204" pitchFamily="34" charset="0"/>
+              <a:buChar char="•"/>
+            </a:pPr>
+            <a:r>
+              <a:rPr lang="en-US" altLang="en-US" sz="4400" dirty="0"/>
+              <a:t>Student Developer</a:t>
+            </a:r>
+          </a:p>
+          <a:p>
+            <a:pPr marL="285750" indent="-285750">
+              <a:buFont typeface="Arial" panose="020B0604020202020204" pitchFamily="34" charset="0"/>
+              <a:buChar char="•"/>
+            </a:pPr>
+            <a:endParaRPr lang="en-US" altLang="en-US" sz="4400" dirty="0"/>
+          </a:p>
+        </p:txBody>
+      </p:sp>
+      <p:sp>
+        <p:nvSpPr>
+          <p:cNvPr id="3" name="TextBox 2">
+            <a:extLst>
+              <a:ext uri="{FF2B5EF4-FFF2-40B4-BE49-F238E27FC236}">
+                <a16:creationId xmlns:a16="http://schemas.microsoft.com/office/drawing/2014/main" id="{25F00EF3-70C3-32DB-02AF-51455AB20D6F}"/>
+              </a:ext>
+            </a:extLst>
+          </p:cNvPr>
+          <p:cNvSpPr txBox="1"/>
+          <p:nvPr/>
+        </p:nvSpPr>
+        <p:spPr>
+          <a:xfrm>
+            <a:off x="569343" y="6142039"/>
+            <a:ext cx="3226279" cy="276999"/>
+          </a:xfrm>
+          <a:prstGeom prst="rect">
+            <a:avLst/>
+          </a:prstGeom>
+          <a:noFill/>
+        </p:spPr>
+        <p:txBody>
+          <a:bodyPr wrap="square" rtlCol="0">
+            <a:spAutoFit/>
+          </a:bodyPr>
+          <a:lstStyle/>
+          <a:p>
+            <a:r>
+              <a:rPr lang="en-US" sz="1200" dirty="0"/>
+              <a:t>C Sharp Workshop for Bucks College Group</a:t>
+            </a:r>
+          </a:p>
+        </p:txBody>
+      </p:sp>
+      <p:sp>
+        <p:nvSpPr>
+          <p:cNvPr id="4" name="TextBox 3">
+            <a:extLst>
+              <a:ext uri="{FF2B5EF4-FFF2-40B4-BE49-F238E27FC236}">
+                <a16:creationId xmlns:a16="http://schemas.microsoft.com/office/drawing/2014/main" id="{49E4D80E-8AAB-6C00-1319-EA17C69A7EDE}"/>
+              </a:ext>
+            </a:extLst>
+          </p:cNvPr>
+          <p:cNvSpPr txBox="1"/>
+          <p:nvPr/>
+        </p:nvSpPr>
+        <p:spPr>
+          <a:xfrm>
+            <a:off x="8589034" y="6143024"/>
+            <a:ext cx="3226279" cy="276999"/>
+          </a:xfrm>
+          <a:prstGeom prst="rect">
+            <a:avLst/>
+          </a:prstGeom>
+          <a:noFill/>
+        </p:spPr>
+        <p:txBody>
+          <a:bodyPr wrap="square" rtlCol="0">
+            <a:spAutoFit/>
+          </a:bodyPr>
+          <a:lstStyle/>
+          <a:p>
+            <a:r>
+              <a:rPr lang="en-US" sz="1200" dirty="0"/>
+              <a:t>Programming Tutor: Jay (Vijayasimha BR)</a:t>
+            </a:r>
+          </a:p>
+        </p:txBody>
+      </p:sp>
+    </p:spTree>
+    <p:extLst>
+      <p:ext uri="{BB962C8B-B14F-4D97-AF65-F5344CB8AC3E}">
+        <p14:creationId xmlns:p14="http://schemas.microsoft.com/office/powerpoint/2010/main" val="2534716519"/>
+      </p:ext>
+    </p:extLst>
+  </p:cSld>
+  <p:clrMapOvr>
+    <a:masterClrMapping/>
+  </p:clrMapOvr>
+  <mc:AlternateContent xmlns:mc="http://schemas.openxmlformats.org/markup-compatibility/2006">
+    <mc:Choice xmlns:p14="http://schemas.microsoft.com/office/powerpoint/2010/main" Requires="p14">
+      <p:transition spd="med" p14:dur="700">
+        <p:fade/>
+      </p:transition>
+    </mc:Choice>
+    <mc:Fallback>
+      <p:transition spd="med">
+        <p:fade/>
+      </p:transition>
+    </mc:Fallback>
+  </mc:AlternateContent>
+</p:sld>
+</file>
+
+<file path=ppt/slides/slide31.xml><?xml version="1.0" encoding="utf-8"?>
+<p:sld xmlns:a="http://schemas.openxmlformats.org/drawingml/2006/main" xmlns:r="http://schemas.openxmlformats.org/officeDocument/2006/relationships" xmlns:p="http://schemas.openxmlformats.org/presentationml/2006/main">
+  <p:cSld>
+    <p:bg>
+      <p:bgPr>
+        <a:solidFill>
+          <a:schemeClr val="accent3"/>
+        </a:solidFill>
+        <a:effectLst/>
+      </p:bgPr>
+    </p:bg>
+    <p:spTree>
+      <p:nvGrpSpPr>
+        <p:cNvPr id="1" name=""/>
+        <p:cNvGrpSpPr/>
+        <p:nvPr/>
+      </p:nvGrpSpPr>
+      <p:grpSpPr>
+        <a:xfrm>
+          <a:off x="0" y="0"/>
+          <a:ext cx="0" cy="0"/>
+          <a:chOff x="0" y="0"/>
+          <a:chExt cx="0" cy="0"/>
+        </a:xfrm>
+      </p:grpSpPr>
+      <p:sp>
+        <p:nvSpPr>
+          <p:cNvPr id="2" name="Text Placeholder 1">
+            <a:extLst>
+              <a:ext uri="{FF2B5EF4-FFF2-40B4-BE49-F238E27FC236}">
+                <a16:creationId xmlns:a16="http://schemas.microsoft.com/office/drawing/2014/main" id="{3F36812B-2065-4A2B-B59B-8957022687BC}"/>
+              </a:ext>
+            </a:extLst>
+          </p:cNvPr>
+          <p:cNvSpPr>
+            <a:spLocks noGrp="1"/>
+          </p:cNvSpPr>
+          <p:nvPr>
+            <p:ph type="body" sz="quarter" idx="11"/>
+          </p:nvPr>
+        </p:nvSpPr>
+        <p:spPr>
+          <a:xfrm>
+            <a:off x="1017916" y="733245"/>
+            <a:ext cx="7666008" cy="5121215"/>
+          </a:xfrm>
+        </p:spPr>
+        <p:txBody>
+          <a:bodyPr vert="horz" lIns="91440" tIns="45720" rIns="91440" bIns="45720" rtlCol="0" anchor="t">
+            <a:normAutofit fontScale="85000" lnSpcReduction="20000"/>
+          </a:bodyPr>
+          <a:lstStyle/>
+          <a:p>
+            <a:r>
+              <a:rPr lang="en-US" altLang="en-US" sz="4400" dirty="0"/>
+              <a:t>Next Week : Final Session</a:t>
+            </a:r>
+          </a:p>
+          <a:p>
+            <a:pPr marL="285750" indent="-285750">
+              <a:buFont typeface="Arial" panose="020B0604020202020204" pitchFamily="34" charset="0"/>
+              <a:buChar char="•"/>
+            </a:pPr>
+            <a:endParaRPr lang="en-US" altLang="en-US" sz="4400" dirty="0"/>
+          </a:p>
+          <a:p>
+            <a:pPr marL="285750" indent="-285750">
+              <a:buFont typeface="Arial" panose="020B0604020202020204" pitchFamily="34" charset="0"/>
+              <a:buChar char="•"/>
+            </a:pPr>
+            <a:r>
+              <a:rPr lang="en-US" altLang="en-US" sz="4400" dirty="0"/>
+              <a:t>if else</a:t>
+            </a:r>
+          </a:p>
+          <a:p>
+            <a:pPr marL="285750" indent="-285750">
+              <a:buFont typeface="Arial" panose="020B0604020202020204" pitchFamily="34" charset="0"/>
+              <a:buChar char="•"/>
+            </a:pPr>
+            <a:r>
+              <a:rPr lang="en-US" altLang="en-US" sz="4400" dirty="0"/>
+              <a:t>for loop</a:t>
+            </a:r>
+          </a:p>
+          <a:p>
+            <a:pPr marL="285750" indent="-285750">
+              <a:buFont typeface="Arial" panose="020B0604020202020204" pitchFamily="34" charset="0"/>
+              <a:buChar char="•"/>
+            </a:pPr>
+            <a:r>
+              <a:rPr lang="en-US" altLang="en-US" sz="4400" dirty="0"/>
+              <a:t>general advice about where to go with C Sharp in the future</a:t>
+            </a:r>
+          </a:p>
+          <a:p>
+            <a:pPr marL="285750" indent="-285750">
+              <a:buFont typeface="Arial" panose="020B0604020202020204" pitchFamily="34" charset="0"/>
+              <a:buChar char="•"/>
+            </a:pPr>
+            <a:r>
+              <a:rPr lang="en-US" altLang="en-US" sz="4400" dirty="0"/>
+              <a:t>Thoughts about Microsoft MVP</a:t>
+            </a:r>
+          </a:p>
+          <a:p>
+            <a:pPr marL="285750" indent="-285750">
+              <a:buFont typeface="Arial" panose="020B0604020202020204" pitchFamily="34" charset="0"/>
+              <a:buChar char="•"/>
+            </a:pPr>
+            <a:r>
+              <a:rPr lang="en-US" altLang="en-US" sz="4400" dirty="0"/>
+              <a:t>Thoughts about Imagine Cup</a:t>
+            </a:r>
+          </a:p>
+          <a:p>
+            <a:pPr marL="285750" indent="-285750">
+              <a:buFont typeface="Arial" panose="020B0604020202020204" pitchFamily="34" charset="0"/>
+              <a:buChar char="•"/>
+            </a:pPr>
+            <a:r>
+              <a:rPr lang="en-US" altLang="en-US" sz="4400" dirty="0"/>
+              <a:t>Any other questions and stuff. </a:t>
+            </a:r>
+          </a:p>
+          <a:p>
+            <a:pPr marL="285750" indent="-285750">
+              <a:buFont typeface="Arial" panose="020B0604020202020204" pitchFamily="34" charset="0"/>
+              <a:buChar char="•"/>
+            </a:pPr>
+            <a:r>
+              <a:rPr lang="en-US" altLang="en-US" sz="4400" dirty="0"/>
+              <a:t>Wrapping up</a:t>
+            </a:r>
+          </a:p>
+        </p:txBody>
+      </p:sp>
+      <p:sp>
+        <p:nvSpPr>
+          <p:cNvPr id="3" name="TextBox 2">
+            <a:extLst>
+              <a:ext uri="{FF2B5EF4-FFF2-40B4-BE49-F238E27FC236}">
+                <a16:creationId xmlns:a16="http://schemas.microsoft.com/office/drawing/2014/main" id="{25F00EF3-70C3-32DB-02AF-51455AB20D6F}"/>
+              </a:ext>
+            </a:extLst>
+          </p:cNvPr>
+          <p:cNvSpPr txBox="1"/>
+          <p:nvPr/>
+        </p:nvSpPr>
+        <p:spPr>
+          <a:xfrm>
+            <a:off x="569343" y="6142039"/>
+            <a:ext cx="3226279" cy="276999"/>
+          </a:xfrm>
+          <a:prstGeom prst="rect">
+            <a:avLst/>
+          </a:prstGeom>
+          <a:noFill/>
+        </p:spPr>
+        <p:txBody>
+          <a:bodyPr wrap="square" rtlCol="0">
+            <a:spAutoFit/>
+          </a:bodyPr>
+          <a:lstStyle/>
+          <a:p>
+            <a:r>
+              <a:rPr lang="en-US" sz="1200" dirty="0"/>
+              <a:t>C Sharp Workshop for Bucks College Group</a:t>
+            </a:r>
+          </a:p>
+        </p:txBody>
+      </p:sp>
+      <p:sp>
+        <p:nvSpPr>
+          <p:cNvPr id="4" name="TextBox 3">
+            <a:extLst>
+              <a:ext uri="{FF2B5EF4-FFF2-40B4-BE49-F238E27FC236}">
+                <a16:creationId xmlns:a16="http://schemas.microsoft.com/office/drawing/2014/main" id="{49E4D80E-8AAB-6C00-1319-EA17C69A7EDE}"/>
+              </a:ext>
+            </a:extLst>
+          </p:cNvPr>
+          <p:cNvSpPr txBox="1"/>
+          <p:nvPr/>
+        </p:nvSpPr>
+        <p:spPr>
+          <a:xfrm>
+            <a:off x="8589034" y="6143024"/>
+            <a:ext cx="3226279" cy="276999"/>
+          </a:xfrm>
+          <a:prstGeom prst="rect">
+            <a:avLst/>
+          </a:prstGeom>
+          <a:noFill/>
+        </p:spPr>
+        <p:txBody>
+          <a:bodyPr wrap="square" rtlCol="0">
+            <a:spAutoFit/>
+          </a:bodyPr>
+          <a:lstStyle/>
+          <a:p>
+            <a:r>
+              <a:rPr lang="en-US" sz="1200" dirty="0"/>
+              <a:t>Programming Tutor: Jay (Vijayasimha BR)</a:t>
+            </a:r>
+          </a:p>
+        </p:txBody>
+      </p:sp>
+    </p:spTree>
+    <p:extLst>
+      <p:ext uri="{BB962C8B-B14F-4D97-AF65-F5344CB8AC3E}">
+        <p14:creationId xmlns:p14="http://schemas.microsoft.com/office/powerpoint/2010/main" val="3554131806"/>
+      </p:ext>
+    </p:extLst>
+  </p:cSld>
+  <p:clrMapOvr>
+    <a:masterClrMapping/>
+  </p:clrMapOvr>
+  <mc:AlternateContent xmlns:mc="http://schemas.openxmlformats.org/markup-compatibility/2006">
+    <mc:Choice xmlns:p14="http://schemas.microsoft.com/office/powerpoint/2010/main" Requires="p14">
+      <p:transition spd="med" p14:dur="700">
+        <p:fade/>
+      </p:transition>
+    </mc:Choice>
+    <mc:Fallback>
+      <p:transition spd="med">
+        <p:fade/>
+      </p:transition>
+    </mc:Fallback>
+  </mc:AlternateContent>
+</p:sld>
+</file>
+
+<file path=ppt/slides/slide32.xml><?xml version="1.0" encoding="utf-8"?>
+<p:sld xmlns:a="http://schemas.openxmlformats.org/drawingml/2006/main" xmlns:r="http://schemas.openxmlformats.org/officeDocument/2006/relationships" xmlns:p="http://schemas.openxmlformats.org/presentationml/2006/main">
+  <p:cSld>
     <p:spTree>
       <p:nvGrpSpPr>
         <p:cNvPr id="1" name=""/>
@@ -9759,7 +10161,7 @@
 </p:sld>
 </file>
 
-<file path=ppt/slides/slide31.xml><?xml version="1.0" encoding="utf-8"?>
+<file path=ppt/slides/slide33.xml><?xml version="1.0" encoding="utf-8"?>
 <p:sld xmlns:a="http://schemas.openxmlformats.org/drawingml/2006/main" xmlns:r="http://schemas.openxmlformats.org/officeDocument/2006/relationships" xmlns:p="http://schemas.openxmlformats.org/presentationml/2006/main">
   <p:cSld>
     <p:spTree>
@@ -12089,25 +12491,6 @@
 </file>
 
 <file path=customXml/item1.xml><?xml version="1.0" encoding="utf-8"?>
-<p:properties xmlns:p="http://schemas.microsoft.com/office/2006/metadata/properties" xmlns:xsi="http://www.w3.org/2001/XMLSchema-instance" xmlns:pc="http://schemas.microsoft.com/office/infopath/2007/PartnerControls">
-  <documentManagement>
-    <Status xmlns="71af3243-3dd4-4a8d-8c0d-dd76da1f02a5">Not started</Status>
-    <_ip_UnifiedCompliancePolicyUIAction xmlns="http://schemas.microsoft.com/sharepoint/v3" xsi:nil="true"/>
-    <Image xmlns="71af3243-3dd4-4a8d-8c0d-dd76da1f02a5">
-      <Url xsi:nil="true"/>
-      <Description xsi:nil="true"/>
-    </Image>
-    <_ip_UnifiedCompliancePolicyProperties xmlns="http://schemas.microsoft.com/sharepoint/v3" xsi:nil="true"/>
-    <lcf76f155ced4ddcb4097134ff3c332f xmlns="71af3243-3dd4-4a8d-8c0d-dd76da1f02a5">
-      <Terms xmlns="http://schemas.microsoft.com/office/infopath/2007/PartnerControls"/>
-    </lcf76f155ced4ddcb4097134ff3c332f>
-    <TaxCatchAll xmlns="230e9df3-be65-4c73-a93b-d1236ebd677e"/>
-    <MediaServiceKeyPoints xmlns="71af3243-3dd4-4a8d-8c0d-dd76da1f02a5" xsi:nil="true"/>
-  </documentManagement>
-</p:properties>
-</file>
-
-<file path=customXml/item2.xml><?xml version="1.0" encoding="utf-8"?>
 <ct:contentTypeSchema xmlns:ct="http://schemas.microsoft.com/office/2006/metadata/contentType" xmlns:ma="http://schemas.microsoft.com/office/2006/metadata/properties/metaAttributes" ct:_="" ma:_="" ma:contentTypeName="Document" ma:contentTypeID="0x01010079F111ED35F8CC479449609E8A0923A6" ma:contentTypeVersion="18" ma:contentTypeDescription="Create a new document." ma:contentTypeScope="" ma:versionID="22a266b9fa9a230c5a512669d8b298c3">
   <xsd:schema xmlns:xsd="http://www.w3.org/2001/XMLSchema" xmlns:xs="http://www.w3.org/2001/XMLSchema" xmlns:p="http://schemas.microsoft.com/office/2006/metadata/properties" xmlns:ns1="http://schemas.microsoft.com/sharepoint/v3" xmlns:ns2="71af3243-3dd4-4a8d-8c0d-dd76da1f02a5" xmlns:ns3="16c05727-aa75-4e4a-9b5f-8a80a1165891" xmlns:ns4="230e9df3-be65-4c73-a93b-d1236ebd677e" targetNamespace="http://schemas.microsoft.com/office/2006/metadata/properties" ma:root="true" ma:fieldsID="eddc33fff6b14141ee5c74a0d29ea6a1" ns1:_="" ns2:_="" ns3:_="" ns4:_="">
     <xsd:import namespace="http://schemas.microsoft.com/sharepoint/v3"/>
@@ -12383,6 +12766,25 @@
 </ct:contentTypeSchema>
 </file>
 
+<file path=customXml/item2.xml><?xml version="1.0" encoding="utf-8"?>
+<p:properties xmlns:p="http://schemas.microsoft.com/office/2006/metadata/properties" xmlns:xsi="http://www.w3.org/2001/XMLSchema-instance" xmlns:pc="http://schemas.microsoft.com/office/infopath/2007/PartnerControls">
+  <documentManagement>
+    <Status xmlns="71af3243-3dd4-4a8d-8c0d-dd76da1f02a5">Not started</Status>
+    <_ip_UnifiedCompliancePolicyUIAction xmlns="http://schemas.microsoft.com/sharepoint/v3" xsi:nil="true"/>
+    <Image xmlns="71af3243-3dd4-4a8d-8c0d-dd76da1f02a5">
+      <Url xsi:nil="true"/>
+      <Description xsi:nil="true"/>
+    </Image>
+    <_ip_UnifiedCompliancePolicyProperties xmlns="http://schemas.microsoft.com/sharepoint/v3" xsi:nil="true"/>
+    <lcf76f155ced4ddcb4097134ff3c332f xmlns="71af3243-3dd4-4a8d-8c0d-dd76da1f02a5">
+      <Terms xmlns="http://schemas.microsoft.com/office/infopath/2007/PartnerControls"/>
+    </lcf76f155ced4ddcb4097134ff3c332f>
+    <TaxCatchAll xmlns="230e9df3-be65-4c73-a93b-d1236ebd677e"/>
+    <MediaServiceKeyPoints xmlns="71af3243-3dd4-4a8d-8c0d-dd76da1f02a5" xsi:nil="true"/>
+  </documentManagement>
+</p:properties>
+</file>
+
 <file path=customXml/item3.xml><?xml version="1.0" encoding="utf-8"?>
 <?mso-contentType ?>
 <FormTemplates xmlns="http://schemas.microsoft.com/sharepoint/v3/contenttype/forms">
@@ -12393,18 +12795,6 @@
 </file>
 
 <file path=customXml/itemProps1.xml><?xml version="1.0" encoding="utf-8"?>
-<ds:datastoreItem xmlns:ds="http://schemas.openxmlformats.org/officeDocument/2006/customXml" ds:itemID="{4E18D074-6F3D-488C-8220-03C2DEFDE854}">
-  <ds:schemaRefs>
-    <ds:schemaRef ds:uri="http://schemas.microsoft.com/office/2006/metadata/properties"/>
-    <ds:schemaRef ds:uri="http://schemas.microsoft.com/office/infopath/2007/PartnerControls"/>
-    <ds:schemaRef ds:uri="71af3243-3dd4-4a8d-8c0d-dd76da1f02a5"/>
-    <ds:schemaRef ds:uri="http://schemas.microsoft.com/sharepoint/v3"/>
-    <ds:schemaRef ds:uri="230e9df3-be65-4c73-a93b-d1236ebd677e"/>
-  </ds:schemaRefs>
-</ds:datastoreItem>
-</file>
-
-<file path=customXml/itemProps2.xml><?xml version="1.0" encoding="utf-8"?>
 <ds:datastoreItem xmlns:ds="http://schemas.openxmlformats.org/officeDocument/2006/customXml" ds:itemID="{1D141EBB-3386-4164-A294-111C6309E33E}">
   <ds:schemaRefs>
     <ds:schemaRef ds:uri="http://schemas.microsoft.com/office/2006/metadata/contentType"/>
@@ -12425,6 +12815,18 @@
 </ds:datastoreItem>
 </file>
 
+<file path=customXml/itemProps2.xml><?xml version="1.0" encoding="utf-8"?>
+<ds:datastoreItem xmlns:ds="http://schemas.openxmlformats.org/officeDocument/2006/customXml" ds:itemID="{4E18D074-6F3D-488C-8220-03C2DEFDE854}">
+  <ds:schemaRefs>
+    <ds:schemaRef ds:uri="http://schemas.microsoft.com/office/2006/metadata/properties"/>
+    <ds:schemaRef ds:uri="http://schemas.microsoft.com/office/infopath/2007/PartnerControls"/>
+    <ds:schemaRef ds:uri="71af3243-3dd4-4a8d-8c0d-dd76da1f02a5"/>
+    <ds:schemaRef ds:uri="http://schemas.microsoft.com/sharepoint/v3"/>
+    <ds:schemaRef ds:uri="230e9df3-be65-4c73-a93b-d1236ebd677e"/>
+  </ds:schemaRefs>
+</ds:datastoreItem>
+</file>
+
 <file path=customXml/itemProps3.xml><?xml version="1.0" encoding="utf-8"?>
 <ds:datastoreItem xmlns:ds="http://schemas.openxmlformats.org/officeDocument/2006/customXml" ds:itemID="{0F9CE79C-5104-4273-B83B-D03AD839A8F7}">
   <ds:schemaRefs>

</xml_diff>